<commit_message>
Added section on g
</commit_message>
<xml_diff>
--- a/tex/figures/NewtonsLaws/Figures.pptx
+++ b/tex/figures/NewtonsLaws/Figures.pptx
@@ -10,9 +10,9 @@
     <p:sldId id="265" r:id="rId4"/>
     <p:sldId id="266" r:id="rId5"/>
     <p:sldId id="267" r:id="rId6"/>
-    <p:sldId id="268" r:id="rId7"/>
-    <p:sldId id="269" r:id="rId8"/>
-    <p:sldId id="270" r:id="rId9"/>
+    <p:sldId id="270" r:id="rId7"/>
+    <p:sldId id="268" r:id="rId8"/>
+    <p:sldId id="269" r:id="rId9"/>
   </p:sldIdLst>
   <p:sldSz cx="12192000" cy="6858000"/>
   <p:notesSz cx="6858000" cy="9144000"/>
@@ -250,7 +250,7 @@
           <a:p>
             <a:fld id="{F7249F8D-641B-4CAF-BAE5-10524742F6F1}" type="datetimeFigureOut">
               <a:rPr lang="en-CA" smtClean="0"/>
-              <a:t>2018-05-24</a:t>
+              <a:t>2018-05-28</a:t>
             </a:fld>
             <a:endParaRPr lang="en-CA"/>
           </a:p>
@@ -420,7 +420,7 @@
           <a:p>
             <a:fld id="{F7249F8D-641B-4CAF-BAE5-10524742F6F1}" type="datetimeFigureOut">
               <a:rPr lang="en-CA" smtClean="0"/>
-              <a:t>2018-05-24</a:t>
+              <a:t>2018-05-28</a:t>
             </a:fld>
             <a:endParaRPr lang="en-CA"/>
           </a:p>
@@ -600,7 +600,7 @@
           <a:p>
             <a:fld id="{F7249F8D-641B-4CAF-BAE5-10524742F6F1}" type="datetimeFigureOut">
               <a:rPr lang="en-CA" smtClean="0"/>
-              <a:t>2018-05-24</a:t>
+              <a:t>2018-05-28</a:t>
             </a:fld>
             <a:endParaRPr lang="en-CA"/>
           </a:p>
@@ -770,7 +770,7 @@
           <a:p>
             <a:fld id="{F7249F8D-641B-4CAF-BAE5-10524742F6F1}" type="datetimeFigureOut">
               <a:rPr lang="en-CA" smtClean="0"/>
-              <a:t>2018-05-24</a:t>
+              <a:t>2018-05-28</a:t>
             </a:fld>
             <a:endParaRPr lang="en-CA"/>
           </a:p>
@@ -1016,7 +1016,7 @@
           <a:p>
             <a:fld id="{F7249F8D-641B-4CAF-BAE5-10524742F6F1}" type="datetimeFigureOut">
               <a:rPr lang="en-CA" smtClean="0"/>
-              <a:t>2018-05-24</a:t>
+              <a:t>2018-05-28</a:t>
             </a:fld>
             <a:endParaRPr lang="en-CA"/>
           </a:p>
@@ -1248,7 +1248,7 @@
           <a:p>
             <a:fld id="{F7249F8D-641B-4CAF-BAE5-10524742F6F1}" type="datetimeFigureOut">
               <a:rPr lang="en-CA" smtClean="0"/>
-              <a:t>2018-05-24</a:t>
+              <a:t>2018-05-28</a:t>
             </a:fld>
             <a:endParaRPr lang="en-CA"/>
           </a:p>
@@ -1615,7 +1615,7 @@
           <a:p>
             <a:fld id="{F7249F8D-641B-4CAF-BAE5-10524742F6F1}" type="datetimeFigureOut">
               <a:rPr lang="en-CA" smtClean="0"/>
-              <a:t>2018-05-24</a:t>
+              <a:t>2018-05-28</a:t>
             </a:fld>
             <a:endParaRPr lang="en-CA"/>
           </a:p>
@@ -1733,7 +1733,7 @@
           <a:p>
             <a:fld id="{F7249F8D-641B-4CAF-BAE5-10524742F6F1}" type="datetimeFigureOut">
               <a:rPr lang="en-CA" smtClean="0"/>
-              <a:t>2018-05-24</a:t>
+              <a:t>2018-05-28</a:t>
             </a:fld>
             <a:endParaRPr lang="en-CA"/>
           </a:p>
@@ -1828,7 +1828,7 @@
           <a:p>
             <a:fld id="{F7249F8D-641B-4CAF-BAE5-10524742F6F1}" type="datetimeFigureOut">
               <a:rPr lang="en-CA" smtClean="0"/>
-              <a:t>2018-05-24</a:t>
+              <a:t>2018-05-28</a:t>
             </a:fld>
             <a:endParaRPr lang="en-CA"/>
           </a:p>
@@ -2105,7 +2105,7 @@
           <a:p>
             <a:fld id="{F7249F8D-641B-4CAF-BAE5-10524742F6F1}" type="datetimeFigureOut">
               <a:rPr lang="en-CA" smtClean="0"/>
-              <a:t>2018-05-24</a:t>
+              <a:t>2018-05-28</a:t>
             </a:fld>
             <a:endParaRPr lang="en-CA"/>
           </a:p>
@@ -2358,7 +2358,7 @@
           <a:p>
             <a:fld id="{F7249F8D-641B-4CAF-BAE5-10524742F6F1}" type="datetimeFigureOut">
               <a:rPr lang="en-CA" smtClean="0"/>
-              <a:t>2018-05-24</a:t>
+              <a:t>2018-05-28</a:t>
             </a:fld>
             <a:endParaRPr lang="en-CA"/>
           </a:p>
@@ -2571,7 +2571,7 @@
           <a:p>
             <a:fld id="{F7249F8D-641B-4CAF-BAE5-10524742F6F1}" type="datetimeFigureOut">
               <a:rPr lang="en-CA" smtClean="0"/>
-              <a:t>2018-05-24</a:t>
+              <a:t>2018-05-28</a:t>
             </a:fld>
             <a:endParaRPr lang="en-CA"/>
           </a:p>
@@ -22219,6 +22219,3727 @@
       </p:grpSpPr>
       <p:grpSp>
         <p:nvGrpSpPr>
+          <p:cNvPr id="22" name="Group 21"/>
+          <p:cNvGrpSpPr/>
+          <p:nvPr/>
+        </p:nvGrpSpPr>
+        <p:grpSpPr>
+          <a:xfrm>
+            <a:off x="821802" y="802789"/>
+            <a:ext cx="2384385" cy="2241353"/>
+            <a:chOff x="1493134" y="930111"/>
+            <a:chExt cx="2384385" cy="2241353"/>
+          </a:xfrm>
+        </p:grpSpPr>
+        <p:sp>
+          <p:nvSpPr>
+            <p:cNvPr id="2" name="Rectangle 1"/>
+            <p:cNvSpPr/>
+            <p:nvPr/>
+          </p:nvSpPr>
+          <p:spPr>
+            <a:xfrm>
+              <a:off x="1493134" y="1608882"/>
+              <a:ext cx="2384385" cy="1562582"/>
+            </a:xfrm>
+            <a:prstGeom prst="rect">
+              <a:avLst/>
+            </a:prstGeom>
+            <a:noFill/>
+            <a:ln w="38100">
+              <a:solidFill>
+                <a:schemeClr val="tx1"/>
+              </a:solidFill>
+            </a:ln>
+          </p:spPr>
+          <p:style>
+            <a:lnRef idx="2">
+              <a:schemeClr val="accent1">
+                <a:shade val="50000"/>
+              </a:schemeClr>
+            </a:lnRef>
+            <a:fillRef idx="1">
+              <a:schemeClr val="accent1"/>
+            </a:fillRef>
+            <a:effectRef idx="0">
+              <a:schemeClr val="accent1"/>
+            </a:effectRef>
+            <a:fontRef idx="minor">
+              <a:schemeClr val="lt1"/>
+            </a:fontRef>
+          </p:style>
+          <p:txBody>
+            <a:bodyPr rtlCol="0" anchor="ctr"/>
+            <a:lstStyle/>
+            <a:p>
+              <a:pPr algn="ctr"/>
+              <a:endParaRPr lang="en-US"/>
+            </a:p>
+          </p:txBody>
+        </p:sp>
+        <p:sp>
+          <p:nvSpPr>
+            <p:cNvPr id="3" name="Oval 2"/>
+            <p:cNvSpPr/>
+            <p:nvPr/>
+          </p:nvSpPr>
+          <p:spPr>
+            <a:xfrm>
+              <a:off x="1991434" y="2534854"/>
+              <a:ext cx="120943" cy="119766"/>
+            </a:xfrm>
+            <a:prstGeom prst="ellipse">
+              <a:avLst/>
+            </a:prstGeom>
+            <a:solidFill>
+              <a:schemeClr val="tx1"/>
+            </a:solidFill>
+            <a:ln w="38100">
+              <a:solidFill>
+                <a:schemeClr val="tx1"/>
+              </a:solidFill>
+            </a:ln>
+          </p:spPr>
+          <p:style>
+            <a:lnRef idx="2">
+              <a:schemeClr val="accent1">
+                <a:shade val="50000"/>
+              </a:schemeClr>
+            </a:lnRef>
+            <a:fillRef idx="1">
+              <a:schemeClr val="accent1"/>
+            </a:fillRef>
+            <a:effectRef idx="0">
+              <a:schemeClr val="accent1"/>
+            </a:effectRef>
+            <a:fontRef idx="minor">
+              <a:schemeClr val="lt1"/>
+            </a:fontRef>
+          </p:style>
+          <p:txBody>
+            <a:bodyPr rtlCol="0" anchor="ctr"/>
+            <a:lstStyle/>
+            <a:p>
+              <a:pPr algn="ctr"/>
+              <a:endParaRPr lang="en-US"/>
+            </a:p>
+          </p:txBody>
+        </p:sp>
+        <p:cxnSp>
+          <p:nvCxnSpPr>
+            <p:cNvPr id="5" name="Straight Connector 4"/>
+            <p:cNvCxnSpPr>
+              <a:stCxn id="2" idx="0"/>
+            </p:cNvCxnSpPr>
+            <p:nvPr/>
+          </p:nvCxnSpPr>
+          <p:spPr>
+            <a:xfrm flipH="1">
+              <a:off x="2080844" y="1608882"/>
+              <a:ext cx="604483" cy="925972"/>
+            </a:xfrm>
+            <a:prstGeom prst="line">
+              <a:avLst/>
+            </a:prstGeom>
+            <a:ln w="38100">
+              <a:solidFill>
+                <a:schemeClr val="tx1"/>
+              </a:solidFill>
+            </a:ln>
+          </p:spPr>
+          <p:style>
+            <a:lnRef idx="1">
+              <a:schemeClr val="accent1"/>
+            </a:lnRef>
+            <a:fillRef idx="0">
+              <a:schemeClr val="accent1"/>
+            </a:fillRef>
+            <a:effectRef idx="0">
+              <a:schemeClr val="accent1"/>
+            </a:effectRef>
+            <a:fontRef idx="minor">
+              <a:schemeClr val="tx1"/>
+            </a:fontRef>
+          </p:style>
+        </p:cxnSp>
+        <p:cxnSp>
+          <p:nvCxnSpPr>
+            <p:cNvPr id="6" name="Straight Connector 5"/>
+            <p:cNvCxnSpPr/>
+            <p:nvPr/>
+          </p:nvCxnSpPr>
+          <p:spPr>
+            <a:xfrm flipH="1">
+              <a:off x="2679538" y="1608882"/>
+              <a:ext cx="8976" cy="1331088"/>
+            </a:xfrm>
+            <a:prstGeom prst="line">
+              <a:avLst/>
+            </a:prstGeom>
+            <a:ln w="28575">
+              <a:solidFill>
+                <a:schemeClr val="tx1"/>
+              </a:solidFill>
+              <a:prstDash val="sysDot"/>
+            </a:ln>
+          </p:spPr>
+          <p:style>
+            <a:lnRef idx="1">
+              <a:schemeClr val="accent1"/>
+            </a:lnRef>
+            <a:fillRef idx="0">
+              <a:schemeClr val="accent1"/>
+            </a:fillRef>
+            <a:effectRef idx="0">
+              <a:schemeClr val="accent1"/>
+            </a:effectRef>
+            <a:fontRef idx="minor">
+              <a:schemeClr val="tx1"/>
+            </a:fontRef>
+          </p:style>
+        </p:cxnSp>
+        <mc:AlternateContent xmlns:mc="http://schemas.openxmlformats.org/markup-compatibility/2006">
+          <mc:Choice xmlns:a14="http://schemas.microsoft.com/office/drawing/2010/main" Requires="a14">
+            <p:sp>
+              <p:nvSpPr>
+                <p:cNvPr id="9" name="TextBox 8"/>
+                <p:cNvSpPr txBox="1"/>
+                <p:nvPr/>
+              </p:nvSpPr>
+              <p:spPr>
+                <a:xfrm>
+                  <a:off x="2391873" y="2082396"/>
+                  <a:ext cx="222304" cy="307777"/>
+                </a:xfrm>
+                <a:prstGeom prst="rect">
+                  <a:avLst/>
+                </a:prstGeom>
+                <a:noFill/>
+              </p:spPr>
+              <p:txBody>
+                <a:bodyPr wrap="none" lIns="0" tIns="0" rIns="0" bIns="0" rtlCol="0">
+                  <a:spAutoFit/>
+                </a:bodyPr>
+                <a:lstStyle/>
+                <a:p>
+                  <a14:m>
+                    <m:oMathPara xmlns:m="http://schemas.openxmlformats.org/officeDocument/2006/math">
+                      <m:oMathParaPr>
+                        <m:jc m:val="centerGroup"/>
+                      </m:oMathParaPr>
+                      <m:oMath xmlns:m="http://schemas.openxmlformats.org/officeDocument/2006/math">
+                        <m:r>
+                          <a:rPr lang="en-US" sz="2000" b="0" i="1" smtClean="0">
+                            <a:latin typeface="Cambria Math" panose="02040503050406030204" pitchFamily="18" charset="0"/>
+                            <a:cs typeface="Arial" panose="020B0604020202020204" pitchFamily="34" charset="0"/>
+                          </a:rPr>
+                          <m:t>𝜃</m:t>
+                        </m:r>
+                      </m:oMath>
+                    </m:oMathPara>
+                  </a14:m>
+                  <a:endParaRPr lang="en-US" sz="2000" dirty="0" smtClean="0">
+                    <a:latin typeface="Arial" panose="020B0604020202020204" pitchFamily="34" charset="0"/>
+                    <a:cs typeface="Arial" panose="020B0604020202020204" pitchFamily="34" charset="0"/>
+                  </a:endParaRPr>
+                </a:p>
+              </p:txBody>
+            </p:sp>
+          </mc:Choice>
+          <mc:Fallback>
+            <p:sp>
+              <p:nvSpPr>
+                <p:cNvPr id="9" name="TextBox 8"/>
+                <p:cNvSpPr txBox="1">
+                  <a:spLocks noRot="1" noChangeAspect="1" noMove="1" noResize="1" noEditPoints="1" noAdjustHandles="1" noChangeArrowheads="1" noChangeShapeType="1" noTextEdit="1"/>
+                </p:cNvSpPr>
+                <p:nvPr/>
+              </p:nvSpPr>
+              <p:spPr>
+                <a:xfrm>
+                  <a:off x="2391873" y="2082396"/>
+                  <a:ext cx="222304" cy="307777"/>
+                </a:xfrm>
+                <a:prstGeom prst="rect">
+                  <a:avLst/>
+                </a:prstGeom>
+                <a:blipFill>
+                  <a:blip r:embed="rId2"/>
+                  <a:stretch>
+                    <a:fillRect l="-24324" r="-21622" b="-12000"/>
+                  </a:stretch>
+                </a:blipFill>
+              </p:spPr>
+              <p:txBody>
+                <a:bodyPr/>
+                <a:lstStyle/>
+                <a:p>
+                  <a:r>
+                    <a:rPr lang="en-US">
+                      <a:noFill/>
+                    </a:rPr>
+                    <a:t> </a:t>
+                  </a:r>
+                </a:p>
+              </p:txBody>
+            </p:sp>
+          </mc:Fallback>
+        </mc:AlternateContent>
+        <p:sp>
+          <p:nvSpPr>
+            <p:cNvPr id="18" name="Right Arrow 17"/>
+            <p:cNvSpPr/>
+            <p:nvPr/>
+          </p:nvSpPr>
+          <p:spPr>
+            <a:xfrm>
+              <a:off x="2391873" y="1203766"/>
+              <a:ext cx="700928" cy="118979"/>
+            </a:xfrm>
+            <a:prstGeom prst="rightArrow">
+              <a:avLst/>
+            </a:prstGeom>
+            <a:solidFill>
+              <a:schemeClr val="tx1"/>
+            </a:solidFill>
+            <a:ln w="38100">
+              <a:solidFill>
+                <a:schemeClr val="tx1"/>
+              </a:solidFill>
+            </a:ln>
+          </p:spPr>
+          <p:style>
+            <a:lnRef idx="2">
+              <a:schemeClr val="accent1">
+                <a:shade val="50000"/>
+              </a:schemeClr>
+            </a:lnRef>
+            <a:fillRef idx="1">
+              <a:schemeClr val="accent1"/>
+            </a:fillRef>
+            <a:effectRef idx="0">
+              <a:schemeClr val="accent1"/>
+            </a:effectRef>
+            <a:fontRef idx="minor">
+              <a:schemeClr val="lt1"/>
+            </a:fontRef>
+          </p:style>
+          <p:txBody>
+            <a:bodyPr rtlCol="0" anchor="ctr"/>
+            <a:lstStyle/>
+            <a:p>
+              <a:pPr algn="ctr"/>
+              <a:endParaRPr lang="en-US" dirty="0"/>
+            </a:p>
+          </p:txBody>
+        </p:sp>
+        <mc:AlternateContent xmlns:mc="http://schemas.openxmlformats.org/markup-compatibility/2006">
+          <mc:Choice xmlns:a14="http://schemas.microsoft.com/office/drawing/2010/main" Requires="a14">
+            <p:sp>
+              <p:nvSpPr>
+                <p:cNvPr id="19" name="TextBox 18"/>
+                <p:cNvSpPr txBox="1"/>
+                <p:nvPr/>
+              </p:nvSpPr>
+              <p:spPr>
+                <a:xfrm>
+                  <a:off x="3415625" y="2832381"/>
+                  <a:ext cx="459293" cy="307777"/>
+                </a:xfrm>
+                <a:prstGeom prst="rect">
+                  <a:avLst/>
+                </a:prstGeom>
+                <a:noFill/>
+              </p:spPr>
+              <p:txBody>
+                <a:bodyPr wrap="none" lIns="0" tIns="0" rIns="0" bIns="0" rtlCol="0">
+                  <a:spAutoFit/>
+                </a:bodyPr>
+                <a:lstStyle/>
+                <a:p>
+                  <a14:m>
+                    <m:oMathPara xmlns:m="http://schemas.openxmlformats.org/officeDocument/2006/math">
+                      <m:oMathParaPr>
+                        <m:jc m:val="centerGroup"/>
+                      </m:oMathParaPr>
+                      <m:oMath xmlns:m="http://schemas.openxmlformats.org/officeDocument/2006/math">
+                        <m:r>
+                          <a:rPr lang="en-US" sz="2000" b="0" i="1" smtClean="0">
+                            <a:latin typeface="Cambria Math" panose="02040503050406030204" pitchFamily="18" charset="0"/>
+                            <a:cs typeface="Arial" panose="020B0604020202020204" pitchFamily="34" charset="0"/>
+                          </a:rPr>
+                          <m:t>𝑐𝑎𝑟</m:t>
+                        </m:r>
+                      </m:oMath>
+                    </m:oMathPara>
+                  </a14:m>
+                  <a:endParaRPr lang="en-US" sz="2000" dirty="0" smtClean="0">
+                    <a:latin typeface="Arial" panose="020B0604020202020204" pitchFamily="34" charset="0"/>
+                    <a:cs typeface="Arial" panose="020B0604020202020204" pitchFamily="34" charset="0"/>
+                  </a:endParaRPr>
+                </a:p>
+              </p:txBody>
+            </p:sp>
+          </mc:Choice>
+          <mc:Fallback>
+            <p:sp>
+              <p:nvSpPr>
+                <p:cNvPr id="19" name="TextBox 18"/>
+                <p:cNvSpPr txBox="1">
+                  <a:spLocks noRot="1" noChangeAspect="1" noMove="1" noResize="1" noEditPoints="1" noAdjustHandles="1" noChangeArrowheads="1" noChangeShapeType="1" noTextEdit="1"/>
+                </p:cNvSpPr>
+                <p:nvPr/>
+              </p:nvSpPr>
+              <p:spPr>
+                <a:xfrm>
+                  <a:off x="3415625" y="2832381"/>
+                  <a:ext cx="459293" cy="307777"/>
+                </a:xfrm>
+                <a:prstGeom prst="rect">
+                  <a:avLst/>
+                </a:prstGeom>
+                <a:blipFill>
+                  <a:blip r:embed="rId3"/>
+                  <a:stretch>
+                    <a:fillRect l="-5263" r="-3947" b="-2000"/>
+                  </a:stretch>
+                </a:blipFill>
+              </p:spPr>
+              <p:txBody>
+                <a:bodyPr/>
+                <a:lstStyle/>
+                <a:p>
+                  <a:r>
+                    <a:rPr lang="en-US">
+                      <a:noFill/>
+                    </a:rPr>
+                    <a:t> </a:t>
+                  </a:r>
+                </a:p>
+              </p:txBody>
+            </p:sp>
+          </mc:Fallback>
+        </mc:AlternateContent>
+        <mc:AlternateContent xmlns:mc="http://schemas.openxmlformats.org/markup-compatibility/2006">
+          <mc:Choice xmlns:a14="http://schemas.microsoft.com/office/drawing/2010/main" Requires="a14">
+            <p:sp>
+              <p:nvSpPr>
+                <p:cNvPr id="20" name="TextBox 19"/>
+                <p:cNvSpPr txBox="1"/>
+                <p:nvPr/>
+              </p:nvSpPr>
+              <p:spPr>
+                <a:xfrm>
+                  <a:off x="2632595" y="930111"/>
+                  <a:ext cx="219483" cy="307777"/>
+                </a:xfrm>
+                <a:prstGeom prst="rect">
+                  <a:avLst/>
+                </a:prstGeom>
+                <a:noFill/>
+              </p:spPr>
+              <p:txBody>
+                <a:bodyPr wrap="none" lIns="0" tIns="0" rIns="0" bIns="0" rtlCol="0">
+                  <a:spAutoFit/>
+                </a:bodyPr>
+                <a:lstStyle/>
+                <a:p>
+                  <a14:m>
+                    <m:oMathPara xmlns:m="http://schemas.openxmlformats.org/officeDocument/2006/math">
+                      <m:oMathParaPr>
+                        <m:jc m:val="centerGroup"/>
+                      </m:oMathParaPr>
+                      <m:oMath xmlns:m="http://schemas.openxmlformats.org/officeDocument/2006/math">
+                        <m:acc>
+                          <m:accPr>
+                            <m:chr m:val="⃗"/>
+                            <m:ctrlPr>
+                              <a:rPr lang="en-US" sz="2000" b="0" i="1" smtClean="0">
+                                <a:latin typeface="Cambria Math" panose="02040503050406030204" pitchFamily="18" charset="0"/>
+                                <a:cs typeface="Arial" panose="020B0604020202020204" pitchFamily="34" charset="0"/>
+                              </a:rPr>
+                            </m:ctrlPr>
+                          </m:accPr>
+                          <m:e>
+                            <m:r>
+                              <a:rPr lang="en-US" sz="2000" b="0" i="1" smtClean="0">
+                                <a:latin typeface="Cambria Math" panose="02040503050406030204" pitchFamily="18" charset="0"/>
+                                <a:cs typeface="Arial" panose="020B0604020202020204" pitchFamily="34" charset="0"/>
+                              </a:rPr>
+                              <m:t>𝑎</m:t>
+                            </m:r>
+                          </m:e>
+                        </m:acc>
+                      </m:oMath>
+                    </m:oMathPara>
+                  </a14:m>
+                  <a:endParaRPr lang="en-US" sz="2000" dirty="0" smtClean="0">
+                    <a:latin typeface="Arial" panose="020B0604020202020204" pitchFamily="34" charset="0"/>
+                    <a:cs typeface="Arial" panose="020B0604020202020204" pitchFamily="34" charset="0"/>
+                  </a:endParaRPr>
+                </a:p>
+              </p:txBody>
+            </p:sp>
+          </mc:Choice>
+          <mc:Fallback>
+            <p:sp>
+              <p:nvSpPr>
+                <p:cNvPr id="20" name="TextBox 19"/>
+                <p:cNvSpPr txBox="1">
+                  <a:spLocks noRot="1" noChangeAspect="1" noMove="1" noResize="1" noEditPoints="1" noAdjustHandles="1" noChangeArrowheads="1" noChangeShapeType="1" noTextEdit="1"/>
+                </p:cNvSpPr>
+                <p:nvPr/>
+              </p:nvSpPr>
+              <p:spPr>
+                <a:xfrm>
+                  <a:off x="2632595" y="930111"/>
+                  <a:ext cx="219483" cy="307777"/>
+                </a:xfrm>
+                <a:prstGeom prst="rect">
+                  <a:avLst/>
+                </a:prstGeom>
+                <a:blipFill>
+                  <a:blip r:embed="rId4"/>
+                  <a:stretch>
+                    <a:fillRect l="-22222" t="-36000" r="-91667" b="-6000"/>
+                  </a:stretch>
+                </a:blipFill>
+              </p:spPr>
+              <p:txBody>
+                <a:bodyPr/>
+                <a:lstStyle/>
+                <a:p>
+                  <a:r>
+                    <a:rPr lang="en-US">
+                      <a:noFill/>
+                    </a:rPr>
+                    <a:t> </a:t>
+                  </a:r>
+                </a:p>
+              </p:txBody>
+            </p:sp>
+          </mc:Fallback>
+        </mc:AlternateContent>
+        <mc:AlternateContent xmlns:mc="http://schemas.openxmlformats.org/markup-compatibility/2006">
+          <mc:Choice xmlns:a14="http://schemas.microsoft.com/office/drawing/2010/main" Requires="a14">
+            <p:sp>
+              <p:nvSpPr>
+                <p:cNvPr id="21" name="TextBox 20"/>
+                <p:cNvSpPr txBox="1"/>
+                <p:nvPr/>
+              </p:nvSpPr>
+              <p:spPr>
+                <a:xfrm>
+                  <a:off x="1739061" y="2236284"/>
+                  <a:ext cx="289695" cy="307777"/>
+                </a:xfrm>
+                <a:prstGeom prst="rect">
+                  <a:avLst/>
+                </a:prstGeom>
+                <a:noFill/>
+              </p:spPr>
+              <p:txBody>
+                <a:bodyPr wrap="none" lIns="0" tIns="0" rIns="0" bIns="0" rtlCol="0">
+                  <a:spAutoFit/>
+                </a:bodyPr>
+                <a:lstStyle/>
+                <a:p>
+                  <a14:m>
+                    <m:oMathPara xmlns:m="http://schemas.openxmlformats.org/officeDocument/2006/math">
+                      <m:oMathParaPr>
+                        <m:jc m:val="centerGroup"/>
+                      </m:oMathParaPr>
+                      <m:oMath xmlns:m="http://schemas.openxmlformats.org/officeDocument/2006/math">
+                        <m:r>
+                          <a:rPr lang="en-US" sz="2000" b="0" i="1" smtClean="0">
+                            <a:latin typeface="Cambria Math" panose="02040503050406030204" pitchFamily="18" charset="0"/>
+                            <a:cs typeface="Arial" panose="020B0604020202020204" pitchFamily="34" charset="0"/>
+                          </a:rPr>
+                          <m:t>𝑚</m:t>
+                        </m:r>
+                      </m:oMath>
+                    </m:oMathPara>
+                  </a14:m>
+                  <a:endParaRPr lang="en-US" sz="2000" dirty="0" smtClean="0">
+                    <a:latin typeface="Arial" panose="020B0604020202020204" pitchFamily="34" charset="0"/>
+                    <a:cs typeface="Arial" panose="020B0604020202020204" pitchFamily="34" charset="0"/>
+                  </a:endParaRPr>
+                </a:p>
+              </p:txBody>
+            </p:sp>
+          </mc:Choice>
+          <mc:Fallback>
+            <p:sp>
+              <p:nvSpPr>
+                <p:cNvPr id="21" name="TextBox 20"/>
+                <p:cNvSpPr txBox="1">
+                  <a:spLocks noRot="1" noChangeAspect="1" noMove="1" noResize="1" noEditPoints="1" noAdjustHandles="1" noChangeArrowheads="1" noChangeShapeType="1" noTextEdit="1"/>
+                </p:cNvSpPr>
+                <p:nvPr/>
+              </p:nvSpPr>
+              <p:spPr>
+                <a:xfrm>
+                  <a:off x="1739061" y="2236284"/>
+                  <a:ext cx="289695" cy="307777"/>
+                </a:xfrm>
+                <a:prstGeom prst="rect">
+                  <a:avLst/>
+                </a:prstGeom>
+                <a:blipFill>
+                  <a:blip r:embed="rId5"/>
+                  <a:stretch>
+                    <a:fillRect l="-8333" r="-8333" b="-2000"/>
+                  </a:stretch>
+                </a:blipFill>
+              </p:spPr>
+              <p:txBody>
+                <a:bodyPr/>
+                <a:lstStyle/>
+                <a:p>
+                  <a:r>
+                    <a:rPr lang="en-US">
+                      <a:noFill/>
+                    </a:rPr>
+                    <a:t> </a:t>
+                  </a:r>
+                </a:p>
+              </p:txBody>
+            </p:sp>
+          </mc:Fallback>
+        </mc:AlternateContent>
+      </p:grpSp>
+      <p:grpSp>
+        <p:nvGrpSpPr>
+          <p:cNvPr id="49" name="Group 48"/>
+          <p:cNvGrpSpPr/>
+          <p:nvPr/>
+        </p:nvGrpSpPr>
+        <p:grpSpPr>
+          <a:xfrm>
+            <a:off x="4061420" y="717932"/>
+            <a:ext cx="1833467" cy="2400962"/>
+            <a:chOff x="4061420" y="717932"/>
+            <a:chExt cx="1833467" cy="2400962"/>
+          </a:xfrm>
+        </p:grpSpPr>
+        <p:grpSp>
+          <p:nvGrpSpPr>
+            <p:cNvPr id="43" name="Group 42"/>
+            <p:cNvGrpSpPr/>
+            <p:nvPr/>
+          </p:nvGrpSpPr>
+          <p:grpSpPr>
+            <a:xfrm>
+              <a:off x="4061420" y="717932"/>
+              <a:ext cx="1833467" cy="2400962"/>
+              <a:chOff x="4061420" y="717932"/>
+              <a:chExt cx="1833467" cy="2400962"/>
+            </a:xfrm>
+          </p:grpSpPr>
+          <p:sp>
+            <p:nvSpPr>
+              <p:cNvPr id="23" name="Oval 22"/>
+              <p:cNvSpPr/>
+              <p:nvPr/>
+            </p:nvSpPr>
+            <p:spPr>
+              <a:xfrm>
+                <a:off x="5172109" y="2079380"/>
+                <a:ext cx="120943" cy="119766"/>
+              </a:xfrm>
+              <a:prstGeom prst="ellipse">
+                <a:avLst/>
+              </a:prstGeom>
+              <a:solidFill>
+                <a:schemeClr val="tx1"/>
+              </a:solidFill>
+              <a:ln w="38100">
+                <a:solidFill>
+                  <a:schemeClr val="tx1"/>
+                </a:solidFill>
+              </a:ln>
+            </p:spPr>
+            <p:style>
+              <a:lnRef idx="2">
+                <a:schemeClr val="accent1">
+                  <a:shade val="50000"/>
+                </a:schemeClr>
+              </a:lnRef>
+              <a:fillRef idx="1">
+                <a:schemeClr val="accent1"/>
+              </a:fillRef>
+              <a:effectRef idx="0">
+                <a:schemeClr val="accent1"/>
+              </a:effectRef>
+              <a:fontRef idx="minor">
+                <a:schemeClr val="lt1"/>
+              </a:fontRef>
+            </p:style>
+            <p:txBody>
+              <a:bodyPr rtlCol="0" anchor="ctr"/>
+              <a:lstStyle/>
+              <a:p>
+                <a:pPr algn="ctr"/>
+                <a:endParaRPr lang="en-US"/>
+              </a:p>
+            </p:txBody>
+          </p:sp>
+          <p:cxnSp>
+            <p:nvCxnSpPr>
+              <p:cNvPr id="25" name="Straight Arrow Connector 24"/>
+              <p:cNvCxnSpPr/>
+              <p:nvPr/>
+            </p:nvCxnSpPr>
+            <p:spPr>
+              <a:xfrm flipH="1">
+                <a:off x="5232580" y="2199146"/>
+                <a:ext cx="2517" cy="837156"/>
+              </a:xfrm>
+              <a:prstGeom prst="straightConnector1">
+                <a:avLst/>
+              </a:prstGeom>
+              <a:ln w="38100">
+                <a:solidFill>
+                  <a:schemeClr val="tx1"/>
+                </a:solidFill>
+                <a:tailEnd type="triangle"/>
+              </a:ln>
+            </p:spPr>
+            <p:style>
+              <a:lnRef idx="1">
+                <a:schemeClr val="accent1"/>
+              </a:lnRef>
+              <a:fillRef idx="0">
+                <a:schemeClr val="accent1"/>
+              </a:fillRef>
+              <a:effectRef idx="0">
+                <a:schemeClr val="accent1"/>
+              </a:effectRef>
+              <a:fontRef idx="minor">
+                <a:schemeClr val="tx1"/>
+              </a:fontRef>
+            </p:style>
+          </p:cxnSp>
+          <p:cxnSp>
+            <p:nvCxnSpPr>
+              <p:cNvPr id="27" name="Straight Arrow Connector 26"/>
+              <p:cNvCxnSpPr/>
+              <p:nvPr/>
+            </p:nvCxnSpPr>
+            <p:spPr>
+              <a:xfrm flipV="1">
+                <a:off x="5232580" y="1306245"/>
+                <a:ext cx="533020" cy="819434"/>
+              </a:xfrm>
+              <a:prstGeom prst="straightConnector1">
+                <a:avLst/>
+              </a:prstGeom>
+              <a:ln w="38100">
+                <a:solidFill>
+                  <a:schemeClr val="tx1"/>
+                </a:solidFill>
+                <a:tailEnd type="triangle"/>
+              </a:ln>
+            </p:spPr>
+            <p:style>
+              <a:lnRef idx="1">
+                <a:schemeClr val="accent1"/>
+              </a:lnRef>
+              <a:fillRef idx="0">
+                <a:schemeClr val="accent1"/>
+              </a:fillRef>
+              <a:effectRef idx="0">
+                <a:schemeClr val="accent1"/>
+              </a:effectRef>
+              <a:fontRef idx="minor">
+                <a:schemeClr val="tx1"/>
+              </a:fontRef>
+            </p:style>
+          </p:cxnSp>
+          <mc:AlternateContent xmlns:mc="http://schemas.openxmlformats.org/markup-compatibility/2006">
+            <mc:Choice xmlns:a14="http://schemas.microsoft.com/office/drawing/2010/main" Requires="a14">
+              <p:sp>
+                <p:nvSpPr>
+                  <p:cNvPr id="31" name="TextBox 30"/>
+                  <p:cNvSpPr txBox="1"/>
+                  <p:nvPr/>
+                </p:nvSpPr>
+                <p:spPr>
+                  <a:xfrm>
+                    <a:off x="5666427" y="1472311"/>
+                    <a:ext cx="228460" cy="345159"/>
+                  </a:xfrm>
+                  <a:prstGeom prst="rect">
+                    <a:avLst/>
+                  </a:prstGeom>
+                  <a:noFill/>
+                </p:spPr>
+                <p:txBody>
+                  <a:bodyPr wrap="none" lIns="0" tIns="0" rIns="0" bIns="0" rtlCol="0">
+                    <a:spAutoFit/>
+                  </a:bodyPr>
+                  <a:lstStyle/>
+                  <a:p>
+                    <a14:m>
+                      <m:oMathPara xmlns:m="http://schemas.openxmlformats.org/officeDocument/2006/math">
+                        <m:oMathParaPr>
+                          <m:jc m:val="centerGroup"/>
+                        </m:oMathParaPr>
+                        <m:oMath xmlns:m="http://schemas.openxmlformats.org/officeDocument/2006/math">
+                          <m:acc>
+                            <m:accPr>
+                              <m:chr m:val="⃗"/>
+                              <m:ctrlPr>
+                                <a:rPr lang="en-US" sz="2000" b="0" i="1" smtClean="0">
+                                  <a:latin typeface="Cambria Math" panose="02040503050406030204" pitchFamily="18" charset="0"/>
+                                  <a:cs typeface="Arial" panose="020B0604020202020204" pitchFamily="34" charset="0"/>
+                                </a:rPr>
+                              </m:ctrlPr>
+                            </m:accPr>
+                            <m:e>
+                              <m:r>
+                                <a:rPr lang="en-US" sz="2000" b="0" i="1" smtClean="0">
+                                  <a:latin typeface="Cambria Math" panose="02040503050406030204" pitchFamily="18" charset="0"/>
+                                  <a:cs typeface="Arial" panose="020B0604020202020204" pitchFamily="34" charset="0"/>
+                                </a:rPr>
+                                <m:t>𝑇</m:t>
+                              </m:r>
+                            </m:e>
+                          </m:acc>
+                        </m:oMath>
+                      </m:oMathPara>
+                    </a14:m>
+                    <a:endParaRPr lang="en-US" sz="2000" b="0" dirty="0" smtClean="0">
+                      <a:latin typeface="Arial" panose="020B0604020202020204" pitchFamily="34" charset="0"/>
+                      <a:cs typeface="Arial" panose="020B0604020202020204" pitchFamily="34" charset="0"/>
+                    </a:endParaRPr>
+                  </a:p>
+                </p:txBody>
+              </p:sp>
+            </mc:Choice>
+            <mc:Fallback>
+              <p:sp>
+                <p:nvSpPr>
+                  <p:cNvPr id="31" name="TextBox 30"/>
+                  <p:cNvSpPr txBox="1">
+                    <a:spLocks noRot="1" noChangeAspect="1" noMove="1" noResize="1" noEditPoints="1" noAdjustHandles="1" noChangeArrowheads="1" noChangeShapeType="1" noTextEdit="1"/>
+                  </p:cNvSpPr>
+                  <p:nvPr/>
+                </p:nvSpPr>
+                <p:spPr>
+                  <a:xfrm>
+                    <a:off x="5666427" y="1472311"/>
+                    <a:ext cx="228460" cy="345159"/>
+                  </a:xfrm>
+                  <a:prstGeom prst="rect">
+                    <a:avLst/>
+                  </a:prstGeom>
+                  <a:blipFill>
+                    <a:blip r:embed="rId6"/>
+                    <a:stretch>
+                      <a:fillRect l="-24324" r="-21622" b="-8929"/>
+                    </a:stretch>
+                  </a:blipFill>
+                </p:spPr>
+                <p:txBody>
+                  <a:bodyPr/>
+                  <a:lstStyle/>
+                  <a:p>
+                    <a:r>
+                      <a:rPr lang="en-US">
+                        <a:noFill/>
+                      </a:rPr>
+                      <a:t> </a:t>
+                    </a:r>
+                  </a:p>
+                </p:txBody>
+              </p:sp>
+            </mc:Fallback>
+          </mc:AlternateContent>
+          <mc:AlternateContent xmlns:mc="http://schemas.openxmlformats.org/markup-compatibility/2006">
+            <mc:Choice xmlns:a14="http://schemas.microsoft.com/office/drawing/2010/main" Requires="a14">
+              <p:sp>
+                <p:nvSpPr>
+                  <p:cNvPr id="32" name="TextBox 31"/>
+                  <p:cNvSpPr txBox="1"/>
+                  <p:nvPr/>
+                </p:nvSpPr>
+                <p:spPr>
+                  <a:xfrm>
+                    <a:off x="4808277" y="2523605"/>
+                    <a:ext cx="303865" cy="377219"/>
+                  </a:xfrm>
+                  <a:prstGeom prst="rect">
+                    <a:avLst/>
+                  </a:prstGeom>
+                  <a:noFill/>
+                </p:spPr>
+                <p:txBody>
+                  <a:bodyPr wrap="none" lIns="0" tIns="0" rIns="0" bIns="0" rtlCol="0">
+                    <a:spAutoFit/>
+                  </a:bodyPr>
+                  <a:lstStyle/>
+                  <a:p>
+                    <a14:m>
+                      <m:oMathPara xmlns:m="http://schemas.openxmlformats.org/officeDocument/2006/math">
+                        <m:oMathParaPr>
+                          <m:jc m:val="centerGroup"/>
+                        </m:oMathParaPr>
+                        <m:oMath xmlns:m="http://schemas.openxmlformats.org/officeDocument/2006/math">
+                          <m:sSub>
+                            <m:sSubPr>
+                              <m:ctrlPr>
+                                <a:rPr lang="en-US" sz="2000" b="0" i="1" smtClean="0">
+                                  <a:latin typeface="Cambria Math" panose="02040503050406030204" pitchFamily="18" charset="0"/>
+                                  <a:cs typeface="Arial" panose="020B0604020202020204" pitchFamily="34" charset="0"/>
+                                </a:rPr>
+                              </m:ctrlPr>
+                            </m:sSubPr>
+                            <m:e>
+                              <m:acc>
+                                <m:accPr>
+                                  <m:chr m:val="⃗"/>
+                                  <m:ctrlPr>
+                                    <a:rPr lang="en-US" sz="2000" b="0" i="1" smtClean="0">
+                                      <a:latin typeface="Cambria Math" panose="02040503050406030204" pitchFamily="18" charset="0"/>
+                                      <a:cs typeface="Arial" panose="020B0604020202020204" pitchFamily="34" charset="0"/>
+                                    </a:rPr>
+                                  </m:ctrlPr>
+                                </m:accPr>
+                                <m:e>
+                                  <m:r>
+                                    <a:rPr lang="en-US" sz="2000" b="0" i="1" smtClean="0">
+                                      <a:latin typeface="Cambria Math" panose="02040503050406030204" pitchFamily="18" charset="0"/>
+                                      <a:cs typeface="Arial" panose="020B0604020202020204" pitchFamily="34" charset="0"/>
+                                    </a:rPr>
+                                    <m:t>𝐹</m:t>
+                                  </m:r>
+                                </m:e>
+                              </m:acc>
+                            </m:e>
+                            <m:sub>
+                              <m:r>
+                                <a:rPr lang="en-US" sz="2000" b="0" i="1" smtClean="0">
+                                  <a:latin typeface="Cambria Math" panose="02040503050406030204" pitchFamily="18" charset="0"/>
+                                  <a:cs typeface="Arial" panose="020B0604020202020204" pitchFamily="34" charset="0"/>
+                                </a:rPr>
+                                <m:t>𝑔</m:t>
+                              </m:r>
+                            </m:sub>
+                          </m:sSub>
+                        </m:oMath>
+                      </m:oMathPara>
+                    </a14:m>
+                    <a:endParaRPr lang="en-US" sz="2000" dirty="0" smtClean="0">
+                      <a:latin typeface="Arial" panose="020B0604020202020204" pitchFamily="34" charset="0"/>
+                      <a:cs typeface="Arial" panose="020B0604020202020204" pitchFamily="34" charset="0"/>
+                    </a:endParaRPr>
+                  </a:p>
+                </p:txBody>
+              </p:sp>
+            </mc:Choice>
+            <mc:Fallback>
+              <p:sp>
+                <p:nvSpPr>
+                  <p:cNvPr id="32" name="TextBox 31"/>
+                  <p:cNvSpPr txBox="1">
+                    <a:spLocks noRot="1" noChangeAspect="1" noMove="1" noResize="1" noEditPoints="1" noAdjustHandles="1" noChangeArrowheads="1" noChangeShapeType="1" noTextEdit="1"/>
+                  </p:cNvSpPr>
+                  <p:nvPr/>
+                </p:nvSpPr>
+                <p:spPr>
+                  <a:xfrm>
+                    <a:off x="4808277" y="2523605"/>
+                    <a:ext cx="303865" cy="377219"/>
+                  </a:xfrm>
+                  <a:prstGeom prst="rect">
+                    <a:avLst/>
+                  </a:prstGeom>
+                  <a:blipFill>
+                    <a:blip r:embed="rId7"/>
+                    <a:stretch>
+                      <a:fillRect l="-18000" t="-32258" r="-70000" b="-17742"/>
+                    </a:stretch>
+                  </a:blipFill>
+                </p:spPr>
+                <p:txBody>
+                  <a:bodyPr/>
+                  <a:lstStyle/>
+                  <a:p>
+                    <a:r>
+                      <a:rPr lang="en-US">
+                        <a:noFill/>
+                      </a:rPr>
+                      <a:t> </a:t>
+                    </a:r>
+                  </a:p>
+                </p:txBody>
+              </p:sp>
+            </mc:Fallback>
+          </mc:AlternateContent>
+          <p:sp>
+            <p:nvSpPr>
+              <p:cNvPr id="33" name="Right Arrow 32"/>
+              <p:cNvSpPr/>
+              <p:nvPr/>
+            </p:nvSpPr>
+            <p:spPr>
+              <a:xfrm>
+                <a:off x="5126077" y="991587"/>
+                <a:ext cx="700928" cy="118979"/>
+              </a:xfrm>
+              <a:prstGeom prst="rightArrow">
+                <a:avLst/>
+              </a:prstGeom>
+              <a:solidFill>
+                <a:schemeClr val="tx1"/>
+              </a:solidFill>
+              <a:ln w="38100">
+                <a:solidFill>
+                  <a:schemeClr val="tx1"/>
+                </a:solidFill>
+              </a:ln>
+            </p:spPr>
+            <p:style>
+              <a:lnRef idx="2">
+                <a:schemeClr val="accent1">
+                  <a:shade val="50000"/>
+                </a:schemeClr>
+              </a:lnRef>
+              <a:fillRef idx="1">
+                <a:schemeClr val="accent1"/>
+              </a:fillRef>
+              <a:effectRef idx="0">
+                <a:schemeClr val="accent1"/>
+              </a:effectRef>
+              <a:fontRef idx="minor">
+                <a:schemeClr val="lt1"/>
+              </a:fontRef>
+            </p:style>
+            <p:txBody>
+              <a:bodyPr rtlCol="0" anchor="ctr"/>
+              <a:lstStyle/>
+              <a:p>
+                <a:pPr algn="ctr"/>
+                <a:endParaRPr lang="en-US" dirty="0"/>
+              </a:p>
+            </p:txBody>
+          </p:sp>
+          <mc:AlternateContent xmlns:mc="http://schemas.openxmlformats.org/markup-compatibility/2006">
+            <mc:Choice xmlns:a14="http://schemas.microsoft.com/office/drawing/2010/main" Requires="a14">
+              <p:sp>
+                <p:nvSpPr>
+                  <p:cNvPr id="34" name="TextBox 33"/>
+                  <p:cNvSpPr txBox="1"/>
+                  <p:nvPr/>
+                </p:nvSpPr>
+                <p:spPr>
+                  <a:xfrm>
+                    <a:off x="5366799" y="717932"/>
+                    <a:ext cx="219483" cy="307777"/>
+                  </a:xfrm>
+                  <a:prstGeom prst="rect">
+                    <a:avLst/>
+                  </a:prstGeom>
+                  <a:noFill/>
+                </p:spPr>
+                <p:txBody>
+                  <a:bodyPr wrap="none" lIns="0" tIns="0" rIns="0" bIns="0" rtlCol="0">
+                    <a:spAutoFit/>
+                  </a:bodyPr>
+                  <a:lstStyle/>
+                  <a:p>
+                    <a14:m>
+                      <m:oMathPara xmlns:m="http://schemas.openxmlformats.org/officeDocument/2006/math">
+                        <m:oMathParaPr>
+                          <m:jc m:val="centerGroup"/>
+                        </m:oMathParaPr>
+                        <m:oMath xmlns:m="http://schemas.openxmlformats.org/officeDocument/2006/math">
+                          <m:acc>
+                            <m:accPr>
+                              <m:chr m:val="⃗"/>
+                              <m:ctrlPr>
+                                <a:rPr lang="en-US" sz="2000" b="0" i="1" smtClean="0">
+                                  <a:latin typeface="Cambria Math" panose="02040503050406030204" pitchFamily="18" charset="0"/>
+                                  <a:cs typeface="Arial" panose="020B0604020202020204" pitchFamily="34" charset="0"/>
+                                </a:rPr>
+                              </m:ctrlPr>
+                            </m:accPr>
+                            <m:e>
+                              <m:r>
+                                <a:rPr lang="en-US" sz="2000" b="0" i="1" smtClean="0">
+                                  <a:latin typeface="Cambria Math" panose="02040503050406030204" pitchFamily="18" charset="0"/>
+                                  <a:cs typeface="Arial" panose="020B0604020202020204" pitchFamily="34" charset="0"/>
+                                </a:rPr>
+                                <m:t>𝑎</m:t>
+                              </m:r>
+                            </m:e>
+                          </m:acc>
+                        </m:oMath>
+                      </m:oMathPara>
+                    </a14:m>
+                    <a:endParaRPr lang="en-US" sz="2000" dirty="0" smtClean="0">
+                      <a:latin typeface="Arial" panose="020B0604020202020204" pitchFamily="34" charset="0"/>
+                      <a:cs typeface="Arial" panose="020B0604020202020204" pitchFamily="34" charset="0"/>
+                    </a:endParaRPr>
+                  </a:p>
+                </p:txBody>
+              </p:sp>
+            </mc:Choice>
+            <mc:Fallback>
+              <p:sp>
+                <p:nvSpPr>
+                  <p:cNvPr id="34" name="TextBox 33"/>
+                  <p:cNvSpPr txBox="1">
+                    <a:spLocks noRot="1" noChangeAspect="1" noMove="1" noResize="1" noEditPoints="1" noAdjustHandles="1" noChangeArrowheads="1" noChangeShapeType="1" noTextEdit="1"/>
+                  </p:cNvSpPr>
+                  <p:nvPr/>
+                </p:nvSpPr>
+                <p:spPr>
+                  <a:xfrm>
+                    <a:off x="5366799" y="717932"/>
+                    <a:ext cx="219483" cy="307777"/>
+                  </a:xfrm>
+                  <a:prstGeom prst="rect">
+                    <a:avLst/>
+                  </a:prstGeom>
+                  <a:blipFill>
+                    <a:blip r:embed="rId8"/>
+                    <a:stretch>
+                      <a:fillRect l="-19444" t="-36000" r="-94444" b="-6000"/>
+                    </a:stretch>
+                  </a:blipFill>
+                </p:spPr>
+                <p:txBody>
+                  <a:bodyPr/>
+                  <a:lstStyle/>
+                  <a:p>
+                    <a:r>
+                      <a:rPr lang="en-US">
+                        <a:noFill/>
+                      </a:rPr>
+                      <a:t> </a:t>
+                    </a:r>
+                  </a:p>
+                </p:txBody>
+              </p:sp>
+            </mc:Fallback>
+          </mc:AlternateContent>
+          <p:grpSp>
+            <p:nvGrpSpPr>
+              <p:cNvPr id="35" name="Group 34"/>
+              <p:cNvGrpSpPr/>
+              <p:nvPr/>
+            </p:nvGrpSpPr>
+            <p:grpSpPr>
+              <a:xfrm>
+                <a:off x="4061420" y="2408899"/>
+                <a:ext cx="898789" cy="709995"/>
+                <a:chOff x="758520" y="708040"/>
+                <a:chExt cx="2596102" cy="2135605"/>
+              </a:xfrm>
+            </p:grpSpPr>
+            <p:grpSp>
+              <p:nvGrpSpPr>
+                <p:cNvPr id="36" name="Group 35"/>
+                <p:cNvGrpSpPr/>
+                <p:nvPr/>
+              </p:nvGrpSpPr>
+              <p:grpSpPr>
+                <a:xfrm>
+                  <a:off x="758520" y="708040"/>
+                  <a:ext cx="2596102" cy="2135605"/>
+                  <a:chOff x="785815" y="680744"/>
+                  <a:chExt cx="2596102" cy="2135605"/>
+                </a:xfrm>
+              </p:grpSpPr>
+              <p:cxnSp>
+                <p:nvCxnSpPr>
+                  <p:cNvPr id="38" name="Straight Arrow Connector 37"/>
+                  <p:cNvCxnSpPr/>
+                  <p:nvPr/>
+                </p:nvCxnSpPr>
+                <p:spPr>
+                  <a:xfrm flipV="1">
+                    <a:off x="1516583" y="680744"/>
+                    <a:ext cx="7683" cy="1859535"/>
+                  </a:xfrm>
+                  <a:prstGeom prst="straightConnector1">
+                    <a:avLst/>
+                  </a:prstGeom>
+                  <a:ln w="38100">
+                    <a:solidFill>
+                      <a:schemeClr val="tx1"/>
+                    </a:solidFill>
+                    <a:tailEnd type="triangle"/>
+                  </a:ln>
+                </p:spPr>
+                <p:style>
+                  <a:lnRef idx="1">
+                    <a:schemeClr val="accent1"/>
+                  </a:lnRef>
+                  <a:fillRef idx="0">
+                    <a:schemeClr val="accent1"/>
+                  </a:fillRef>
+                  <a:effectRef idx="0">
+                    <a:schemeClr val="accent1"/>
+                  </a:effectRef>
+                  <a:fontRef idx="minor">
+                    <a:schemeClr val="tx1"/>
+                  </a:fontRef>
+                </p:style>
+              </p:cxnSp>
+              <p:cxnSp>
+                <p:nvCxnSpPr>
+                  <p:cNvPr id="39" name="Straight Arrow Connector 38"/>
+                  <p:cNvCxnSpPr/>
+                  <p:nvPr/>
+                </p:nvCxnSpPr>
+                <p:spPr>
+                  <a:xfrm flipV="1">
+                    <a:off x="1507013" y="2535259"/>
+                    <a:ext cx="1874904" cy="1"/>
+                  </a:xfrm>
+                  <a:prstGeom prst="straightConnector1">
+                    <a:avLst/>
+                  </a:prstGeom>
+                  <a:ln w="38100">
+                    <a:solidFill>
+                      <a:schemeClr val="tx1"/>
+                    </a:solidFill>
+                    <a:tailEnd type="triangle"/>
+                  </a:ln>
+                </p:spPr>
+                <p:style>
+                  <a:lnRef idx="1">
+                    <a:schemeClr val="accent1"/>
+                  </a:lnRef>
+                  <a:fillRef idx="0">
+                    <a:schemeClr val="accent1"/>
+                  </a:fillRef>
+                  <a:effectRef idx="0">
+                    <a:schemeClr val="accent1"/>
+                  </a:effectRef>
+                  <a:fontRef idx="minor">
+                    <a:schemeClr val="tx1"/>
+                  </a:fontRef>
+                </p:style>
+              </p:cxnSp>
+              <mc:AlternateContent xmlns:mc="http://schemas.openxmlformats.org/markup-compatibility/2006" xmlns:a14="http://schemas.microsoft.com/office/drawing/2010/main">
+                <mc:Choice Requires="a14">
+                  <p:sp>
+                    <p:nvSpPr>
+                      <p:cNvPr id="40" name="Rectangle 39"/>
+                      <p:cNvSpPr/>
+                      <p:nvPr/>
+                    </p:nvSpPr>
+                    <p:spPr>
+                      <a:xfrm>
+                        <a:off x="2697555" y="2447016"/>
+                        <a:ext cx="367985" cy="369333"/>
+                      </a:xfrm>
+                      <a:prstGeom prst="rect">
+                        <a:avLst/>
+                      </a:prstGeom>
+                    </p:spPr>
+                    <p:txBody>
+                      <a:bodyPr wrap="none">
+                        <a:spAutoFit/>
+                      </a:bodyPr>
+                      <a:lstStyle/>
+                      <a:p>
+                        <a:pPr/>
+                        <a14:m>
+                          <m:oMathPara xmlns:m="http://schemas.openxmlformats.org/officeDocument/2006/math">
+                            <m:oMathParaPr>
+                              <m:jc m:val="centerGroup"/>
+                            </m:oMathParaPr>
+                            <m:oMath xmlns:m="http://schemas.openxmlformats.org/officeDocument/2006/math">
+                              <m:r>
+                                <a:rPr lang="en-US" i="1">
+                                  <a:latin typeface="Cambria Math" panose="02040503050406030204" pitchFamily="18" charset="0"/>
+                                  <a:cs typeface="Arial" panose="020B0604020202020204" pitchFamily="34" charset="0"/>
+                                </a:rPr>
+                                <m:t>𝑥</m:t>
+                              </m:r>
+                            </m:oMath>
+                          </m:oMathPara>
+                        </a14:m>
+                        <a:endParaRPr lang="en-CA" dirty="0"/>
+                      </a:p>
+                    </p:txBody>
+                  </p:sp>
+                </mc:Choice>
+                <mc:Fallback xmlns="">
+                  <p:sp>
+                    <p:nvSpPr>
+                      <p:cNvPr id="107" name="Rectangle 106"/>
+                      <p:cNvSpPr>
+                        <a:spLocks noRot="1" noChangeAspect="1" noMove="1" noResize="1" noEditPoints="1" noAdjustHandles="1" noChangeArrowheads="1" noChangeShapeType="1" noTextEdit="1"/>
+                      </p:cNvSpPr>
+                      <p:nvPr/>
+                    </p:nvSpPr>
+                    <p:spPr>
+                      <a:xfrm>
+                        <a:off x="2697555" y="2447016"/>
+                        <a:ext cx="367985" cy="369333"/>
+                      </a:xfrm>
+                      <a:prstGeom prst="rect">
+                        <a:avLst/>
+                      </a:prstGeom>
+                      <a:blipFill>
+                        <a:blip r:embed="rId27"/>
+                        <a:stretch>
+                          <a:fillRect r="-95238" b="-160000"/>
+                        </a:stretch>
+                      </a:blipFill>
+                    </p:spPr>
+                    <p:txBody>
+                      <a:bodyPr/>
+                      <a:lstStyle/>
+                      <a:p>
+                        <a:r>
+                          <a:rPr lang="en-US">
+                            <a:noFill/>
+                          </a:rPr>
+                          <a:t> </a:t>
+                        </a:r>
+                      </a:p>
+                    </p:txBody>
+                  </p:sp>
+                </mc:Fallback>
+              </mc:AlternateContent>
+              <mc:AlternateContent xmlns:mc="http://schemas.openxmlformats.org/markup-compatibility/2006" xmlns:a14="http://schemas.microsoft.com/office/drawing/2010/main">
+                <mc:Choice Requires="a14">
+                  <p:sp>
+                    <p:nvSpPr>
+                      <p:cNvPr id="41" name="Rectangle 40"/>
+                      <p:cNvSpPr/>
+                      <p:nvPr/>
+                    </p:nvSpPr>
+                    <p:spPr>
+                      <a:xfrm>
+                        <a:off x="785815" y="912420"/>
+                        <a:ext cx="371385" cy="369333"/>
+                      </a:xfrm>
+                      <a:prstGeom prst="rect">
+                        <a:avLst/>
+                      </a:prstGeom>
+                    </p:spPr>
+                    <p:txBody>
+                      <a:bodyPr wrap="none">
+                        <a:spAutoFit/>
+                      </a:bodyPr>
+                      <a:lstStyle/>
+                      <a:p>
+                        <a:pPr/>
+                        <a14:m>
+                          <m:oMathPara xmlns:m="http://schemas.openxmlformats.org/officeDocument/2006/math">
+                            <m:oMathParaPr>
+                              <m:jc m:val="centerGroup"/>
+                            </m:oMathParaPr>
+                            <m:oMath xmlns:m="http://schemas.openxmlformats.org/officeDocument/2006/math">
+                              <m:r>
+                                <a:rPr lang="en-US" b="0" i="1" smtClean="0">
+                                  <a:latin typeface="Cambria Math" panose="02040503050406030204" pitchFamily="18" charset="0"/>
+                                </a:rPr>
+                                <m:t>𝑦</m:t>
+                              </m:r>
+                            </m:oMath>
+                          </m:oMathPara>
+                        </a14:m>
+                        <a:endParaRPr lang="en-CA" dirty="0"/>
+                      </a:p>
+                    </p:txBody>
+                  </p:sp>
+                </mc:Choice>
+                <mc:Fallback xmlns="">
+                  <p:sp>
+                    <p:nvSpPr>
+                      <p:cNvPr id="108" name="Rectangle 107"/>
+                      <p:cNvSpPr>
+                        <a:spLocks noRot="1" noChangeAspect="1" noMove="1" noResize="1" noEditPoints="1" noAdjustHandles="1" noChangeArrowheads="1" noChangeShapeType="1" noTextEdit="1"/>
+                      </p:cNvSpPr>
+                      <p:nvPr/>
+                    </p:nvSpPr>
+                    <p:spPr>
+                      <a:xfrm>
+                        <a:off x="785815" y="912420"/>
+                        <a:ext cx="371385" cy="369333"/>
+                      </a:xfrm>
+                      <a:prstGeom prst="rect">
+                        <a:avLst/>
+                      </a:prstGeom>
+                      <a:blipFill>
+                        <a:blip r:embed="rId28"/>
+                        <a:stretch>
+                          <a:fillRect l="-19048" r="-114286" b="-220000"/>
+                        </a:stretch>
+                      </a:blipFill>
+                    </p:spPr>
+                    <p:txBody>
+                      <a:bodyPr/>
+                      <a:lstStyle/>
+                      <a:p>
+                        <a:r>
+                          <a:rPr lang="en-US">
+                            <a:noFill/>
+                          </a:rPr>
+                          <a:t> </a:t>
+                        </a:r>
+                      </a:p>
+                    </p:txBody>
+                  </p:sp>
+                </mc:Fallback>
+              </mc:AlternateContent>
+              <mc:AlternateContent xmlns:mc="http://schemas.openxmlformats.org/markup-compatibility/2006" xmlns:a14="http://schemas.microsoft.com/office/drawing/2010/main">
+                <mc:Choice Requires="a14">
+                  <p:sp>
+                    <p:nvSpPr>
+                      <p:cNvPr id="42" name="Rectangle 41"/>
+                      <p:cNvSpPr/>
+                      <p:nvPr/>
+                    </p:nvSpPr>
+                    <p:spPr>
+                      <a:xfrm>
+                        <a:off x="1006642" y="2350591"/>
+                        <a:ext cx="367985" cy="369333"/>
+                      </a:xfrm>
+                      <a:prstGeom prst="rect">
+                        <a:avLst/>
+                      </a:prstGeom>
+                    </p:spPr>
+                    <p:txBody>
+                      <a:bodyPr wrap="none">
+                        <a:spAutoFit/>
+                      </a:bodyPr>
+                      <a:lstStyle/>
+                      <a:p>
+                        <a:pPr/>
+                        <a14:m>
+                          <m:oMathPara xmlns:m="http://schemas.openxmlformats.org/officeDocument/2006/math">
+                            <m:oMathParaPr>
+                              <m:jc m:val="centerGroup"/>
+                            </m:oMathParaPr>
+                            <m:oMath xmlns:m="http://schemas.openxmlformats.org/officeDocument/2006/math">
+                              <m:r>
+                                <a:rPr lang="en-US" b="0" i="1" smtClean="0">
+                                  <a:latin typeface="Cambria Math" panose="02040503050406030204" pitchFamily="18" charset="0"/>
+                                  <a:cs typeface="Arial" panose="020B0604020202020204" pitchFamily="34" charset="0"/>
+                                </a:rPr>
+                                <m:t>0</m:t>
+                              </m:r>
+                            </m:oMath>
+                          </m:oMathPara>
+                        </a14:m>
+                        <a:endParaRPr lang="en-CA" dirty="0"/>
+                      </a:p>
+                    </p:txBody>
+                  </p:sp>
+                </mc:Choice>
+                <mc:Fallback xmlns="">
+                  <p:sp>
+                    <p:nvSpPr>
+                      <p:cNvPr id="109" name="Rectangle 108"/>
+                      <p:cNvSpPr>
+                        <a:spLocks noRot="1" noChangeAspect="1" noMove="1" noResize="1" noEditPoints="1" noAdjustHandles="1" noChangeArrowheads="1" noChangeShapeType="1" noTextEdit="1"/>
+                      </p:cNvSpPr>
+                      <p:nvPr/>
+                    </p:nvSpPr>
+                    <p:spPr>
+                      <a:xfrm>
+                        <a:off x="1006642" y="2350591"/>
+                        <a:ext cx="367985" cy="369333"/>
+                      </a:xfrm>
+                      <a:prstGeom prst="rect">
+                        <a:avLst/>
+                      </a:prstGeom>
+                      <a:blipFill>
+                        <a:blip r:embed="rId29"/>
+                        <a:stretch>
+                          <a:fillRect l="-14286" r="-114286" b="-180000"/>
+                        </a:stretch>
+                      </a:blipFill>
+                    </p:spPr>
+                    <p:txBody>
+                      <a:bodyPr/>
+                      <a:lstStyle/>
+                      <a:p>
+                        <a:r>
+                          <a:rPr lang="en-US">
+                            <a:noFill/>
+                          </a:rPr>
+                          <a:t> </a:t>
+                        </a:r>
+                      </a:p>
+                    </p:txBody>
+                  </p:sp>
+                </mc:Fallback>
+              </mc:AlternateContent>
+            </p:grpSp>
+            <p:sp>
+              <p:nvSpPr>
+                <p:cNvPr id="37" name="Rectangle 36"/>
+                <p:cNvSpPr/>
+                <p:nvPr/>
+              </p:nvSpPr>
+              <p:spPr>
+                <a:xfrm>
+                  <a:off x="1129904" y="1614682"/>
+                  <a:ext cx="184731" cy="369332"/>
+                </a:xfrm>
+                <a:prstGeom prst="rect">
+                  <a:avLst/>
+                </a:prstGeom>
+              </p:spPr>
+              <p:txBody>
+                <a:bodyPr wrap="none">
+                  <a:spAutoFit/>
+                </a:bodyPr>
+                <a:lstStyle/>
+                <a:p>
+                  <a:endParaRPr lang="en-CA" dirty="0"/>
+                </a:p>
+              </p:txBody>
+            </p:sp>
+          </p:grpSp>
+        </p:grpSp>
+        <p:cxnSp>
+          <p:nvCxnSpPr>
+            <p:cNvPr id="45" name="Straight Connector 44"/>
+            <p:cNvCxnSpPr/>
+            <p:nvPr/>
+          </p:nvCxnSpPr>
+          <p:spPr>
+            <a:xfrm flipH="1">
+              <a:off x="5217524" y="1215342"/>
+              <a:ext cx="2658" cy="907284"/>
+            </a:xfrm>
+            <a:prstGeom prst="line">
+              <a:avLst/>
+            </a:prstGeom>
+            <a:ln w="28575">
+              <a:solidFill>
+                <a:schemeClr val="tx1"/>
+              </a:solidFill>
+              <a:prstDash val="sysDot"/>
+            </a:ln>
+          </p:spPr>
+          <p:style>
+            <a:lnRef idx="1">
+              <a:schemeClr val="accent1"/>
+            </a:lnRef>
+            <a:fillRef idx="0">
+              <a:schemeClr val="accent1"/>
+            </a:fillRef>
+            <a:effectRef idx="0">
+              <a:schemeClr val="accent1"/>
+            </a:effectRef>
+            <a:fontRef idx="minor">
+              <a:schemeClr val="tx1"/>
+            </a:fontRef>
+          </p:style>
+        </p:cxnSp>
+        <mc:AlternateContent xmlns:mc="http://schemas.openxmlformats.org/markup-compatibility/2006">
+          <mc:Choice xmlns:a14="http://schemas.microsoft.com/office/drawing/2010/main" Requires="a14">
+            <p:sp>
+              <p:nvSpPr>
+                <p:cNvPr id="47" name="TextBox 46"/>
+                <p:cNvSpPr txBox="1"/>
+                <p:nvPr/>
+              </p:nvSpPr>
+              <p:spPr>
+                <a:xfrm>
+                  <a:off x="5241950" y="1519875"/>
+                  <a:ext cx="222304" cy="307777"/>
+                </a:xfrm>
+                <a:prstGeom prst="rect">
+                  <a:avLst/>
+                </a:prstGeom>
+                <a:noFill/>
+              </p:spPr>
+              <p:txBody>
+                <a:bodyPr wrap="none" lIns="0" tIns="0" rIns="0" bIns="0" rtlCol="0">
+                  <a:spAutoFit/>
+                </a:bodyPr>
+                <a:lstStyle/>
+                <a:p>
+                  <a14:m>
+                    <m:oMathPara xmlns:m="http://schemas.openxmlformats.org/officeDocument/2006/math">
+                      <m:oMathParaPr>
+                        <m:jc m:val="centerGroup"/>
+                      </m:oMathParaPr>
+                      <m:oMath xmlns:m="http://schemas.openxmlformats.org/officeDocument/2006/math">
+                        <m:r>
+                          <a:rPr lang="en-US" sz="2000" b="0" i="1" smtClean="0">
+                            <a:latin typeface="Cambria Math" panose="02040503050406030204" pitchFamily="18" charset="0"/>
+                            <a:cs typeface="Arial" panose="020B0604020202020204" pitchFamily="34" charset="0"/>
+                          </a:rPr>
+                          <m:t>𝜃</m:t>
+                        </m:r>
+                      </m:oMath>
+                    </m:oMathPara>
+                  </a14:m>
+                  <a:endParaRPr lang="en-US" sz="2000" dirty="0" smtClean="0">
+                    <a:latin typeface="Arial" panose="020B0604020202020204" pitchFamily="34" charset="0"/>
+                    <a:cs typeface="Arial" panose="020B0604020202020204" pitchFamily="34" charset="0"/>
+                  </a:endParaRPr>
+                </a:p>
+              </p:txBody>
+            </p:sp>
+          </mc:Choice>
+          <mc:Fallback>
+            <p:sp>
+              <p:nvSpPr>
+                <p:cNvPr id="47" name="TextBox 46"/>
+                <p:cNvSpPr txBox="1">
+                  <a:spLocks noRot="1" noChangeAspect="1" noMove="1" noResize="1" noEditPoints="1" noAdjustHandles="1" noChangeArrowheads="1" noChangeShapeType="1" noTextEdit="1"/>
+                </p:cNvSpPr>
+                <p:nvPr/>
+              </p:nvSpPr>
+              <p:spPr>
+                <a:xfrm>
+                  <a:off x="5241950" y="1519875"/>
+                  <a:ext cx="222304" cy="307777"/>
+                </a:xfrm>
+                <a:prstGeom prst="rect">
+                  <a:avLst/>
+                </a:prstGeom>
+                <a:blipFill>
+                  <a:blip r:embed="rId30"/>
+                  <a:stretch>
+                    <a:fillRect l="-25000" r="-25000" b="-9804"/>
+                  </a:stretch>
+                </a:blipFill>
+              </p:spPr>
+              <p:txBody>
+                <a:bodyPr/>
+                <a:lstStyle/>
+                <a:p>
+                  <a:r>
+                    <a:rPr lang="en-US">
+                      <a:noFill/>
+                    </a:rPr>
+                    <a:t> </a:t>
+                  </a:r>
+                </a:p>
+              </p:txBody>
+            </p:sp>
+          </mc:Fallback>
+        </mc:AlternateContent>
+      </p:grpSp>
+      <p:grpSp>
+        <p:nvGrpSpPr>
+          <p:cNvPr id="75" name="Group 74"/>
+          <p:cNvGrpSpPr/>
+          <p:nvPr/>
+        </p:nvGrpSpPr>
+        <p:grpSpPr>
+          <a:xfrm>
+            <a:off x="7145572" y="904485"/>
+            <a:ext cx="2514214" cy="2240542"/>
+            <a:chOff x="7145572" y="904485"/>
+            <a:chExt cx="2514214" cy="2240542"/>
+          </a:xfrm>
+        </p:grpSpPr>
+        <p:grpSp>
+          <p:nvGrpSpPr>
+            <p:cNvPr id="73" name="Group 72"/>
+            <p:cNvGrpSpPr/>
+            <p:nvPr/>
+          </p:nvGrpSpPr>
+          <p:grpSpPr>
+            <a:xfrm>
+              <a:off x="7246575" y="1241475"/>
+              <a:ext cx="1833467" cy="1903552"/>
+              <a:chOff x="7246575" y="1241475"/>
+              <a:chExt cx="1833467" cy="1903552"/>
+            </a:xfrm>
+          </p:grpSpPr>
+          <p:grpSp>
+            <p:nvGrpSpPr>
+              <p:cNvPr id="50" name="Group 49"/>
+              <p:cNvGrpSpPr/>
+              <p:nvPr/>
+            </p:nvGrpSpPr>
+            <p:grpSpPr>
+              <a:xfrm>
+                <a:off x="7246575" y="1241475"/>
+                <a:ext cx="1833467" cy="1903552"/>
+                <a:chOff x="4061420" y="1215342"/>
+                <a:chExt cx="1833467" cy="1903552"/>
+              </a:xfrm>
+            </p:grpSpPr>
+            <p:grpSp>
+              <p:nvGrpSpPr>
+                <p:cNvPr id="51" name="Group 50"/>
+                <p:cNvGrpSpPr/>
+                <p:nvPr/>
+              </p:nvGrpSpPr>
+              <p:grpSpPr>
+                <a:xfrm>
+                  <a:off x="4061420" y="1306245"/>
+                  <a:ext cx="1833467" cy="1812649"/>
+                  <a:chOff x="4061420" y="1306245"/>
+                  <a:chExt cx="1833467" cy="1812649"/>
+                </a:xfrm>
+              </p:grpSpPr>
+              <p:sp>
+                <p:nvSpPr>
+                  <p:cNvPr id="54" name="Oval 53"/>
+                  <p:cNvSpPr/>
+                  <p:nvPr/>
+                </p:nvSpPr>
+                <p:spPr>
+                  <a:xfrm>
+                    <a:off x="5172109" y="2079380"/>
+                    <a:ext cx="120943" cy="119766"/>
+                  </a:xfrm>
+                  <a:prstGeom prst="ellipse">
+                    <a:avLst/>
+                  </a:prstGeom>
+                  <a:solidFill>
+                    <a:schemeClr val="tx1"/>
+                  </a:solidFill>
+                  <a:ln w="38100">
+                    <a:solidFill>
+                      <a:schemeClr val="tx1"/>
+                    </a:solidFill>
+                  </a:ln>
+                </p:spPr>
+                <p:style>
+                  <a:lnRef idx="2">
+                    <a:schemeClr val="accent1">
+                      <a:shade val="50000"/>
+                    </a:schemeClr>
+                  </a:lnRef>
+                  <a:fillRef idx="1">
+                    <a:schemeClr val="accent1"/>
+                  </a:fillRef>
+                  <a:effectRef idx="0">
+                    <a:schemeClr val="accent1"/>
+                  </a:effectRef>
+                  <a:fontRef idx="minor">
+                    <a:schemeClr val="lt1"/>
+                  </a:fontRef>
+                </p:style>
+                <p:txBody>
+                  <a:bodyPr rtlCol="0" anchor="ctr"/>
+                  <a:lstStyle/>
+                  <a:p>
+                    <a:pPr algn="ctr"/>
+                    <a:endParaRPr lang="en-US"/>
+                  </a:p>
+                </p:txBody>
+              </p:sp>
+              <p:cxnSp>
+                <p:nvCxnSpPr>
+                  <p:cNvPr id="55" name="Straight Arrow Connector 54"/>
+                  <p:cNvCxnSpPr/>
+                  <p:nvPr/>
+                </p:nvCxnSpPr>
+                <p:spPr>
+                  <a:xfrm flipH="1">
+                    <a:off x="5232580" y="2199146"/>
+                    <a:ext cx="2517" cy="837156"/>
+                  </a:xfrm>
+                  <a:prstGeom prst="straightConnector1">
+                    <a:avLst/>
+                  </a:prstGeom>
+                  <a:ln w="38100">
+                    <a:solidFill>
+                      <a:schemeClr val="tx1"/>
+                    </a:solidFill>
+                    <a:tailEnd type="triangle"/>
+                  </a:ln>
+                </p:spPr>
+                <p:style>
+                  <a:lnRef idx="1">
+                    <a:schemeClr val="accent1"/>
+                  </a:lnRef>
+                  <a:fillRef idx="0">
+                    <a:schemeClr val="accent1"/>
+                  </a:fillRef>
+                  <a:effectRef idx="0">
+                    <a:schemeClr val="accent1"/>
+                  </a:effectRef>
+                  <a:fontRef idx="minor">
+                    <a:schemeClr val="tx1"/>
+                  </a:fontRef>
+                </p:style>
+              </p:cxnSp>
+              <p:cxnSp>
+                <p:nvCxnSpPr>
+                  <p:cNvPr id="56" name="Straight Arrow Connector 55"/>
+                  <p:cNvCxnSpPr/>
+                  <p:nvPr/>
+                </p:nvCxnSpPr>
+                <p:spPr>
+                  <a:xfrm flipV="1">
+                    <a:off x="5232580" y="1306245"/>
+                    <a:ext cx="533020" cy="819434"/>
+                  </a:xfrm>
+                  <a:prstGeom prst="straightConnector1">
+                    <a:avLst/>
+                  </a:prstGeom>
+                  <a:ln w="38100">
+                    <a:solidFill>
+                      <a:schemeClr val="tx1"/>
+                    </a:solidFill>
+                    <a:tailEnd type="triangle"/>
+                  </a:ln>
+                </p:spPr>
+                <p:style>
+                  <a:lnRef idx="1">
+                    <a:schemeClr val="accent1"/>
+                  </a:lnRef>
+                  <a:fillRef idx="0">
+                    <a:schemeClr val="accent1"/>
+                  </a:fillRef>
+                  <a:effectRef idx="0">
+                    <a:schemeClr val="accent1"/>
+                  </a:effectRef>
+                  <a:fontRef idx="minor">
+                    <a:schemeClr val="tx1"/>
+                  </a:fontRef>
+                </p:style>
+              </p:cxnSp>
+              <mc:AlternateContent xmlns:mc="http://schemas.openxmlformats.org/markup-compatibility/2006">
+                <mc:Choice xmlns:a14="http://schemas.microsoft.com/office/drawing/2010/main" Requires="a14">
+                  <p:sp>
+                    <p:nvSpPr>
+                      <p:cNvPr id="57" name="TextBox 56"/>
+                      <p:cNvSpPr txBox="1"/>
+                      <p:nvPr/>
+                    </p:nvSpPr>
+                    <p:spPr>
+                      <a:xfrm>
+                        <a:off x="5666427" y="1472311"/>
+                        <a:ext cx="228460" cy="345159"/>
+                      </a:xfrm>
+                      <a:prstGeom prst="rect">
+                        <a:avLst/>
+                      </a:prstGeom>
+                      <a:noFill/>
+                    </p:spPr>
+                    <p:txBody>
+                      <a:bodyPr wrap="none" lIns="0" tIns="0" rIns="0" bIns="0" rtlCol="0">
+                        <a:spAutoFit/>
+                      </a:bodyPr>
+                      <a:lstStyle/>
+                      <a:p>
+                        <a14:m>
+                          <m:oMathPara xmlns:m="http://schemas.openxmlformats.org/officeDocument/2006/math">
+                            <m:oMathParaPr>
+                              <m:jc m:val="centerGroup"/>
+                            </m:oMathParaPr>
+                            <m:oMath xmlns:m="http://schemas.openxmlformats.org/officeDocument/2006/math">
+                              <m:acc>
+                                <m:accPr>
+                                  <m:chr m:val="⃗"/>
+                                  <m:ctrlPr>
+                                    <a:rPr lang="en-US" sz="2000" b="0" i="1" smtClean="0">
+                                      <a:latin typeface="Cambria Math" panose="02040503050406030204" pitchFamily="18" charset="0"/>
+                                      <a:cs typeface="Arial" panose="020B0604020202020204" pitchFamily="34" charset="0"/>
+                                    </a:rPr>
+                                  </m:ctrlPr>
+                                </m:accPr>
+                                <m:e>
+                                  <m:r>
+                                    <a:rPr lang="en-US" sz="2000" b="0" i="1" smtClean="0">
+                                      <a:latin typeface="Cambria Math" panose="02040503050406030204" pitchFamily="18" charset="0"/>
+                                      <a:cs typeface="Arial" panose="020B0604020202020204" pitchFamily="34" charset="0"/>
+                                    </a:rPr>
+                                    <m:t>𝑇</m:t>
+                                  </m:r>
+                                </m:e>
+                              </m:acc>
+                            </m:oMath>
+                          </m:oMathPara>
+                        </a14:m>
+                        <a:endParaRPr lang="en-US" sz="2000" b="0" dirty="0" smtClean="0">
+                          <a:latin typeface="Arial" panose="020B0604020202020204" pitchFamily="34" charset="0"/>
+                          <a:cs typeface="Arial" panose="020B0604020202020204" pitchFamily="34" charset="0"/>
+                        </a:endParaRPr>
+                      </a:p>
+                    </p:txBody>
+                  </p:sp>
+                </mc:Choice>
+                <mc:Fallback>
+                  <p:sp>
+                    <p:nvSpPr>
+                      <p:cNvPr id="57" name="TextBox 56"/>
+                      <p:cNvSpPr txBox="1">
+                        <a:spLocks noRot="1" noChangeAspect="1" noMove="1" noResize="1" noEditPoints="1" noAdjustHandles="1" noChangeArrowheads="1" noChangeShapeType="1" noTextEdit="1"/>
+                      </p:cNvSpPr>
+                      <p:nvPr/>
+                    </p:nvSpPr>
+                    <p:spPr>
+                      <a:xfrm>
+                        <a:off x="5666427" y="1472311"/>
+                        <a:ext cx="228460" cy="345159"/>
+                      </a:xfrm>
+                      <a:prstGeom prst="rect">
+                        <a:avLst/>
+                      </a:prstGeom>
+                      <a:blipFill>
+                        <a:blip r:embed="rId31"/>
+                        <a:stretch>
+                          <a:fillRect l="-21053" r="-21053" b="-8929"/>
+                        </a:stretch>
+                      </a:blipFill>
+                    </p:spPr>
+                    <p:txBody>
+                      <a:bodyPr/>
+                      <a:lstStyle/>
+                      <a:p>
+                        <a:r>
+                          <a:rPr lang="en-US">
+                            <a:noFill/>
+                          </a:rPr>
+                          <a:t> </a:t>
+                        </a:r>
+                      </a:p>
+                    </p:txBody>
+                  </p:sp>
+                </mc:Fallback>
+              </mc:AlternateContent>
+              <mc:AlternateContent xmlns:mc="http://schemas.openxmlformats.org/markup-compatibility/2006">
+                <mc:Choice xmlns:a14="http://schemas.microsoft.com/office/drawing/2010/main" Requires="a14">
+                  <p:sp>
+                    <p:nvSpPr>
+                      <p:cNvPr id="58" name="TextBox 57"/>
+                      <p:cNvSpPr txBox="1"/>
+                      <p:nvPr/>
+                    </p:nvSpPr>
+                    <p:spPr>
+                      <a:xfrm>
+                        <a:off x="4808277" y="2523605"/>
+                        <a:ext cx="303865" cy="377219"/>
+                      </a:xfrm>
+                      <a:prstGeom prst="rect">
+                        <a:avLst/>
+                      </a:prstGeom>
+                      <a:noFill/>
+                    </p:spPr>
+                    <p:txBody>
+                      <a:bodyPr wrap="none" lIns="0" tIns="0" rIns="0" bIns="0" rtlCol="0">
+                        <a:spAutoFit/>
+                      </a:bodyPr>
+                      <a:lstStyle/>
+                      <a:p>
+                        <a14:m>
+                          <m:oMathPara xmlns:m="http://schemas.openxmlformats.org/officeDocument/2006/math">
+                            <m:oMathParaPr>
+                              <m:jc m:val="centerGroup"/>
+                            </m:oMathParaPr>
+                            <m:oMath xmlns:m="http://schemas.openxmlformats.org/officeDocument/2006/math">
+                              <m:sSub>
+                                <m:sSubPr>
+                                  <m:ctrlPr>
+                                    <a:rPr lang="en-US" sz="2000" b="0" i="1" smtClean="0">
+                                      <a:latin typeface="Cambria Math" panose="02040503050406030204" pitchFamily="18" charset="0"/>
+                                      <a:cs typeface="Arial" panose="020B0604020202020204" pitchFamily="34" charset="0"/>
+                                    </a:rPr>
+                                  </m:ctrlPr>
+                                </m:sSubPr>
+                                <m:e>
+                                  <m:acc>
+                                    <m:accPr>
+                                      <m:chr m:val="⃗"/>
+                                      <m:ctrlPr>
+                                        <a:rPr lang="en-US" sz="2000" b="0" i="1" smtClean="0">
+                                          <a:latin typeface="Cambria Math" panose="02040503050406030204" pitchFamily="18" charset="0"/>
+                                          <a:cs typeface="Arial" panose="020B0604020202020204" pitchFamily="34" charset="0"/>
+                                        </a:rPr>
+                                      </m:ctrlPr>
+                                    </m:accPr>
+                                    <m:e>
+                                      <m:r>
+                                        <a:rPr lang="en-US" sz="2000" b="0" i="1" smtClean="0">
+                                          <a:latin typeface="Cambria Math" panose="02040503050406030204" pitchFamily="18" charset="0"/>
+                                          <a:cs typeface="Arial" panose="020B0604020202020204" pitchFamily="34" charset="0"/>
+                                        </a:rPr>
+                                        <m:t>𝐹</m:t>
+                                      </m:r>
+                                    </m:e>
+                                  </m:acc>
+                                </m:e>
+                                <m:sub>
+                                  <m:r>
+                                    <a:rPr lang="en-US" sz="2000" b="0" i="1" smtClean="0">
+                                      <a:latin typeface="Cambria Math" panose="02040503050406030204" pitchFamily="18" charset="0"/>
+                                      <a:cs typeface="Arial" panose="020B0604020202020204" pitchFamily="34" charset="0"/>
+                                    </a:rPr>
+                                    <m:t>𝑔</m:t>
+                                  </m:r>
+                                </m:sub>
+                              </m:sSub>
+                            </m:oMath>
+                          </m:oMathPara>
+                        </a14:m>
+                        <a:endParaRPr lang="en-US" sz="2000" dirty="0" smtClean="0">
+                          <a:latin typeface="Arial" panose="020B0604020202020204" pitchFamily="34" charset="0"/>
+                          <a:cs typeface="Arial" panose="020B0604020202020204" pitchFamily="34" charset="0"/>
+                        </a:endParaRPr>
+                      </a:p>
+                    </p:txBody>
+                  </p:sp>
+                </mc:Choice>
+                <mc:Fallback>
+                  <p:sp>
+                    <p:nvSpPr>
+                      <p:cNvPr id="58" name="TextBox 57"/>
+                      <p:cNvSpPr txBox="1">
+                        <a:spLocks noRot="1" noChangeAspect="1" noMove="1" noResize="1" noEditPoints="1" noAdjustHandles="1" noChangeArrowheads="1" noChangeShapeType="1" noTextEdit="1"/>
+                      </p:cNvSpPr>
+                      <p:nvPr/>
+                    </p:nvSpPr>
+                    <p:spPr>
+                      <a:xfrm>
+                        <a:off x="4808277" y="2523605"/>
+                        <a:ext cx="303865" cy="377219"/>
+                      </a:xfrm>
+                      <a:prstGeom prst="rect">
+                        <a:avLst/>
+                      </a:prstGeom>
+                      <a:blipFill>
+                        <a:blip r:embed="rId32"/>
+                        <a:stretch>
+                          <a:fillRect l="-16000" t="-30645" r="-72000" b="-17742"/>
+                        </a:stretch>
+                      </a:blipFill>
+                    </p:spPr>
+                    <p:txBody>
+                      <a:bodyPr/>
+                      <a:lstStyle/>
+                      <a:p>
+                        <a:r>
+                          <a:rPr lang="en-US">
+                            <a:noFill/>
+                          </a:rPr>
+                          <a:t> </a:t>
+                        </a:r>
+                      </a:p>
+                    </p:txBody>
+                  </p:sp>
+                </mc:Fallback>
+              </mc:AlternateContent>
+              <p:grpSp>
+                <p:nvGrpSpPr>
+                  <p:cNvPr id="61" name="Group 60"/>
+                  <p:cNvGrpSpPr/>
+                  <p:nvPr/>
+                </p:nvGrpSpPr>
+                <p:grpSpPr>
+                  <a:xfrm>
+                    <a:off x="4061420" y="2408899"/>
+                    <a:ext cx="898789" cy="709995"/>
+                    <a:chOff x="758520" y="708040"/>
+                    <a:chExt cx="2596102" cy="2135605"/>
+                  </a:xfrm>
+                </p:grpSpPr>
+                <p:grpSp>
+                  <p:nvGrpSpPr>
+                    <p:cNvPr id="62" name="Group 61"/>
+                    <p:cNvGrpSpPr/>
+                    <p:nvPr/>
+                  </p:nvGrpSpPr>
+                  <p:grpSpPr>
+                    <a:xfrm>
+                      <a:off x="758520" y="708040"/>
+                      <a:ext cx="2596102" cy="2135605"/>
+                      <a:chOff x="785815" y="680744"/>
+                      <a:chExt cx="2596102" cy="2135605"/>
+                    </a:xfrm>
+                  </p:grpSpPr>
+                  <p:cxnSp>
+                    <p:nvCxnSpPr>
+                      <p:cNvPr id="64" name="Straight Arrow Connector 63"/>
+                      <p:cNvCxnSpPr/>
+                      <p:nvPr/>
+                    </p:nvCxnSpPr>
+                    <p:spPr>
+                      <a:xfrm flipV="1">
+                        <a:off x="1516583" y="680744"/>
+                        <a:ext cx="7683" cy="1859535"/>
+                      </a:xfrm>
+                      <a:prstGeom prst="straightConnector1">
+                        <a:avLst/>
+                      </a:prstGeom>
+                      <a:ln w="38100">
+                        <a:solidFill>
+                          <a:schemeClr val="tx1"/>
+                        </a:solidFill>
+                        <a:tailEnd type="triangle"/>
+                      </a:ln>
+                    </p:spPr>
+                    <p:style>
+                      <a:lnRef idx="1">
+                        <a:schemeClr val="accent1"/>
+                      </a:lnRef>
+                      <a:fillRef idx="0">
+                        <a:schemeClr val="accent1"/>
+                      </a:fillRef>
+                      <a:effectRef idx="0">
+                        <a:schemeClr val="accent1"/>
+                      </a:effectRef>
+                      <a:fontRef idx="minor">
+                        <a:schemeClr val="tx1"/>
+                      </a:fontRef>
+                    </p:style>
+                  </p:cxnSp>
+                  <p:cxnSp>
+                    <p:nvCxnSpPr>
+                      <p:cNvPr id="65" name="Straight Arrow Connector 64"/>
+                      <p:cNvCxnSpPr/>
+                      <p:nvPr/>
+                    </p:nvCxnSpPr>
+                    <p:spPr>
+                      <a:xfrm flipV="1">
+                        <a:off x="1507013" y="2535259"/>
+                        <a:ext cx="1874904" cy="1"/>
+                      </a:xfrm>
+                      <a:prstGeom prst="straightConnector1">
+                        <a:avLst/>
+                      </a:prstGeom>
+                      <a:ln w="38100">
+                        <a:solidFill>
+                          <a:schemeClr val="tx1"/>
+                        </a:solidFill>
+                        <a:tailEnd type="triangle"/>
+                      </a:ln>
+                    </p:spPr>
+                    <p:style>
+                      <a:lnRef idx="1">
+                        <a:schemeClr val="accent1"/>
+                      </a:lnRef>
+                      <a:fillRef idx="0">
+                        <a:schemeClr val="accent1"/>
+                      </a:fillRef>
+                      <a:effectRef idx="0">
+                        <a:schemeClr val="accent1"/>
+                      </a:effectRef>
+                      <a:fontRef idx="minor">
+                        <a:schemeClr val="tx1"/>
+                      </a:fontRef>
+                    </p:style>
+                  </p:cxnSp>
+                  <mc:AlternateContent xmlns:mc="http://schemas.openxmlformats.org/markup-compatibility/2006" xmlns:a14="http://schemas.microsoft.com/office/drawing/2010/main">
+                    <mc:Choice Requires="a14">
+                      <p:sp>
+                        <p:nvSpPr>
+                          <p:cNvPr id="66" name="Rectangle 65"/>
+                          <p:cNvSpPr/>
+                          <p:nvPr/>
+                        </p:nvSpPr>
+                        <p:spPr>
+                          <a:xfrm>
+                            <a:off x="2697555" y="2447016"/>
+                            <a:ext cx="367985" cy="369333"/>
+                          </a:xfrm>
+                          <a:prstGeom prst="rect">
+                            <a:avLst/>
+                          </a:prstGeom>
+                        </p:spPr>
+                        <p:txBody>
+                          <a:bodyPr wrap="none">
+                            <a:spAutoFit/>
+                          </a:bodyPr>
+                          <a:lstStyle/>
+                          <a:p>
+                            <a:pPr/>
+                            <a14:m>
+                              <m:oMathPara xmlns:m="http://schemas.openxmlformats.org/officeDocument/2006/math">
+                                <m:oMathParaPr>
+                                  <m:jc m:val="centerGroup"/>
+                                </m:oMathParaPr>
+                                <m:oMath xmlns:m="http://schemas.openxmlformats.org/officeDocument/2006/math">
+                                  <m:r>
+                                    <a:rPr lang="en-US" i="1">
+                                      <a:latin typeface="Cambria Math" panose="02040503050406030204" pitchFamily="18" charset="0"/>
+                                      <a:cs typeface="Arial" panose="020B0604020202020204" pitchFamily="34" charset="0"/>
+                                    </a:rPr>
+                                    <m:t>𝑥</m:t>
+                                  </m:r>
+                                </m:oMath>
+                              </m:oMathPara>
+                            </a14:m>
+                            <a:endParaRPr lang="en-CA" dirty="0"/>
+                          </a:p>
+                        </p:txBody>
+                      </p:sp>
+                    </mc:Choice>
+                    <mc:Fallback xmlns="">
+                      <p:sp>
+                        <p:nvSpPr>
+                          <p:cNvPr id="107" name="Rectangle 106"/>
+                          <p:cNvSpPr>
+                            <a:spLocks noRot="1" noChangeAspect="1" noMove="1" noResize="1" noEditPoints="1" noAdjustHandles="1" noChangeArrowheads="1" noChangeShapeType="1" noTextEdit="1"/>
+                          </p:cNvSpPr>
+                          <p:nvPr/>
+                        </p:nvSpPr>
+                        <p:spPr>
+                          <a:xfrm>
+                            <a:off x="2697555" y="2447016"/>
+                            <a:ext cx="367985" cy="369333"/>
+                          </a:xfrm>
+                          <a:prstGeom prst="rect">
+                            <a:avLst/>
+                          </a:prstGeom>
+                          <a:blipFill>
+                            <a:blip r:embed="rId27"/>
+                            <a:stretch>
+                              <a:fillRect r="-95238" b="-160000"/>
+                            </a:stretch>
+                          </a:blipFill>
+                        </p:spPr>
+                        <p:txBody>
+                          <a:bodyPr/>
+                          <a:lstStyle/>
+                          <a:p>
+                            <a:r>
+                              <a:rPr lang="en-US">
+                                <a:noFill/>
+                              </a:rPr>
+                              <a:t> </a:t>
+                            </a:r>
+                          </a:p>
+                        </p:txBody>
+                      </p:sp>
+                    </mc:Fallback>
+                  </mc:AlternateContent>
+                  <mc:AlternateContent xmlns:mc="http://schemas.openxmlformats.org/markup-compatibility/2006" xmlns:a14="http://schemas.microsoft.com/office/drawing/2010/main">
+                    <mc:Choice Requires="a14">
+                      <p:sp>
+                        <p:nvSpPr>
+                          <p:cNvPr id="67" name="Rectangle 66"/>
+                          <p:cNvSpPr/>
+                          <p:nvPr/>
+                        </p:nvSpPr>
+                        <p:spPr>
+                          <a:xfrm>
+                            <a:off x="785815" y="912420"/>
+                            <a:ext cx="371385" cy="369333"/>
+                          </a:xfrm>
+                          <a:prstGeom prst="rect">
+                            <a:avLst/>
+                          </a:prstGeom>
+                        </p:spPr>
+                        <p:txBody>
+                          <a:bodyPr wrap="none">
+                            <a:spAutoFit/>
+                          </a:bodyPr>
+                          <a:lstStyle/>
+                          <a:p>
+                            <a:pPr/>
+                            <a14:m>
+                              <m:oMathPara xmlns:m="http://schemas.openxmlformats.org/officeDocument/2006/math">
+                                <m:oMathParaPr>
+                                  <m:jc m:val="centerGroup"/>
+                                </m:oMathParaPr>
+                                <m:oMath xmlns:m="http://schemas.openxmlformats.org/officeDocument/2006/math">
+                                  <m:r>
+                                    <a:rPr lang="en-US" b="0" i="1" smtClean="0">
+                                      <a:latin typeface="Cambria Math" panose="02040503050406030204" pitchFamily="18" charset="0"/>
+                                    </a:rPr>
+                                    <m:t>𝑦</m:t>
+                                  </m:r>
+                                </m:oMath>
+                              </m:oMathPara>
+                            </a14:m>
+                            <a:endParaRPr lang="en-CA" dirty="0"/>
+                          </a:p>
+                        </p:txBody>
+                      </p:sp>
+                    </mc:Choice>
+                    <mc:Fallback xmlns="">
+                      <p:sp>
+                        <p:nvSpPr>
+                          <p:cNvPr id="108" name="Rectangle 107"/>
+                          <p:cNvSpPr>
+                            <a:spLocks noRot="1" noChangeAspect="1" noMove="1" noResize="1" noEditPoints="1" noAdjustHandles="1" noChangeArrowheads="1" noChangeShapeType="1" noTextEdit="1"/>
+                          </p:cNvSpPr>
+                          <p:nvPr/>
+                        </p:nvSpPr>
+                        <p:spPr>
+                          <a:xfrm>
+                            <a:off x="785815" y="912420"/>
+                            <a:ext cx="371385" cy="369333"/>
+                          </a:xfrm>
+                          <a:prstGeom prst="rect">
+                            <a:avLst/>
+                          </a:prstGeom>
+                          <a:blipFill>
+                            <a:blip r:embed="rId28"/>
+                            <a:stretch>
+                              <a:fillRect l="-19048" r="-114286" b="-220000"/>
+                            </a:stretch>
+                          </a:blipFill>
+                        </p:spPr>
+                        <p:txBody>
+                          <a:bodyPr/>
+                          <a:lstStyle/>
+                          <a:p>
+                            <a:r>
+                              <a:rPr lang="en-US">
+                                <a:noFill/>
+                              </a:rPr>
+                              <a:t> </a:t>
+                            </a:r>
+                          </a:p>
+                        </p:txBody>
+                      </p:sp>
+                    </mc:Fallback>
+                  </mc:AlternateContent>
+                  <mc:AlternateContent xmlns:mc="http://schemas.openxmlformats.org/markup-compatibility/2006" xmlns:a14="http://schemas.microsoft.com/office/drawing/2010/main">
+                    <mc:Choice Requires="a14">
+                      <p:sp>
+                        <p:nvSpPr>
+                          <p:cNvPr id="68" name="Rectangle 67"/>
+                          <p:cNvSpPr/>
+                          <p:nvPr/>
+                        </p:nvSpPr>
+                        <p:spPr>
+                          <a:xfrm>
+                            <a:off x="1006642" y="2350591"/>
+                            <a:ext cx="367985" cy="369333"/>
+                          </a:xfrm>
+                          <a:prstGeom prst="rect">
+                            <a:avLst/>
+                          </a:prstGeom>
+                        </p:spPr>
+                        <p:txBody>
+                          <a:bodyPr wrap="none">
+                            <a:spAutoFit/>
+                          </a:bodyPr>
+                          <a:lstStyle/>
+                          <a:p>
+                            <a:pPr/>
+                            <a14:m>
+                              <m:oMathPara xmlns:m="http://schemas.openxmlformats.org/officeDocument/2006/math">
+                                <m:oMathParaPr>
+                                  <m:jc m:val="centerGroup"/>
+                                </m:oMathParaPr>
+                                <m:oMath xmlns:m="http://schemas.openxmlformats.org/officeDocument/2006/math">
+                                  <m:r>
+                                    <a:rPr lang="en-US" b="0" i="1" smtClean="0">
+                                      <a:latin typeface="Cambria Math" panose="02040503050406030204" pitchFamily="18" charset="0"/>
+                                      <a:cs typeface="Arial" panose="020B0604020202020204" pitchFamily="34" charset="0"/>
+                                    </a:rPr>
+                                    <m:t>0</m:t>
+                                  </m:r>
+                                </m:oMath>
+                              </m:oMathPara>
+                            </a14:m>
+                            <a:endParaRPr lang="en-CA" dirty="0"/>
+                          </a:p>
+                        </p:txBody>
+                      </p:sp>
+                    </mc:Choice>
+                    <mc:Fallback xmlns="">
+                      <p:sp>
+                        <p:nvSpPr>
+                          <p:cNvPr id="109" name="Rectangle 108"/>
+                          <p:cNvSpPr>
+                            <a:spLocks noRot="1" noChangeAspect="1" noMove="1" noResize="1" noEditPoints="1" noAdjustHandles="1" noChangeArrowheads="1" noChangeShapeType="1" noTextEdit="1"/>
+                          </p:cNvSpPr>
+                          <p:nvPr/>
+                        </p:nvSpPr>
+                        <p:spPr>
+                          <a:xfrm>
+                            <a:off x="1006642" y="2350591"/>
+                            <a:ext cx="367985" cy="369333"/>
+                          </a:xfrm>
+                          <a:prstGeom prst="rect">
+                            <a:avLst/>
+                          </a:prstGeom>
+                          <a:blipFill>
+                            <a:blip r:embed="rId29"/>
+                            <a:stretch>
+                              <a:fillRect l="-14286" r="-114286" b="-180000"/>
+                            </a:stretch>
+                          </a:blipFill>
+                        </p:spPr>
+                        <p:txBody>
+                          <a:bodyPr/>
+                          <a:lstStyle/>
+                          <a:p>
+                            <a:r>
+                              <a:rPr lang="en-US">
+                                <a:noFill/>
+                              </a:rPr>
+                              <a:t> </a:t>
+                            </a:r>
+                          </a:p>
+                        </p:txBody>
+                      </p:sp>
+                    </mc:Fallback>
+                  </mc:AlternateContent>
+                </p:grpSp>
+                <p:sp>
+                  <p:nvSpPr>
+                    <p:cNvPr id="63" name="Rectangle 62"/>
+                    <p:cNvSpPr/>
+                    <p:nvPr/>
+                  </p:nvSpPr>
+                  <p:spPr>
+                    <a:xfrm>
+                      <a:off x="1129904" y="1614682"/>
+                      <a:ext cx="184731" cy="369332"/>
+                    </a:xfrm>
+                    <a:prstGeom prst="rect">
+                      <a:avLst/>
+                    </a:prstGeom>
+                  </p:spPr>
+                  <p:txBody>
+                    <a:bodyPr wrap="none">
+                      <a:spAutoFit/>
+                    </a:bodyPr>
+                    <a:lstStyle/>
+                    <a:p>
+                      <a:endParaRPr lang="en-CA" dirty="0"/>
+                    </a:p>
+                  </p:txBody>
+                </p:sp>
+              </p:grpSp>
+            </p:grpSp>
+            <p:cxnSp>
+              <p:nvCxnSpPr>
+                <p:cNvPr id="52" name="Straight Connector 51"/>
+                <p:cNvCxnSpPr/>
+                <p:nvPr/>
+              </p:nvCxnSpPr>
+              <p:spPr>
+                <a:xfrm flipH="1">
+                  <a:off x="5217524" y="1215342"/>
+                  <a:ext cx="2658" cy="907284"/>
+                </a:xfrm>
+                <a:prstGeom prst="line">
+                  <a:avLst/>
+                </a:prstGeom>
+                <a:ln w="28575">
+                  <a:solidFill>
+                    <a:schemeClr val="tx1"/>
+                  </a:solidFill>
+                  <a:prstDash val="sysDot"/>
+                </a:ln>
+              </p:spPr>
+              <p:style>
+                <a:lnRef idx="1">
+                  <a:schemeClr val="accent1"/>
+                </a:lnRef>
+                <a:fillRef idx="0">
+                  <a:schemeClr val="accent1"/>
+                </a:fillRef>
+                <a:effectRef idx="0">
+                  <a:schemeClr val="accent1"/>
+                </a:effectRef>
+                <a:fontRef idx="minor">
+                  <a:schemeClr val="tx1"/>
+                </a:fontRef>
+              </p:style>
+            </p:cxnSp>
+            <mc:AlternateContent xmlns:mc="http://schemas.openxmlformats.org/markup-compatibility/2006">
+              <mc:Choice xmlns:a14="http://schemas.microsoft.com/office/drawing/2010/main" Requires="a14">
+                <p:sp>
+                  <p:nvSpPr>
+                    <p:cNvPr id="53" name="TextBox 52"/>
+                    <p:cNvSpPr txBox="1"/>
+                    <p:nvPr/>
+                  </p:nvSpPr>
+                  <p:spPr>
+                    <a:xfrm>
+                      <a:off x="5241950" y="1519875"/>
+                      <a:ext cx="222304" cy="307777"/>
+                    </a:xfrm>
+                    <a:prstGeom prst="rect">
+                      <a:avLst/>
+                    </a:prstGeom>
+                    <a:noFill/>
+                  </p:spPr>
+                  <p:txBody>
+                    <a:bodyPr wrap="none" lIns="0" tIns="0" rIns="0" bIns="0" rtlCol="0">
+                      <a:spAutoFit/>
+                    </a:bodyPr>
+                    <a:lstStyle/>
+                    <a:p>
+                      <a14:m>
+                        <m:oMathPara xmlns:m="http://schemas.openxmlformats.org/officeDocument/2006/math">
+                          <m:oMathParaPr>
+                            <m:jc m:val="centerGroup"/>
+                          </m:oMathParaPr>
+                          <m:oMath xmlns:m="http://schemas.openxmlformats.org/officeDocument/2006/math">
+                            <m:r>
+                              <a:rPr lang="en-US" sz="2000" b="0" i="1" smtClean="0">
+                                <a:latin typeface="Cambria Math" panose="02040503050406030204" pitchFamily="18" charset="0"/>
+                                <a:cs typeface="Arial" panose="020B0604020202020204" pitchFamily="34" charset="0"/>
+                              </a:rPr>
+                              <m:t>𝜃</m:t>
+                            </m:r>
+                          </m:oMath>
+                        </m:oMathPara>
+                      </a14:m>
+                      <a:endParaRPr lang="en-US" sz="2000" dirty="0" smtClean="0">
+                        <a:latin typeface="Arial" panose="020B0604020202020204" pitchFamily="34" charset="0"/>
+                        <a:cs typeface="Arial" panose="020B0604020202020204" pitchFamily="34" charset="0"/>
+                      </a:endParaRPr>
+                    </a:p>
+                  </p:txBody>
+                </p:sp>
+              </mc:Choice>
+              <mc:Fallback>
+                <p:sp>
+                  <p:nvSpPr>
+                    <p:cNvPr id="53" name="TextBox 52"/>
+                    <p:cNvSpPr txBox="1">
+                      <a:spLocks noRot="1" noChangeAspect="1" noMove="1" noResize="1" noEditPoints="1" noAdjustHandles="1" noChangeArrowheads="1" noChangeShapeType="1" noTextEdit="1"/>
+                    </p:cNvSpPr>
+                    <p:nvPr/>
+                  </p:nvSpPr>
+                  <p:spPr>
+                    <a:xfrm>
+                      <a:off x="5241950" y="1519875"/>
+                      <a:ext cx="222304" cy="307777"/>
+                    </a:xfrm>
+                    <a:prstGeom prst="rect">
+                      <a:avLst/>
+                    </a:prstGeom>
+                    <a:blipFill>
+                      <a:blip r:embed="rId33"/>
+                      <a:stretch>
+                        <a:fillRect l="-24324" r="-21622" b="-12000"/>
+                      </a:stretch>
+                    </a:blipFill>
+                  </p:spPr>
+                  <p:txBody>
+                    <a:bodyPr/>
+                    <a:lstStyle/>
+                    <a:p>
+                      <a:r>
+                        <a:rPr lang="en-US">
+                          <a:noFill/>
+                        </a:rPr>
+                        <a:t> </a:t>
+                      </a:r>
+                    </a:p>
+                  </p:txBody>
+                </p:sp>
+              </mc:Fallback>
+            </mc:AlternateContent>
+          </p:grpSp>
+          <p:cxnSp>
+            <p:nvCxnSpPr>
+              <p:cNvPr id="69" name="Straight Arrow Connector 68"/>
+              <p:cNvCxnSpPr/>
+              <p:nvPr/>
+            </p:nvCxnSpPr>
+            <p:spPr>
+              <a:xfrm flipH="1">
+                <a:off x="7812469" y="2161926"/>
+                <a:ext cx="560313" cy="21608"/>
+              </a:xfrm>
+              <a:prstGeom prst="straightConnector1">
+                <a:avLst/>
+              </a:prstGeom>
+              <a:ln w="38100">
+                <a:solidFill>
+                  <a:schemeClr val="tx1"/>
+                </a:solidFill>
+                <a:tailEnd type="triangle"/>
+              </a:ln>
+            </p:spPr>
+            <p:style>
+              <a:lnRef idx="1">
+                <a:schemeClr val="accent1"/>
+              </a:lnRef>
+              <a:fillRef idx="0">
+                <a:schemeClr val="accent1"/>
+              </a:fillRef>
+              <a:effectRef idx="0">
+                <a:schemeClr val="accent1"/>
+              </a:effectRef>
+              <a:fontRef idx="minor">
+                <a:schemeClr val="tx1"/>
+              </a:fontRef>
+            </p:style>
+          </p:cxnSp>
+          <mc:AlternateContent xmlns:mc="http://schemas.openxmlformats.org/markup-compatibility/2006">
+            <mc:Choice xmlns:a14="http://schemas.microsoft.com/office/drawing/2010/main" Requires="a14">
+              <p:sp>
+                <p:nvSpPr>
+                  <p:cNvPr id="72" name="TextBox 71"/>
+                  <p:cNvSpPr txBox="1"/>
+                  <p:nvPr/>
+                </p:nvSpPr>
+                <p:spPr>
+                  <a:xfrm>
+                    <a:off x="7997335" y="1708866"/>
+                    <a:ext cx="256847" cy="345159"/>
+                  </a:xfrm>
+                  <a:prstGeom prst="rect">
+                    <a:avLst/>
+                  </a:prstGeom>
+                  <a:noFill/>
+                </p:spPr>
+                <p:txBody>
+                  <a:bodyPr wrap="square" lIns="0" tIns="0" rIns="0" bIns="0" rtlCol="0">
+                    <a:spAutoFit/>
+                  </a:bodyPr>
+                  <a:lstStyle/>
+                  <a:p>
+                    <a14:m>
+                      <m:oMathPara xmlns:m="http://schemas.openxmlformats.org/officeDocument/2006/math">
+                        <m:oMathParaPr>
+                          <m:jc m:val="centerGroup"/>
+                        </m:oMathParaPr>
+                        <m:oMath xmlns:m="http://schemas.openxmlformats.org/officeDocument/2006/math">
+                          <m:sSub>
+                            <m:sSubPr>
+                              <m:ctrlPr>
+                                <a:rPr lang="en-US" sz="2000" b="0" i="1" smtClean="0">
+                                  <a:latin typeface="Cambria Math" panose="02040503050406030204" pitchFamily="18" charset="0"/>
+                                  <a:cs typeface="Arial" panose="020B0604020202020204" pitchFamily="34" charset="0"/>
+                                </a:rPr>
+                              </m:ctrlPr>
+                            </m:sSubPr>
+                            <m:e>
+                              <m:acc>
+                                <m:accPr>
+                                  <m:chr m:val="⃗"/>
+                                  <m:ctrlPr>
+                                    <a:rPr lang="en-US" sz="2000" b="0" i="1" smtClean="0">
+                                      <a:latin typeface="Cambria Math" panose="02040503050406030204" pitchFamily="18" charset="0"/>
+                                      <a:cs typeface="Arial" panose="020B0604020202020204" pitchFamily="34" charset="0"/>
+                                    </a:rPr>
+                                  </m:ctrlPr>
+                                </m:accPr>
+                                <m:e>
+                                  <m:r>
+                                    <a:rPr lang="en-US" sz="2000" b="0" i="1" smtClean="0">
+                                      <a:latin typeface="Cambria Math" panose="02040503050406030204" pitchFamily="18" charset="0"/>
+                                      <a:cs typeface="Arial" panose="020B0604020202020204" pitchFamily="34" charset="0"/>
+                                    </a:rPr>
+                                    <m:t>𝐹</m:t>
+                                  </m:r>
+                                </m:e>
+                              </m:acc>
+                            </m:e>
+                            <m:sub>
+                              <m:r>
+                                <a:rPr lang="en-US" sz="2000" b="0" i="1" smtClean="0">
+                                  <a:latin typeface="Cambria Math" panose="02040503050406030204" pitchFamily="18" charset="0"/>
+                                  <a:cs typeface="Arial" panose="020B0604020202020204" pitchFamily="34" charset="0"/>
+                                </a:rPr>
+                                <m:t>𝐼</m:t>
+                              </m:r>
+                            </m:sub>
+                          </m:sSub>
+                        </m:oMath>
+                      </m:oMathPara>
+                    </a14:m>
+                    <a:endParaRPr lang="en-US" sz="2000" dirty="0" smtClean="0">
+                      <a:latin typeface="Arial" panose="020B0604020202020204" pitchFamily="34" charset="0"/>
+                      <a:cs typeface="Arial" panose="020B0604020202020204" pitchFamily="34" charset="0"/>
+                    </a:endParaRPr>
+                  </a:p>
+                </p:txBody>
+              </p:sp>
+            </mc:Choice>
+            <mc:Fallback>
+              <p:sp>
+                <p:nvSpPr>
+                  <p:cNvPr id="72" name="TextBox 71"/>
+                  <p:cNvSpPr txBox="1">
+                    <a:spLocks noRot="1" noChangeAspect="1" noMove="1" noResize="1" noEditPoints="1" noAdjustHandles="1" noChangeArrowheads="1" noChangeShapeType="1" noTextEdit="1"/>
+                  </p:cNvSpPr>
+                  <p:nvPr/>
+                </p:nvSpPr>
+                <p:spPr>
+                  <a:xfrm>
+                    <a:off x="7997335" y="1708866"/>
+                    <a:ext cx="256847" cy="345159"/>
+                  </a:xfrm>
+                  <a:prstGeom prst="rect">
+                    <a:avLst/>
+                  </a:prstGeom>
+                  <a:blipFill>
+                    <a:blip r:embed="rId34"/>
+                    <a:stretch>
+                      <a:fillRect l="-28571" t="-33333" r="-76190" b="-17544"/>
+                    </a:stretch>
+                  </a:blipFill>
+                </p:spPr>
+                <p:txBody>
+                  <a:bodyPr/>
+                  <a:lstStyle/>
+                  <a:p>
+                    <a:r>
+                      <a:rPr lang="en-US">
+                        <a:noFill/>
+                      </a:rPr>
+                      <a:t> </a:t>
+                    </a:r>
+                  </a:p>
+                </p:txBody>
+              </p:sp>
+            </mc:Fallback>
+          </mc:AlternateContent>
+        </p:grpSp>
+        <mc:AlternateContent xmlns:mc="http://schemas.openxmlformats.org/markup-compatibility/2006">
+          <mc:Choice xmlns:a14="http://schemas.microsoft.com/office/drawing/2010/main" Requires="a14">
+            <p:sp>
+              <p:nvSpPr>
+                <p:cNvPr id="74" name="TextBox 73"/>
+                <p:cNvSpPr txBox="1"/>
+                <p:nvPr/>
+              </p:nvSpPr>
+              <p:spPr>
+                <a:xfrm>
+                  <a:off x="7145572" y="904485"/>
+                  <a:ext cx="2514214" cy="307777"/>
+                </a:xfrm>
+                <a:prstGeom prst="rect">
+                  <a:avLst/>
+                </a:prstGeom>
+                <a:noFill/>
+              </p:spPr>
+              <p:txBody>
+                <a:bodyPr wrap="none" lIns="0" tIns="0" rIns="0" bIns="0" rtlCol="0">
+                  <a:spAutoFit/>
+                </a:bodyPr>
+                <a:lstStyle/>
+                <a:p>
+                  <a14:m>
+                    <m:oMathPara xmlns:m="http://schemas.openxmlformats.org/officeDocument/2006/math">
+                      <m:oMathParaPr>
+                        <m:jc m:val="centerGroup"/>
+                      </m:oMathParaPr>
+                      <m:oMath xmlns:m="http://schemas.openxmlformats.org/officeDocument/2006/math">
+                        <m:r>
+                          <a:rPr lang="en-US" sz="2000" b="0" i="1" smtClean="0">
+                            <a:latin typeface="Cambria Math" panose="02040503050406030204" pitchFamily="18" charset="0"/>
+                            <a:cs typeface="Arial" panose="020B0604020202020204" pitchFamily="34" charset="0"/>
+                          </a:rPr>
+                          <m:t>𝑛𝑜𝑛</m:t>
+                        </m:r>
+                        <m:r>
+                          <a:rPr lang="en-US" sz="2000" b="0" i="1" smtClean="0">
+                            <a:latin typeface="Cambria Math" panose="02040503050406030204" pitchFamily="18" charset="0"/>
+                            <a:cs typeface="Arial" panose="020B0604020202020204" pitchFamily="34" charset="0"/>
+                          </a:rPr>
+                          <m:t>−</m:t>
+                        </m:r>
+                        <m:r>
+                          <a:rPr lang="en-US" sz="2000" b="0" i="1" smtClean="0">
+                            <a:latin typeface="Cambria Math" panose="02040503050406030204" pitchFamily="18" charset="0"/>
+                            <a:cs typeface="Arial" panose="020B0604020202020204" pitchFamily="34" charset="0"/>
+                          </a:rPr>
+                          <m:t>𝑖𝑛𝑒𝑟𝑡𝑖𝑎𝑙</m:t>
+                        </m:r>
+                        <m:r>
+                          <a:rPr lang="en-US" sz="2000" b="0" i="1" smtClean="0">
+                            <a:latin typeface="Cambria Math" panose="02040503050406030204" pitchFamily="18" charset="0"/>
+                            <a:cs typeface="Arial" panose="020B0604020202020204" pitchFamily="34" charset="0"/>
+                          </a:rPr>
+                          <m:t> </m:t>
+                        </m:r>
+                        <m:r>
+                          <a:rPr lang="en-US" sz="2000" b="0" i="1" smtClean="0">
+                            <a:latin typeface="Cambria Math" panose="02040503050406030204" pitchFamily="18" charset="0"/>
+                            <a:cs typeface="Arial" panose="020B0604020202020204" pitchFamily="34" charset="0"/>
+                          </a:rPr>
+                          <m:t>𝑓𝑟𝑎𝑚𝑒</m:t>
+                        </m:r>
+                      </m:oMath>
+                    </m:oMathPara>
+                  </a14:m>
+                  <a:endParaRPr lang="en-US" sz="2000" dirty="0" smtClean="0">
+                    <a:latin typeface="Arial" panose="020B0604020202020204" pitchFamily="34" charset="0"/>
+                    <a:cs typeface="Arial" panose="020B0604020202020204" pitchFamily="34" charset="0"/>
+                  </a:endParaRPr>
+                </a:p>
+              </p:txBody>
+            </p:sp>
+          </mc:Choice>
+          <mc:Fallback>
+            <p:sp>
+              <p:nvSpPr>
+                <p:cNvPr id="74" name="TextBox 73"/>
+                <p:cNvSpPr txBox="1">
+                  <a:spLocks noRot="1" noChangeAspect="1" noMove="1" noResize="1" noEditPoints="1" noAdjustHandles="1" noChangeArrowheads="1" noChangeShapeType="1" noTextEdit="1"/>
+                </p:cNvSpPr>
+                <p:nvPr/>
+              </p:nvSpPr>
+              <p:spPr>
+                <a:xfrm>
+                  <a:off x="7145572" y="904485"/>
+                  <a:ext cx="2514214" cy="307777"/>
+                </a:xfrm>
+                <a:prstGeom prst="rect">
+                  <a:avLst/>
+                </a:prstGeom>
+                <a:blipFill>
+                  <a:blip r:embed="rId35"/>
+                  <a:stretch>
+                    <a:fillRect l="-484" r="-2663" b="-37255"/>
+                  </a:stretch>
+                </a:blipFill>
+              </p:spPr>
+              <p:txBody>
+                <a:bodyPr/>
+                <a:lstStyle/>
+                <a:p>
+                  <a:r>
+                    <a:rPr lang="en-US">
+                      <a:noFill/>
+                    </a:rPr>
+                    <a:t> </a:t>
+                  </a:r>
+                </a:p>
+              </p:txBody>
+            </p:sp>
+          </mc:Fallback>
+        </mc:AlternateContent>
+      </p:grpSp>
+      <p:grpSp>
+        <p:nvGrpSpPr>
+          <p:cNvPr id="104" name="Group 103"/>
+          <p:cNvGrpSpPr/>
+          <p:nvPr/>
+        </p:nvGrpSpPr>
+        <p:grpSpPr>
+          <a:xfrm>
+            <a:off x="274114" y="4020390"/>
+            <a:ext cx="1234882" cy="2251113"/>
+            <a:chOff x="274114" y="4020390"/>
+            <a:chExt cx="1234882" cy="2251113"/>
+          </a:xfrm>
+        </p:grpSpPr>
+        <p:grpSp>
+          <p:nvGrpSpPr>
+            <p:cNvPr id="95" name="Group 94"/>
+            <p:cNvGrpSpPr/>
+            <p:nvPr/>
+          </p:nvGrpSpPr>
+          <p:grpSpPr>
+            <a:xfrm>
+              <a:off x="723509" y="4020390"/>
+              <a:ext cx="785487" cy="1776350"/>
+              <a:chOff x="723509" y="4020390"/>
+              <a:chExt cx="785487" cy="1776350"/>
+            </a:xfrm>
+          </p:grpSpPr>
+          <p:sp>
+            <p:nvSpPr>
+              <p:cNvPr id="79" name="Oval 78"/>
+              <p:cNvSpPr/>
+              <p:nvPr/>
+            </p:nvSpPr>
+            <p:spPr>
+              <a:xfrm>
+                <a:off x="1091633" y="4636218"/>
+                <a:ext cx="120943" cy="119766"/>
+              </a:xfrm>
+              <a:prstGeom prst="ellipse">
+                <a:avLst/>
+              </a:prstGeom>
+              <a:solidFill>
+                <a:schemeClr val="tx1"/>
+              </a:solidFill>
+              <a:ln w="38100">
+                <a:solidFill>
+                  <a:schemeClr val="tx1"/>
+                </a:solidFill>
+              </a:ln>
+            </p:spPr>
+            <p:style>
+              <a:lnRef idx="2">
+                <a:schemeClr val="accent1">
+                  <a:shade val="50000"/>
+                </a:schemeClr>
+              </a:lnRef>
+              <a:fillRef idx="1">
+                <a:schemeClr val="accent1"/>
+              </a:fillRef>
+              <a:effectRef idx="0">
+                <a:schemeClr val="accent1"/>
+              </a:effectRef>
+              <a:fontRef idx="minor">
+                <a:schemeClr val="lt1"/>
+              </a:fontRef>
+            </p:style>
+            <p:txBody>
+              <a:bodyPr rtlCol="0" anchor="ctr"/>
+              <a:lstStyle/>
+              <a:p>
+                <a:pPr algn="ctr"/>
+                <a:endParaRPr lang="en-US"/>
+              </a:p>
+            </p:txBody>
+          </p:sp>
+          <p:cxnSp>
+            <p:nvCxnSpPr>
+              <p:cNvPr id="80" name="Straight Arrow Connector 79"/>
+              <p:cNvCxnSpPr/>
+              <p:nvPr/>
+            </p:nvCxnSpPr>
+            <p:spPr>
+              <a:xfrm>
+                <a:off x="1146820" y="4755984"/>
+                <a:ext cx="5284" cy="1040756"/>
+              </a:xfrm>
+              <a:prstGeom prst="straightConnector1">
+                <a:avLst/>
+              </a:prstGeom>
+              <a:ln w="38100">
+                <a:solidFill>
+                  <a:schemeClr val="tx1"/>
+                </a:solidFill>
+                <a:tailEnd type="triangle"/>
+              </a:ln>
+            </p:spPr>
+            <p:style>
+              <a:lnRef idx="1">
+                <a:schemeClr val="accent1"/>
+              </a:lnRef>
+              <a:fillRef idx="0">
+                <a:schemeClr val="accent1"/>
+              </a:fillRef>
+              <a:effectRef idx="0">
+                <a:schemeClr val="accent1"/>
+              </a:effectRef>
+              <a:fontRef idx="minor">
+                <a:schemeClr val="tx1"/>
+              </a:fontRef>
+            </p:style>
+          </p:cxnSp>
+          <mc:AlternateContent xmlns:mc="http://schemas.openxmlformats.org/markup-compatibility/2006">
+            <mc:Choice xmlns:a14="http://schemas.microsoft.com/office/drawing/2010/main" Requires="a14">
+              <p:sp>
+                <p:nvSpPr>
+                  <p:cNvPr id="81" name="TextBox 80"/>
+                  <p:cNvSpPr txBox="1"/>
+                  <p:nvPr/>
+                </p:nvSpPr>
+                <p:spPr>
+                  <a:xfrm>
+                    <a:off x="782483" y="5105805"/>
+                    <a:ext cx="303865" cy="377219"/>
+                  </a:xfrm>
+                  <a:prstGeom prst="rect">
+                    <a:avLst/>
+                  </a:prstGeom>
+                  <a:noFill/>
+                </p:spPr>
+                <p:txBody>
+                  <a:bodyPr wrap="none" lIns="0" tIns="0" rIns="0" bIns="0" rtlCol="0">
+                    <a:spAutoFit/>
+                  </a:bodyPr>
+                  <a:lstStyle/>
+                  <a:p>
+                    <a14:m>
+                      <m:oMathPara xmlns:m="http://schemas.openxmlformats.org/officeDocument/2006/math">
+                        <m:oMathParaPr>
+                          <m:jc m:val="centerGroup"/>
+                        </m:oMathParaPr>
+                        <m:oMath xmlns:m="http://schemas.openxmlformats.org/officeDocument/2006/math">
+                          <m:sSub>
+                            <m:sSubPr>
+                              <m:ctrlPr>
+                                <a:rPr lang="en-US" sz="2000" b="0" i="1" smtClean="0">
+                                  <a:latin typeface="Cambria Math" panose="02040503050406030204" pitchFamily="18" charset="0"/>
+                                  <a:cs typeface="Arial" panose="020B0604020202020204" pitchFamily="34" charset="0"/>
+                                </a:rPr>
+                              </m:ctrlPr>
+                            </m:sSubPr>
+                            <m:e>
+                              <m:acc>
+                                <m:accPr>
+                                  <m:chr m:val="⃗"/>
+                                  <m:ctrlPr>
+                                    <a:rPr lang="en-US" sz="2000" b="0" i="1" smtClean="0">
+                                      <a:latin typeface="Cambria Math" panose="02040503050406030204" pitchFamily="18" charset="0"/>
+                                      <a:cs typeface="Arial" panose="020B0604020202020204" pitchFamily="34" charset="0"/>
+                                    </a:rPr>
+                                  </m:ctrlPr>
+                                </m:accPr>
+                                <m:e>
+                                  <m:r>
+                                    <a:rPr lang="en-US" sz="2000" b="0" i="1" smtClean="0">
+                                      <a:latin typeface="Cambria Math" panose="02040503050406030204" pitchFamily="18" charset="0"/>
+                                      <a:cs typeface="Arial" panose="020B0604020202020204" pitchFamily="34" charset="0"/>
+                                    </a:rPr>
+                                    <m:t>𝐹</m:t>
+                                  </m:r>
+                                </m:e>
+                              </m:acc>
+                            </m:e>
+                            <m:sub>
+                              <m:r>
+                                <a:rPr lang="en-US" sz="2000" b="0" i="1" smtClean="0">
+                                  <a:latin typeface="Cambria Math" panose="02040503050406030204" pitchFamily="18" charset="0"/>
+                                  <a:cs typeface="Arial" panose="020B0604020202020204" pitchFamily="34" charset="0"/>
+                                </a:rPr>
+                                <m:t>𝑔</m:t>
+                              </m:r>
+                            </m:sub>
+                          </m:sSub>
+                        </m:oMath>
+                      </m:oMathPara>
+                    </a14:m>
+                    <a:endParaRPr lang="en-US" sz="2000" dirty="0" smtClean="0">
+                      <a:latin typeface="Arial" panose="020B0604020202020204" pitchFamily="34" charset="0"/>
+                      <a:cs typeface="Arial" panose="020B0604020202020204" pitchFamily="34" charset="0"/>
+                    </a:endParaRPr>
+                  </a:p>
+                </p:txBody>
+              </p:sp>
+            </mc:Choice>
+            <mc:Fallback>
+              <p:sp>
+                <p:nvSpPr>
+                  <p:cNvPr id="81" name="TextBox 80"/>
+                  <p:cNvSpPr txBox="1">
+                    <a:spLocks noRot="1" noChangeAspect="1" noMove="1" noResize="1" noEditPoints="1" noAdjustHandles="1" noChangeArrowheads="1" noChangeShapeType="1" noTextEdit="1"/>
+                  </p:cNvSpPr>
+                  <p:nvPr/>
+                </p:nvSpPr>
+                <p:spPr>
+                  <a:xfrm>
+                    <a:off x="782483" y="5105805"/>
+                    <a:ext cx="303865" cy="377219"/>
+                  </a:xfrm>
+                  <a:prstGeom prst="rect">
+                    <a:avLst/>
+                  </a:prstGeom>
+                  <a:blipFill>
+                    <a:blip r:embed="rId36"/>
+                    <a:stretch>
+                      <a:fillRect l="-16000" t="-32787" r="-72000" b="-19672"/>
+                    </a:stretch>
+                  </a:blipFill>
+                </p:spPr>
+                <p:txBody>
+                  <a:bodyPr/>
+                  <a:lstStyle/>
+                  <a:p>
+                    <a:r>
+                      <a:rPr lang="en-US">
+                        <a:noFill/>
+                      </a:rPr>
+                      <a:t> </a:t>
+                    </a:r>
+                  </a:p>
+                </p:txBody>
+              </p:sp>
+            </mc:Fallback>
+          </mc:AlternateContent>
+          <p:cxnSp>
+            <p:nvCxnSpPr>
+              <p:cNvPr id="82" name="Straight Arrow Connector 81"/>
+              <p:cNvCxnSpPr/>
+              <p:nvPr/>
+            </p:nvCxnSpPr>
+            <p:spPr>
+              <a:xfrm flipH="1" flipV="1">
+                <a:off x="1108661" y="4330519"/>
+                <a:ext cx="965" cy="369179"/>
+              </a:xfrm>
+              <a:prstGeom prst="straightConnector1">
+                <a:avLst/>
+              </a:prstGeom>
+              <a:ln w="38100">
+                <a:solidFill>
+                  <a:schemeClr val="tx1"/>
+                </a:solidFill>
+                <a:tailEnd type="triangle"/>
+              </a:ln>
+            </p:spPr>
+            <p:style>
+              <a:lnRef idx="1">
+                <a:schemeClr val="accent1"/>
+              </a:lnRef>
+              <a:fillRef idx="0">
+                <a:schemeClr val="accent1"/>
+              </a:fillRef>
+              <a:effectRef idx="0">
+                <a:schemeClr val="accent1"/>
+              </a:effectRef>
+              <a:fontRef idx="minor">
+                <a:schemeClr val="tx1"/>
+              </a:fontRef>
+            </p:style>
+          </p:cxnSp>
+          <p:cxnSp>
+            <p:nvCxnSpPr>
+              <p:cNvPr id="84" name="Straight Arrow Connector 83"/>
+              <p:cNvCxnSpPr/>
+              <p:nvPr/>
+            </p:nvCxnSpPr>
+            <p:spPr>
+              <a:xfrm flipV="1">
+                <a:off x="1191991" y="4020390"/>
+                <a:ext cx="9010" cy="666558"/>
+              </a:xfrm>
+              <a:prstGeom prst="straightConnector1">
+                <a:avLst/>
+              </a:prstGeom>
+              <a:ln w="38100">
+                <a:solidFill>
+                  <a:schemeClr val="tx1"/>
+                </a:solidFill>
+                <a:tailEnd type="triangle"/>
+              </a:ln>
+            </p:spPr>
+            <p:style>
+              <a:lnRef idx="1">
+                <a:schemeClr val="accent1"/>
+              </a:lnRef>
+              <a:fillRef idx="0">
+                <a:schemeClr val="accent1"/>
+              </a:fillRef>
+              <a:effectRef idx="0">
+                <a:schemeClr val="accent1"/>
+              </a:effectRef>
+              <a:fontRef idx="minor">
+                <a:schemeClr val="tx1"/>
+              </a:fontRef>
+            </p:style>
+          </p:cxnSp>
+          <mc:AlternateContent xmlns:mc="http://schemas.openxmlformats.org/markup-compatibility/2006">
+            <mc:Choice xmlns:a14="http://schemas.microsoft.com/office/drawing/2010/main" Requires="a14">
+              <p:sp>
+                <p:nvSpPr>
+                  <p:cNvPr id="93" name="TextBox 92"/>
+                  <p:cNvSpPr txBox="1"/>
+                  <p:nvPr/>
+                </p:nvSpPr>
+                <p:spPr>
+                  <a:xfrm>
+                    <a:off x="723509" y="4291059"/>
+                    <a:ext cx="256847" cy="345159"/>
+                  </a:xfrm>
+                  <a:prstGeom prst="rect">
+                    <a:avLst/>
+                  </a:prstGeom>
+                  <a:noFill/>
+                </p:spPr>
+                <p:txBody>
+                  <a:bodyPr wrap="square" lIns="0" tIns="0" rIns="0" bIns="0" rtlCol="0">
+                    <a:spAutoFit/>
+                  </a:bodyPr>
+                  <a:lstStyle/>
+                  <a:p>
+                    <a14:m>
+                      <m:oMathPara xmlns:m="http://schemas.openxmlformats.org/officeDocument/2006/math">
+                        <m:oMathParaPr>
+                          <m:jc m:val="centerGroup"/>
+                        </m:oMathParaPr>
+                        <m:oMath xmlns:m="http://schemas.openxmlformats.org/officeDocument/2006/math">
+                          <m:sSub>
+                            <m:sSubPr>
+                              <m:ctrlPr>
+                                <a:rPr lang="en-US" sz="2000" b="0" i="1" smtClean="0">
+                                  <a:latin typeface="Cambria Math" panose="02040503050406030204" pitchFamily="18" charset="0"/>
+                                  <a:cs typeface="Arial" panose="020B0604020202020204" pitchFamily="34" charset="0"/>
+                                </a:rPr>
+                              </m:ctrlPr>
+                            </m:sSubPr>
+                            <m:e>
+                              <m:acc>
+                                <m:accPr>
+                                  <m:chr m:val="⃗"/>
+                                  <m:ctrlPr>
+                                    <a:rPr lang="en-US" sz="2000" b="0" i="1" smtClean="0">
+                                      <a:latin typeface="Cambria Math" panose="02040503050406030204" pitchFamily="18" charset="0"/>
+                                      <a:cs typeface="Arial" panose="020B0604020202020204" pitchFamily="34" charset="0"/>
+                                    </a:rPr>
+                                  </m:ctrlPr>
+                                </m:accPr>
+                                <m:e>
+                                  <m:r>
+                                    <a:rPr lang="en-US" sz="2000" b="0" i="1" smtClean="0">
+                                      <a:latin typeface="Cambria Math" panose="02040503050406030204" pitchFamily="18" charset="0"/>
+                                      <a:cs typeface="Arial" panose="020B0604020202020204" pitchFamily="34" charset="0"/>
+                                    </a:rPr>
+                                    <m:t>𝐹</m:t>
+                                  </m:r>
+                                </m:e>
+                              </m:acc>
+                            </m:e>
+                            <m:sub>
+                              <m:r>
+                                <a:rPr lang="en-US" sz="2000" b="0" i="1" smtClean="0">
+                                  <a:latin typeface="Cambria Math" panose="02040503050406030204" pitchFamily="18" charset="0"/>
+                                  <a:cs typeface="Arial" panose="020B0604020202020204" pitchFamily="34" charset="0"/>
+                                </a:rPr>
+                                <m:t>𝐼</m:t>
+                              </m:r>
+                            </m:sub>
+                          </m:sSub>
+                        </m:oMath>
+                      </m:oMathPara>
+                    </a14:m>
+                    <a:endParaRPr lang="en-US" sz="2000" dirty="0" smtClean="0">
+                      <a:latin typeface="Arial" panose="020B0604020202020204" pitchFamily="34" charset="0"/>
+                      <a:cs typeface="Arial" panose="020B0604020202020204" pitchFamily="34" charset="0"/>
+                    </a:endParaRPr>
+                  </a:p>
+                </p:txBody>
+              </p:sp>
+            </mc:Choice>
+            <mc:Fallback>
+              <p:sp>
+                <p:nvSpPr>
+                  <p:cNvPr id="93" name="TextBox 92"/>
+                  <p:cNvSpPr txBox="1">
+                    <a:spLocks noRot="1" noChangeAspect="1" noMove="1" noResize="1" noEditPoints="1" noAdjustHandles="1" noChangeArrowheads="1" noChangeShapeType="1" noTextEdit="1"/>
+                  </p:cNvSpPr>
+                  <p:nvPr/>
+                </p:nvSpPr>
+                <p:spPr>
+                  <a:xfrm>
+                    <a:off x="723509" y="4291059"/>
+                    <a:ext cx="256847" cy="345159"/>
+                  </a:xfrm>
+                  <a:prstGeom prst="rect">
+                    <a:avLst/>
+                  </a:prstGeom>
+                  <a:blipFill>
+                    <a:blip r:embed="rId37"/>
+                    <a:stretch>
+                      <a:fillRect l="-28571" t="-35088" r="-76190" b="-15789"/>
+                    </a:stretch>
+                  </a:blipFill>
+                </p:spPr>
+                <p:txBody>
+                  <a:bodyPr/>
+                  <a:lstStyle/>
+                  <a:p>
+                    <a:r>
+                      <a:rPr lang="en-US">
+                        <a:noFill/>
+                      </a:rPr>
+                      <a:t> </a:t>
+                    </a:r>
+                  </a:p>
+                </p:txBody>
+              </p:sp>
+            </mc:Fallback>
+          </mc:AlternateContent>
+          <mc:AlternateContent xmlns:mc="http://schemas.openxmlformats.org/markup-compatibility/2006">
+            <mc:Choice xmlns:a14="http://schemas.microsoft.com/office/drawing/2010/main" Requires="a14">
+              <p:sp>
+                <p:nvSpPr>
+                  <p:cNvPr id="94" name="TextBox 93"/>
+                  <p:cNvSpPr txBox="1"/>
+                  <p:nvPr/>
+                </p:nvSpPr>
+                <p:spPr>
+                  <a:xfrm>
+                    <a:off x="1252149" y="4157843"/>
+                    <a:ext cx="256847" cy="345351"/>
+                  </a:xfrm>
+                  <a:prstGeom prst="rect">
+                    <a:avLst/>
+                  </a:prstGeom>
+                  <a:noFill/>
+                </p:spPr>
+                <p:txBody>
+                  <a:bodyPr wrap="square" lIns="0" tIns="0" rIns="0" bIns="0" rtlCol="0">
+                    <a:spAutoFit/>
+                  </a:bodyPr>
+                  <a:lstStyle/>
+                  <a:p>
+                    <a14:m>
+                      <m:oMathPara xmlns:m="http://schemas.openxmlformats.org/officeDocument/2006/math">
+                        <m:oMathParaPr>
+                          <m:jc m:val="centerGroup"/>
+                        </m:oMathParaPr>
+                        <m:oMath xmlns:m="http://schemas.openxmlformats.org/officeDocument/2006/math">
+                          <m:acc>
+                            <m:accPr>
+                              <m:chr m:val="⃗"/>
+                              <m:ctrlPr>
+                                <a:rPr lang="en-US" sz="2000" b="0" i="1" smtClean="0">
+                                  <a:latin typeface="Cambria Math" panose="02040503050406030204" pitchFamily="18" charset="0"/>
+                                  <a:cs typeface="Arial" panose="020B0604020202020204" pitchFamily="34" charset="0"/>
+                                </a:rPr>
+                              </m:ctrlPr>
+                            </m:accPr>
+                            <m:e>
+                              <m:r>
+                                <a:rPr lang="en-US" sz="2000" b="0" i="1" smtClean="0">
+                                  <a:latin typeface="Cambria Math" panose="02040503050406030204" pitchFamily="18" charset="0"/>
+                                  <a:cs typeface="Arial" panose="020B0604020202020204" pitchFamily="34" charset="0"/>
+                                </a:rPr>
+                                <m:t>𝑁</m:t>
+                              </m:r>
+                            </m:e>
+                          </m:acc>
+                        </m:oMath>
+                      </m:oMathPara>
+                    </a14:m>
+                    <a:endParaRPr lang="en-US" sz="2000" dirty="0" smtClean="0">
+                      <a:latin typeface="Arial" panose="020B0604020202020204" pitchFamily="34" charset="0"/>
+                      <a:cs typeface="Arial" panose="020B0604020202020204" pitchFamily="34" charset="0"/>
+                    </a:endParaRPr>
+                  </a:p>
+                </p:txBody>
+              </p:sp>
+            </mc:Choice>
+            <mc:Fallback>
+              <p:sp>
+                <p:nvSpPr>
+                  <p:cNvPr id="94" name="TextBox 93"/>
+                  <p:cNvSpPr txBox="1">
+                    <a:spLocks noRot="1" noChangeAspect="1" noMove="1" noResize="1" noEditPoints="1" noAdjustHandles="1" noChangeArrowheads="1" noChangeShapeType="1" noTextEdit="1"/>
+                  </p:cNvSpPr>
+                  <p:nvPr/>
+                </p:nvSpPr>
+                <p:spPr>
+                  <a:xfrm>
+                    <a:off x="1252149" y="4157843"/>
+                    <a:ext cx="256847" cy="345351"/>
+                  </a:xfrm>
+                  <a:prstGeom prst="rect">
+                    <a:avLst/>
+                  </a:prstGeom>
+                  <a:blipFill>
+                    <a:blip r:embed="rId38"/>
+                    <a:stretch>
+                      <a:fillRect l="-20930" r="-18605" b="-8772"/>
+                    </a:stretch>
+                  </a:blipFill>
+                </p:spPr>
+                <p:txBody>
+                  <a:bodyPr/>
+                  <a:lstStyle/>
+                  <a:p>
+                    <a:r>
+                      <a:rPr lang="en-US">
+                        <a:noFill/>
+                      </a:rPr>
+                      <a:t> </a:t>
+                    </a:r>
+                  </a:p>
+                </p:txBody>
+              </p:sp>
+            </mc:Fallback>
+          </mc:AlternateContent>
+        </p:grpSp>
+        <p:grpSp>
+          <p:nvGrpSpPr>
+            <p:cNvPr id="96" name="Group 95"/>
+            <p:cNvGrpSpPr/>
+            <p:nvPr/>
+          </p:nvGrpSpPr>
+          <p:grpSpPr>
+            <a:xfrm>
+              <a:off x="274114" y="5561508"/>
+              <a:ext cx="898789" cy="709995"/>
+              <a:chOff x="758520" y="708040"/>
+              <a:chExt cx="2596102" cy="2135605"/>
+            </a:xfrm>
+          </p:grpSpPr>
+          <p:grpSp>
+            <p:nvGrpSpPr>
+              <p:cNvPr id="97" name="Group 96"/>
+              <p:cNvGrpSpPr/>
+              <p:nvPr/>
+            </p:nvGrpSpPr>
+            <p:grpSpPr>
+              <a:xfrm>
+                <a:off x="758520" y="708040"/>
+                <a:ext cx="2596102" cy="2135605"/>
+                <a:chOff x="785815" y="680744"/>
+                <a:chExt cx="2596102" cy="2135605"/>
+              </a:xfrm>
+            </p:grpSpPr>
+            <p:cxnSp>
+              <p:nvCxnSpPr>
+                <p:cNvPr id="99" name="Straight Arrow Connector 98"/>
+                <p:cNvCxnSpPr/>
+                <p:nvPr/>
+              </p:nvCxnSpPr>
+              <p:spPr>
+                <a:xfrm flipV="1">
+                  <a:off x="1516583" y="680744"/>
+                  <a:ext cx="7683" cy="1859535"/>
+                </a:xfrm>
+                <a:prstGeom prst="straightConnector1">
+                  <a:avLst/>
+                </a:prstGeom>
+                <a:ln w="38100">
+                  <a:solidFill>
+                    <a:schemeClr val="tx1"/>
+                  </a:solidFill>
+                  <a:tailEnd type="triangle"/>
+                </a:ln>
+              </p:spPr>
+              <p:style>
+                <a:lnRef idx="1">
+                  <a:schemeClr val="accent1"/>
+                </a:lnRef>
+                <a:fillRef idx="0">
+                  <a:schemeClr val="accent1"/>
+                </a:fillRef>
+                <a:effectRef idx="0">
+                  <a:schemeClr val="accent1"/>
+                </a:effectRef>
+                <a:fontRef idx="minor">
+                  <a:schemeClr val="tx1"/>
+                </a:fontRef>
+              </p:style>
+            </p:cxnSp>
+            <p:cxnSp>
+              <p:nvCxnSpPr>
+                <p:cNvPr id="100" name="Straight Arrow Connector 99"/>
+                <p:cNvCxnSpPr/>
+                <p:nvPr/>
+              </p:nvCxnSpPr>
+              <p:spPr>
+                <a:xfrm flipV="1">
+                  <a:off x="1507013" y="2535259"/>
+                  <a:ext cx="1874904" cy="1"/>
+                </a:xfrm>
+                <a:prstGeom prst="straightConnector1">
+                  <a:avLst/>
+                </a:prstGeom>
+                <a:ln w="38100">
+                  <a:solidFill>
+                    <a:schemeClr val="tx1"/>
+                  </a:solidFill>
+                  <a:tailEnd type="triangle"/>
+                </a:ln>
+              </p:spPr>
+              <p:style>
+                <a:lnRef idx="1">
+                  <a:schemeClr val="accent1"/>
+                </a:lnRef>
+                <a:fillRef idx="0">
+                  <a:schemeClr val="accent1"/>
+                </a:fillRef>
+                <a:effectRef idx="0">
+                  <a:schemeClr val="accent1"/>
+                </a:effectRef>
+                <a:fontRef idx="minor">
+                  <a:schemeClr val="tx1"/>
+                </a:fontRef>
+              </p:style>
+            </p:cxnSp>
+            <mc:AlternateContent xmlns:mc="http://schemas.openxmlformats.org/markup-compatibility/2006" xmlns:a14="http://schemas.microsoft.com/office/drawing/2010/main">
+              <mc:Choice Requires="a14">
+                <p:sp>
+                  <p:nvSpPr>
+                    <p:cNvPr id="101" name="Rectangle 100"/>
+                    <p:cNvSpPr/>
+                    <p:nvPr/>
+                  </p:nvSpPr>
+                  <p:spPr>
+                    <a:xfrm>
+                      <a:off x="2697555" y="2447016"/>
+                      <a:ext cx="367985" cy="369333"/>
+                    </a:xfrm>
+                    <a:prstGeom prst="rect">
+                      <a:avLst/>
+                    </a:prstGeom>
+                  </p:spPr>
+                  <p:txBody>
+                    <a:bodyPr wrap="none">
+                      <a:spAutoFit/>
+                    </a:bodyPr>
+                    <a:lstStyle/>
+                    <a:p>
+                      <a:pPr/>
+                      <a14:m>
+                        <m:oMathPara xmlns:m="http://schemas.openxmlformats.org/officeDocument/2006/math">
+                          <m:oMathParaPr>
+                            <m:jc m:val="centerGroup"/>
+                          </m:oMathParaPr>
+                          <m:oMath xmlns:m="http://schemas.openxmlformats.org/officeDocument/2006/math">
+                            <m:r>
+                              <a:rPr lang="en-US" i="1">
+                                <a:latin typeface="Cambria Math" panose="02040503050406030204" pitchFamily="18" charset="0"/>
+                                <a:cs typeface="Arial" panose="020B0604020202020204" pitchFamily="34" charset="0"/>
+                              </a:rPr>
+                              <m:t>𝑥</m:t>
+                            </m:r>
+                          </m:oMath>
+                        </m:oMathPara>
+                      </a14:m>
+                      <a:endParaRPr lang="en-CA" dirty="0"/>
+                    </a:p>
+                  </p:txBody>
+                </p:sp>
+              </mc:Choice>
+              <mc:Fallback xmlns="">
+                <p:sp>
+                  <p:nvSpPr>
+                    <p:cNvPr id="107" name="Rectangle 106"/>
+                    <p:cNvSpPr>
+                      <a:spLocks noRot="1" noChangeAspect="1" noMove="1" noResize="1" noEditPoints="1" noAdjustHandles="1" noChangeArrowheads="1" noChangeShapeType="1" noTextEdit="1"/>
+                    </p:cNvSpPr>
+                    <p:nvPr/>
+                  </p:nvSpPr>
+                  <p:spPr>
+                    <a:xfrm>
+                      <a:off x="2697555" y="2447016"/>
+                      <a:ext cx="367985" cy="369333"/>
+                    </a:xfrm>
+                    <a:prstGeom prst="rect">
+                      <a:avLst/>
+                    </a:prstGeom>
+                    <a:blipFill>
+                      <a:blip r:embed="rId27"/>
+                      <a:stretch>
+                        <a:fillRect r="-95238" b="-160000"/>
+                      </a:stretch>
+                    </a:blipFill>
+                  </p:spPr>
+                  <p:txBody>
+                    <a:bodyPr/>
+                    <a:lstStyle/>
+                    <a:p>
+                      <a:r>
+                        <a:rPr lang="en-US">
+                          <a:noFill/>
+                        </a:rPr>
+                        <a:t> </a:t>
+                      </a:r>
+                    </a:p>
+                  </p:txBody>
+                </p:sp>
+              </mc:Fallback>
+            </mc:AlternateContent>
+            <mc:AlternateContent xmlns:mc="http://schemas.openxmlformats.org/markup-compatibility/2006" xmlns:a14="http://schemas.microsoft.com/office/drawing/2010/main">
+              <mc:Choice Requires="a14">
+                <p:sp>
+                  <p:nvSpPr>
+                    <p:cNvPr id="102" name="Rectangle 101"/>
+                    <p:cNvSpPr/>
+                    <p:nvPr/>
+                  </p:nvSpPr>
+                  <p:spPr>
+                    <a:xfrm>
+                      <a:off x="785815" y="912420"/>
+                      <a:ext cx="371385" cy="369333"/>
+                    </a:xfrm>
+                    <a:prstGeom prst="rect">
+                      <a:avLst/>
+                    </a:prstGeom>
+                  </p:spPr>
+                  <p:txBody>
+                    <a:bodyPr wrap="none">
+                      <a:spAutoFit/>
+                    </a:bodyPr>
+                    <a:lstStyle/>
+                    <a:p>
+                      <a:pPr/>
+                      <a14:m>
+                        <m:oMathPara xmlns:m="http://schemas.openxmlformats.org/officeDocument/2006/math">
+                          <m:oMathParaPr>
+                            <m:jc m:val="centerGroup"/>
+                          </m:oMathParaPr>
+                          <m:oMath xmlns:m="http://schemas.openxmlformats.org/officeDocument/2006/math">
+                            <m:r>
+                              <a:rPr lang="en-US" b="0" i="1" smtClean="0">
+                                <a:latin typeface="Cambria Math" panose="02040503050406030204" pitchFamily="18" charset="0"/>
+                              </a:rPr>
+                              <m:t>𝑦</m:t>
+                            </m:r>
+                          </m:oMath>
+                        </m:oMathPara>
+                      </a14:m>
+                      <a:endParaRPr lang="en-CA" dirty="0"/>
+                    </a:p>
+                  </p:txBody>
+                </p:sp>
+              </mc:Choice>
+              <mc:Fallback xmlns="">
+                <p:sp>
+                  <p:nvSpPr>
+                    <p:cNvPr id="108" name="Rectangle 107"/>
+                    <p:cNvSpPr>
+                      <a:spLocks noRot="1" noChangeAspect="1" noMove="1" noResize="1" noEditPoints="1" noAdjustHandles="1" noChangeArrowheads="1" noChangeShapeType="1" noTextEdit="1"/>
+                    </p:cNvSpPr>
+                    <p:nvPr/>
+                  </p:nvSpPr>
+                  <p:spPr>
+                    <a:xfrm>
+                      <a:off x="785815" y="912420"/>
+                      <a:ext cx="371385" cy="369333"/>
+                    </a:xfrm>
+                    <a:prstGeom prst="rect">
+                      <a:avLst/>
+                    </a:prstGeom>
+                    <a:blipFill>
+                      <a:blip r:embed="rId28"/>
+                      <a:stretch>
+                        <a:fillRect l="-19048" r="-114286" b="-220000"/>
+                      </a:stretch>
+                    </a:blipFill>
+                  </p:spPr>
+                  <p:txBody>
+                    <a:bodyPr/>
+                    <a:lstStyle/>
+                    <a:p>
+                      <a:r>
+                        <a:rPr lang="en-US">
+                          <a:noFill/>
+                        </a:rPr>
+                        <a:t> </a:t>
+                      </a:r>
+                    </a:p>
+                  </p:txBody>
+                </p:sp>
+              </mc:Fallback>
+            </mc:AlternateContent>
+            <mc:AlternateContent xmlns:mc="http://schemas.openxmlformats.org/markup-compatibility/2006" xmlns:a14="http://schemas.microsoft.com/office/drawing/2010/main">
+              <mc:Choice Requires="a14">
+                <p:sp>
+                  <p:nvSpPr>
+                    <p:cNvPr id="103" name="Rectangle 102"/>
+                    <p:cNvSpPr/>
+                    <p:nvPr/>
+                  </p:nvSpPr>
+                  <p:spPr>
+                    <a:xfrm>
+                      <a:off x="1006642" y="2350591"/>
+                      <a:ext cx="367985" cy="369333"/>
+                    </a:xfrm>
+                    <a:prstGeom prst="rect">
+                      <a:avLst/>
+                    </a:prstGeom>
+                  </p:spPr>
+                  <p:txBody>
+                    <a:bodyPr wrap="none">
+                      <a:spAutoFit/>
+                    </a:bodyPr>
+                    <a:lstStyle/>
+                    <a:p>
+                      <a:pPr/>
+                      <a14:m>
+                        <m:oMathPara xmlns:m="http://schemas.openxmlformats.org/officeDocument/2006/math">
+                          <m:oMathParaPr>
+                            <m:jc m:val="centerGroup"/>
+                          </m:oMathParaPr>
+                          <m:oMath xmlns:m="http://schemas.openxmlformats.org/officeDocument/2006/math">
+                            <m:r>
+                              <a:rPr lang="en-US" b="0" i="1" smtClean="0">
+                                <a:latin typeface="Cambria Math" panose="02040503050406030204" pitchFamily="18" charset="0"/>
+                                <a:cs typeface="Arial" panose="020B0604020202020204" pitchFamily="34" charset="0"/>
+                              </a:rPr>
+                              <m:t>0</m:t>
+                            </m:r>
+                          </m:oMath>
+                        </m:oMathPara>
+                      </a14:m>
+                      <a:endParaRPr lang="en-CA" dirty="0"/>
+                    </a:p>
+                  </p:txBody>
+                </p:sp>
+              </mc:Choice>
+              <mc:Fallback xmlns="">
+                <p:sp>
+                  <p:nvSpPr>
+                    <p:cNvPr id="109" name="Rectangle 108"/>
+                    <p:cNvSpPr>
+                      <a:spLocks noRot="1" noChangeAspect="1" noMove="1" noResize="1" noEditPoints="1" noAdjustHandles="1" noChangeArrowheads="1" noChangeShapeType="1" noTextEdit="1"/>
+                    </p:cNvSpPr>
+                    <p:nvPr/>
+                  </p:nvSpPr>
+                  <p:spPr>
+                    <a:xfrm>
+                      <a:off x="1006642" y="2350591"/>
+                      <a:ext cx="367985" cy="369333"/>
+                    </a:xfrm>
+                    <a:prstGeom prst="rect">
+                      <a:avLst/>
+                    </a:prstGeom>
+                    <a:blipFill>
+                      <a:blip r:embed="rId29"/>
+                      <a:stretch>
+                        <a:fillRect l="-14286" r="-114286" b="-180000"/>
+                      </a:stretch>
+                    </a:blipFill>
+                  </p:spPr>
+                  <p:txBody>
+                    <a:bodyPr/>
+                    <a:lstStyle/>
+                    <a:p>
+                      <a:r>
+                        <a:rPr lang="en-US">
+                          <a:noFill/>
+                        </a:rPr>
+                        <a:t> </a:t>
+                      </a:r>
+                    </a:p>
+                  </p:txBody>
+                </p:sp>
+              </mc:Fallback>
+            </mc:AlternateContent>
+          </p:grpSp>
+          <p:sp>
+            <p:nvSpPr>
+              <p:cNvPr id="98" name="Rectangle 97"/>
+              <p:cNvSpPr/>
+              <p:nvPr/>
+            </p:nvSpPr>
+            <p:spPr>
+              <a:xfrm>
+                <a:off x="1129904" y="1614682"/>
+                <a:ext cx="184731" cy="369332"/>
+              </a:xfrm>
+              <a:prstGeom prst="rect">
+                <a:avLst/>
+              </a:prstGeom>
+            </p:spPr>
+            <p:txBody>
+              <a:bodyPr wrap="none">
+                <a:spAutoFit/>
+              </a:bodyPr>
+              <a:lstStyle/>
+              <a:p>
+                <a:endParaRPr lang="en-CA" dirty="0"/>
+              </a:p>
+            </p:txBody>
+          </p:sp>
+        </p:grpSp>
+      </p:grpSp>
+    </p:spTree>
+    <p:extLst>
+      <p:ext uri="{BB962C8B-B14F-4D97-AF65-F5344CB8AC3E}">
+        <p14:creationId xmlns:p14="http://schemas.microsoft.com/office/powerpoint/2010/main" val="158896140"/>
+      </p:ext>
+    </p:extLst>
+  </p:cSld>
+  <p:clrMapOvr>
+    <a:masterClrMapping/>
+  </p:clrMapOvr>
+</p:sld>
+</file>
+
+<file path=ppt/slides/slide7.xml><?xml version="1.0" encoding="utf-8"?>
+<p:sld xmlns:a="http://schemas.openxmlformats.org/drawingml/2006/main" xmlns:r="http://schemas.openxmlformats.org/officeDocument/2006/relationships" xmlns:p="http://schemas.openxmlformats.org/presentationml/2006/main">
+  <p:cSld>
+    <p:spTree>
+      <p:nvGrpSpPr>
+        <p:cNvPr id="1" name=""/>
+        <p:cNvGrpSpPr/>
+        <p:nvPr/>
+      </p:nvGrpSpPr>
+      <p:grpSpPr>
+        <a:xfrm>
+          <a:off x="0" y="0"/>
+          <a:ext cx="0" cy="0"/>
+          <a:chOff x="0" y="0"/>
+          <a:chExt cx="0" cy="0"/>
+        </a:xfrm>
+      </p:grpSpPr>
+      <p:grpSp>
+        <p:nvGrpSpPr>
           <p:cNvPr id="30" name="Group 29">
             <a:extLst>
               <a:ext uri="{FF2B5EF4-FFF2-40B4-BE49-F238E27FC236}">
@@ -22252,7 +25973,7 @@
             <p:nvPr/>
           </p:nvPicPr>
           <p:blipFill rotWithShape="1">
-            <a:blip r:embed="rId2">
+            <a:blip r:embed="rId2" cstate="print">
               <a:extLst>
                 <a:ext uri="{28A0092B-C50C-407E-A947-70E740481C1C}">
                   <a14:useLocalDpi xmlns:a14="http://schemas.microsoft.com/office/drawing/2010/main" val="0"/>
@@ -22343,7 +26064,7 @@
             <p:nvPr/>
           </p:nvPicPr>
           <p:blipFill>
-            <a:blip r:embed="rId3">
+            <a:blip r:embed="rId3" cstate="print">
               <a:extLst>
                 <a:ext uri="{28A0092B-C50C-407E-A947-70E740481C1C}">
                   <a14:useLocalDpi xmlns:a14="http://schemas.microsoft.com/office/drawing/2010/main" val="0"/>
@@ -22378,7 +26099,7 @@
 </p:sld>
 </file>
 
-<file path=ppt/slides/slide7.xml><?xml version="1.0" encoding="utf-8"?>
+<file path=ppt/slides/slide8.xml><?xml version="1.0" encoding="utf-8"?>
 <p:sld xmlns:a="http://schemas.openxmlformats.org/drawingml/2006/main" xmlns:r="http://schemas.openxmlformats.org/officeDocument/2006/relationships" xmlns:p="http://schemas.openxmlformats.org/presentationml/2006/main">
   <p:cSld>
     <p:spTree>
@@ -22451,8 +26172,8 @@
             </a:prstGeom>
           </p:spPr>
         </p:pic>
-        <mc:AlternateContent xmlns:mc="http://schemas.openxmlformats.org/markup-compatibility/2006">
-          <mc:Choice xmlns:a14="http://schemas.microsoft.com/office/drawing/2010/main" Requires="a14">
+        <mc:AlternateContent xmlns:mc="http://schemas.openxmlformats.org/markup-compatibility/2006" xmlns:a14="http://schemas.microsoft.com/office/drawing/2010/main">
+          <mc:Choice Requires="a14">
             <p:sp>
               <p:nvSpPr>
                 <p:cNvPr id="21" name="TextBox 20">
@@ -22532,7 +26253,7 @@
               </p:txBody>
             </p:sp>
           </mc:Choice>
-          <mc:Fallback>
+          <mc:Fallback xmlns="">
             <p:sp>
               <p:nvSpPr>
                 <p:cNvPr id="21" name="TextBox 20">
@@ -22799,8 +26520,8 @@
                 </a:fontRef>
               </p:style>
             </p:cxnSp>
-            <mc:AlternateContent xmlns:mc="http://schemas.openxmlformats.org/markup-compatibility/2006">
-              <mc:Choice xmlns:a14="http://schemas.microsoft.com/office/drawing/2010/main" Requires="a14">
+            <mc:AlternateContent xmlns:mc="http://schemas.openxmlformats.org/markup-compatibility/2006" xmlns:a14="http://schemas.microsoft.com/office/drawing/2010/main">
+              <mc:Choice Requires="a14">
                 <p:sp>
                   <p:nvSpPr>
                     <p:cNvPr id="38" name="TextBox 37">
@@ -22880,7 +26601,7 @@
                   </p:txBody>
                 </p:sp>
               </mc:Choice>
-              <mc:Fallback>
+              <mc:Fallback xmlns="">
                 <p:sp>
                   <p:nvSpPr>
                     <p:cNvPr id="38" name="TextBox 37">
@@ -22925,8 +26646,8 @@
                 </p:sp>
               </mc:Fallback>
             </mc:AlternateContent>
-            <mc:AlternateContent xmlns:mc="http://schemas.openxmlformats.org/markup-compatibility/2006">
-              <mc:Choice xmlns:a14="http://schemas.microsoft.com/office/drawing/2010/main" Requires="a14">
+            <mc:AlternateContent xmlns:mc="http://schemas.openxmlformats.org/markup-compatibility/2006" xmlns:a14="http://schemas.microsoft.com/office/drawing/2010/main">
+              <mc:Choice Requires="a14">
                 <p:sp>
                   <p:nvSpPr>
                     <p:cNvPr id="39" name="TextBox 38">
@@ -23014,7 +26735,7 @@
                   </p:txBody>
                 </p:sp>
               </mc:Choice>
-              <mc:Fallback>
+              <mc:Fallback xmlns="">
                 <p:sp>
                   <p:nvSpPr>
                     <p:cNvPr id="39" name="TextBox 38">
@@ -23059,8 +26780,8 @@
                 </p:sp>
               </mc:Fallback>
             </mc:AlternateContent>
-            <mc:AlternateContent xmlns:mc="http://schemas.openxmlformats.org/markup-compatibility/2006">
-              <mc:Choice xmlns:a14="http://schemas.microsoft.com/office/drawing/2010/main" Requires="a14">
+            <mc:AlternateContent xmlns:mc="http://schemas.openxmlformats.org/markup-compatibility/2006" xmlns:a14="http://schemas.microsoft.com/office/drawing/2010/main">
+              <mc:Choice Requires="a14">
                 <p:sp>
                   <p:nvSpPr>
                     <p:cNvPr id="40" name="TextBox 39">
@@ -23148,7 +26869,7 @@
                   </p:txBody>
                 </p:sp>
               </mc:Choice>
-              <mc:Fallback>
+              <mc:Fallback xmlns="">
                 <p:sp>
                   <p:nvSpPr>
                     <p:cNvPr id="40" name="TextBox 39">
@@ -23372,8 +27093,8 @@
                   </a:fontRef>
                 </p:style>
               </p:cxnSp>
-              <mc:AlternateContent xmlns:mc="http://schemas.openxmlformats.org/markup-compatibility/2006">
-                <mc:Choice xmlns:a14="http://schemas.microsoft.com/office/drawing/2010/main" Requires="a14">
+              <mc:AlternateContent xmlns:mc="http://schemas.openxmlformats.org/markup-compatibility/2006" xmlns:a14="http://schemas.microsoft.com/office/drawing/2010/main">
+                <mc:Choice Requires="a14">
                   <p:sp>
                     <p:nvSpPr>
                       <p:cNvPr id="30" name="Rectangle 29">
@@ -23423,7 +27144,7 @@
                     </p:txBody>
                   </p:sp>
                 </mc:Choice>
-                <mc:Fallback>
+                <mc:Fallback xmlns="">
                   <p:sp>
                     <p:nvSpPr>
                       <p:cNvPr id="30" name="Rectangle 29">
@@ -23468,8 +27189,8 @@
                   </p:sp>
                 </mc:Fallback>
               </mc:AlternateContent>
-              <mc:AlternateContent xmlns:mc="http://schemas.openxmlformats.org/markup-compatibility/2006">
-                <mc:Choice xmlns:a14="http://schemas.microsoft.com/office/drawing/2010/main" Requires="a14">
+              <mc:AlternateContent xmlns:mc="http://schemas.openxmlformats.org/markup-compatibility/2006" xmlns:a14="http://schemas.microsoft.com/office/drawing/2010/main">
+                <mc:Choice Requires="a14">
                   <p:sp>
                     <p:nvSpPr>
                       <p:cNvPr id="31" name="Rectangle 30">
@@ -23518,7 +27239,7 @@
                     </p:txBody>
                   </p:sp>
                 </mc:Choice>
-                <mc:Fallback>
+                <mc:Fallback xmlns="">
                   <p:sp>
                     <p:nvSpPr>
                       <p:cNvPr id="31" name="Rectangle 30">
@@ -23563,8 +27284,8 @@
                   </p:sp>
                 </mc:Fallback>
               </mc:AlternateContent>
-              <mc:AlternateContent xmlns:mc="http://schemas.openxmlformats.org/markup-compatibility/2006">
-                <mc:Choice xmlns:a14="http://schemas.microsoft.com/office/drawing/2010/main" Requires="a14">
+              <mc:AlternateContent xmlns:mc="http://schemas.openxmlformats.org/markup-compatibility/2006" xmlns:a14="http://schemas.microsoft.com/office/drawing/2010/main">
+                <mc:Choice Requires="a14">
                   <p:sp>
                     <p:nvSpPr>
                       <p:cNvPr id="32" name="Rectangle 31">
@@ -23614,7 +27335,7 @@
                     </p:txBody>
                   </p:sp>
                 </mc:Choice>
-                <mc:Fallback>
+                <mc:Fallback xmlns="">
                   <p:sp>
                     <p:nvSpPr>
                       <p:cNvPr id="32" name="Rectangle 31">
@@ -23698,36 +27419,6 @@
     <p:extLst>
       <p:ext uri="{BB962C8B-B14F-4D97-AF65-F5344CB8AC3E}">
         <p14:creationId xmlns:p14="http://schemas.microsoft.com/office/powerpoint/2010/main" val="84189185"/>
-      </p:ext>
-    </p:extLst>
-  </p:cSld>
-  <p:clrMapOvr>
-    <a:masterClrMapping/>
-  </p:clrMapOvr>
-</p:sld>
-</file>
-
-<file path=ppt/slides/slide8.xml><?xml version="1.0" encoding="utf-8"?>
-<p:sld xmlns:a="http://schemas.openxmlformats.org/drawingml/2006/main" xmlns:r="http://schemas.openxmlformats.org/officeDocument/2006/relationships" xmlns:p="http://schemas.openxmlformats.org/presentationml/2006/main">
-  <p:cSld>
-    <p:spTree>
-      <p:nvGrpSpPr>
-        <p:cNvPr id="1" name=""/>
-        <p:cNvGrpSpPr/>
-        <p:nvPr/>
-      </p:nvGrpSpPr>
-      <p:grpSpPr>
-        <a:xfrm>
-          <a:off x="0" y="0"/>
-          <a:ext cx="0" cy="0"/>
-          <a:chOff x="0" y="0"/>
-          <a:chExt cx="0" cy="0"/>
-        </a:xfrm>
-      </p:grpSpPr>
-    </p:spTree>
-    <p:extLst>
-      <p:ext uri="{BB962C8B-B14F-4D97-AF65-F5344CB8AC3E}">
-        <p14:creationId xmlns:p14="http://schemas.microsoft.com/office/powerpoint/2010/main" val="158896140"/>
       </p:ext>
     </p:extLst>
   </p:cSld>

</xml_diff>

<commit_message>
temp commit, does not compile
</commit_message>
<xml_diff>
--- a/tex/figures/NewtonsLaws/Figures.pptx
+++ b/tex/figures/NewtonsLaws/Figures.pptx
@@ -12,6 +12,7 @@
     <p:sldId id="267" r:id="rId6"/>
     <p:sldId id="270" r:id="rId7"/>
     <p:sldId id="268" r:id="rId8"/>
+    <p:sldId id="271" r:id="rId9"/>
   </p:sldIdLst>
   <p:sldSz cx="12192000" cy="6858000"/>
   <p:notesSz cx="6858000" cy="9144000"/>
@@ -26112,7 +26113,7 @@
         </p:nvGrpSpPr>
         <p:grpSpPr>
           <a:xfrm>
-            <a:off x="2303814" y="1344335"/>
+            <a:off x="272805" y="1802960"/>
             <a:ext cx="4350574" cy="3176135"/>
             <a:chOff x="2303814" y="1344335"/>
             <a:chExt cx="4350574" cy="3176135"/>
@@ -26291,10 +26292,3633 @@
           </p:spPr>
         </p:pic>
       </p:grpSp>
+      <p:grpSp>
+        <p:nvGrpSpPr>
+          <p:cNvPr id="46" name="Group 45"/>
+          <p:cNvGrpSpPr/>
+          <p:nvPr/>
+        </p:nvGrpSpPr>
+        <p:grpSpPr>
+          <a:xfrm>
+            <a:off x="6687665" y="1551245"/>
+            <a:ext cx="2282928" cy="2681324"/>
+            <a:chOff x="6687665" y="1551245"/>
+            <a:chExt cx="2282928" cy="2681324"/>
+          </a:xfrm>
+        </p:grpSpPr>
+        <p:sp>
+          <p:nvSpPr>
+            <p:cNvPr id="10" name="Oval 9"/>
+            <p:cNvSpPr/>
+            <p:nvPr/>
+          </p:nvSpPr>
+          <p:spPr>
+            <a:xfrm>
+              <a:off x="8138829" y="3063633"/>
+              <a:ext cx="120943" cy="119766"/>
+            </a:xfrm>
+            <a:prstGeom prst="ellipse">
+              <a:avLst/>
+            </a:prstGeom>
+            <a:solidFill>
+              <a:schemeClr val="tx1"/>
+            </a:solidFill>
+            <a:ln w="38100">
+              <a:solidFill>
+                <a:schemeClr val="tx1"/>
+              </a:solidFill>
+            </a:ln>
+          </p:spPr>
+          <p:style>
+            <a:lnRef idx="2">
+              <a:schemeClr val="accent1">
+                <a:shade val="50000"/>
+              </a:schemeClr>
+            </a:lnRef>
+            <a:fillRef idx="1">
+              <a:schemeClr val="accent1"/>
+            </a:fillRef>
+            <a:effectRef idx="0">
+              <a:schemeClr val="accent1"/>
+            </a:effectRef>
+            <a:fontRef idx="minor">
+              <a:schemeClr val="lt1"/>
+            </a:fontRef>
+          </p:style>
+          <p:txBody>
+            <a:bodyPr rtlCol="0" anchor="ctr"/>
+            <a:lstStyle/>
+            <a:p>
+              <a:pPr algn="ctr"/>
+              <a:endParaRPr lang="en-US"/>
+            </a:p>
+          </p:txBody>
+        </p:sp>
+        <p:cxnSp>
+          <p:nvCxnSpPr>
+            <p:cNvPr id="11" name="Straight Arrow Connector 10"/>
+            <p:cNvCxnSpPr/>
+            <p:nvPr/>
+          </p:nvCxnSpPr>
+          <p:spPr>
+            <a:xfrm>
+              <a:off x="8190908" y="3149103"/>
+              <a:ext cx="9502" cy="924411"/>
+            </a:xfrm>
+            <a:prstGeom prst="straightConnector1">
+              <a:avLst/>
+            </a:prstGeom>
+            <a:ln w="38100">
+              <a:solidFill>
+                <a:schemeClr val="tx1"/>
+              </a:solidFill>
+              <a:tailEnd type="triangle"/>
+            </a:ln>
+          </p:spPr>
+          <p:style>
+            <a:lnRef idx="1">
+              <a:schemeClr val="accent1"/>
+            </a:lnRef>
+            <a:fillRef idx="0">
+              <a:schemeClr val="accent1"/>
+            </a:fillRef>
+            <a:effectRef idx="0">
+              <a:schemeClr val="accent1"/>
+            </a:effectRef>
+            <a:fontRef idx="minor">
+              <a:schemeClr val="tx1"/>
+            </a:fontRef>
+          </p:style>
+        </p:cxnSp>
+        <p:cxnSp>
+          <p:nvCxnSpPr>
+            <p:cNvPr id="12" name="Straight Arrow Connector 11"/>
+            <p:cNvCxnSpPr/>
+            <p:nvPr/>
+          </p:nvCxnSpPr>
+          <p:spPr>
+            <a:xfrm flipH="1" flipV="1">
+              <a:off x="7800631" y="2331688"/>
+              <a:ext cx="367265" cy="789897"/>
+            </a:xfrm>
+            <a:prstGeom prst="straightConnector1">
+              <a:avLst/>
+            </a:prstGeom>
+            <a:ln w="38100">
+              <a:solidFill>
+                <a:schemeClr val="tx1"/>
+              </a:solidFill>
+              <a:tailEnd type="triangle"/>
+            </a:ln>
+          </p:spPr>
+          <p:style>
+            <a:lnRef idx="1">
+              <a:schemeClr val="accent1"/>
+            </a:lnRef>
+            <a:fillRef idx="0">
+              <a:schemeClr val="accent1"/>
+            </a:fillRef>
+            <a:effectRef idx="0">
+              <a:schemeClr val="accent1"/>
+            </a:effectRef>
+            <a:fontRef idx="minor">
+              <a:schemeClr val="tx1"/>
+            </a:fontRef>
+          </p:style>
+        </p:cxnSp>
+        <mc:AlternateContent xmlns:mc="http://schemas.openxmlformats.org/markup-compatibility/2006">
+          <mc:Choice xmlns:a14="http://schemas.microsoft.com/office/drawing/2010/main" Requires="a14">
+            <p:sp>
+              <p:nvSpPr>
+                <p:cNvPr id="13" name="TextBox 12"/>
+                <p:cNvSpPr txBox="1"/>
+                <p:nvPr/>
+              </p:nvSpPr>
+              <p:spPr>
+                <a:xfrm>
+                  <a:off x="7995404" y="2368295"/>
+                  <a:ext cx="264368" cy="345159"/>
+                </a:xfrm>
+                <a:prstGeom prst="rect">
+                  <a:avLst/>
+                </a:prstGeom>
+                <a:noFill/>
+              </p:spPr>
+              <p:txBody>
+                <a:bodyPr wrap="none" lIns="0" tIns="0" rIns="0" bIns="0" rtlCol="0">
+                  <a:spAutoFit/>
+                </a:bodyPr>
+                <a:lstStyle/>
+                <a:p>
+                  <a:pPr/>
+                  <a14:m>
+                    <m:oMathPara xmlns:m="http://schemas.openxmlformats.org/officeDocument/2006/math">
+                      <m:oMathParaPr>
+                        <m:jc m:val="centerGroup"/>
+                      </m:oMathParaPr>
+                      <m:oMath xmlns:m="http://schemas.openxmlformats.org/officeDocument/2006/math">
+                        <m:acc>
+                          <m:accPr>
+                            <m:chr m:val="⃗"/>
+                            <m:ctrlPr>
+                              <a:rPr lang="en-US" sz="2000" b="0" i="1" smtClean="0">
+                                <a:latin typeface="Cambria Math" panose="02040503050406030204" pitchFamily="18" charset="0"/>
+                                <a:cs typeface="Arial" panose="020B0604020202020204" pitchFamily="34" charset="0"/>
+                              </a:rPr>
+                            </m:ctrlPr>
+                          </m:accPr>
+                          <m:e>
+                            <m:r>
+                              <a:rPr lang="en-US" sz="2000" b="0" i="1" smtClean="0">
+                                <a:latin typeface="Cambria Math" panose="02040503050406030204" pitchFamily="18" charset="0"/>
+                                <a:cs typeface="Arial" panose="020B0604020202020204" pitchFamily="34" charset="0"/>
+                              </a:rPr>
+                              <m:t>𝑁</m:t>
+                            </m:r>
+                          </m:e>
+                        </m:acc>
+                      </m:oMath>
+                    </m:oMathPara>
+                  </a14:m>
+                  <a:endParaRPr lang="en-US" sz="2000" b="0" dirty="0" smtClean="0">
+                    <a:latin typeface="Arial" panose="020B0604020202020204" pitchFamily="34" charset="0"/>
+                    <a:cs typeface="Arial" panose="020B0604020202020204" pitchFamily="34" charset="0"/>
+                  </a:endParaRPr>
+                </a:p>
+              </p:txBody>
+            </p:sp>
+          </mc:Choice>
+          <mc:Fallback>
+            <p:sp>
+              <p:nvSpPr>
+                <p:cNvPr id="13" name="TextBox 12"/>
+                <p:cNvSpPr txBox="1">
+                  <a:spLocks noRot="1" noChangeAspect="1" noMove="1" noResize="1" noEditPoints="1" noAdjustHandles="1" noChangeArrowheads="1" noChangeShapeType="1" noTextEdit="1"/>
+                </p:cNvSpPr>
+                <p:nvPr/>
+              </p:nvSpPr>
+              <p:spPr>
+                <a:xfrm>
+                  <a:off x="7995404" y="2368295"/>
+                  <a:ext cx="264368" cy="345159"/>
+                </a:xfrm>
+                <a:prstGeom prst="rect">
+                  <a:avLst/>
+                </a:prstGeom>
+                <a:blipFill>
+                  <a:blip r:embed="rId4"/>
+                  <a:stretch>
+                    <a:fillRect l="-20930" r="-18605" b="-8772"/>
+                  </a:stretch>
+                </a:blipFill>
+              </p:spPr>
+              <p:txBody>
+                <a:bodyPr/>
+                <a:lstStyle/>
+                <a:p>
+                  <a:r>
+                    <a:rPr lang="en-US">
+                      <a:noFill/>
+                    </a:rPr>
+                    <a:t> </a:t>
+                  </a:r>
+                </a:p>
+              </p:txBody>
+            </p:sp>
+          </mc:Fallback>
+        </mc:AlternateContent>
+        <mc:AlternateContent xmlns:mc="http://schemas.openxmlformats.org/markup-compatibility/2006">
+          <mc:Choice xmlns:a14="http://schemas.microsoft.com/office/drawing/2010/main" Requires="a14">
+            <p:sp>
+              <p:nvSpPr>
+                <p:cNvPr id="14" name="TextBox 13"/>
+                <p:cNvSpPr txBox="1"/>
+                <p:nvPr/>
+              </p:nvSpPr>
+              <p:spPr>
+                <a:xfrm>
+                  <a:off x="7921602" y="3855350"/>
+                  <a:ext cx="237639" cy="377219"/>
+                </a:xfrm>
+                <a:prstGeom prst="rect">
+                  <a:avLst/>
+                </a:prstGeom>
+                <a:noFill/>
+              </p:spPr>
+              <p:txBody>
+                <a:bodyPr wrap="square" lIns="0" tIns="0" rIns="0" bIns="0" rtlCol="0">
+                  <a:spAutoFit/>
+                </a:bodyPr>
+                <a:lstStyle/>
+                <a:p>
+                  <a:pPr/>
+                  <a14:m>
+                    <m:oMathPara xmlns:m="http://schemas.openxmlformats.org/officeDocument/2006/math">
+                      <m:oMathParaPr>
+                        <m:jc m:val="centerGroup"/>
+                      </m:oMathParaPr>
+                      <m:oMath xmlns:m="http://schemas.openxmlformats.org/officeDocument/2006/math">
+                        <m:sSub>
+                          <m:sSubPr>
+                            <m:ctrlPr>
+                              <a:rPr lang="en-US" sz="2000" b="0" i="1" smtClean="0">
+                                <a:latin typeface="Cambria Math" panose="02040503050406030204" pitchFamily="18" charset="0"/>
+                                <a:cs typeface="Arial" panose="020B0604020202020204" pitchFamily="34" charset="0"/>
+                              </a:rPr>
+                            </m:ctrlPr>
+                          </m:sSubPr>
+                          <m:e>
+                            <m:acc>
+                              <m:accPr>
+                                <m:chr m:val="⃗"/>
+                                <m:ctrlPr>
+                                  <a:rPr lang="en-US" sz="2000" b="0" i="1" smtClean="0">
+                                    <a:latin typeface="Cambria Math" panose="02040503050406030204" pitchFamily="18" charset="0"/>
+                                    <a:cs typeface="Arial" panose="020B0604020202020204" pitchFamily="34" charset="0"/>
+                                  </a:rPr>
+                                </m:ctrlPr>
+                              </m:accPr>
+                              <m:e>
+                                <m:r>
+                                  <a:rPr lang="en-US" sz="2000" b="0" i="1" smtClean="0">
+                                    <a:latin typeface="Cambria Math" panose="02040503050406030204" pitchFamily="18" charset="0"/>
+                                    <a:cs typeface="Arial" panose="020B0604020202020204" pitchFamily="34" charset="0"/>
+                                  </a:rPr>
+                                  <m:t>𝐹</m:t>
+                                </m:r>
+                              </m:e>
+                            </m:acc>
+                          </m:e>
+                          <m:sub>
+                            <m:r>
+                              <a:rPr lang="en-US" sz="2000" b="0" i="1" smtClean="0">
+                                <a:latin typeface="Cambria Math" panose="02040503050406030204" pitchFamily="18" charset="0"/>
+                                <a:cs typeface="Arial" panose="020B0604020202020204" pitchFamily="34" charset="0"/>
+                              </a:rPr>
+                              <m:t>𝑔</m:t>
+                            </m:r>
+                          </m:sub>
+                        </m:sSub>
+                      </m:oMath>
+                    </m:oMathPara>
+                  </a14:m>
+                  <a:endParaRPr lang="en-US" sz="2000" dirty="0" smtClean="0">
+                    <a:latin typeface="Arial" panose="020B0604020202020204" pitchFamily="34" charset="0"/>
+                    <a:cs typeface="Arial" panose="020B0604020202020204" pitchFamily="34" charset="0"/>
+                  </a:endParaRPr>
+                </a:p>
+              </p:txBody>
+            </p:sp>
+          </mc:Choice>
+          <mc:Fallback>
+            <p:sp>
+              <p:nvSpPr>
+                <p:cNvPr id="14" name="TextBox 13"/>
+                <p:cNvSpPr txBox="1">
+                  <a:spLocks noRot="1" noChangeAspect="1" noMove="1" noResize="1" noEditPoints="1" noAdjustHandles="1" noChangeArrowheads="1" noChangeShapeType="1" noTextEdit="1"/>
+                </p:cNvSpPr>
+                <p:nvPr/>
+              </p:nvSpPr>
+              <p:spPr>
+                <a:xfrm>
+                  <a:off x="7921602" y="3855350"/>
+                  <a:ext cx="237639" cy="377219"/>
+                </a:xfrm>
+                <a:prstGeom prst="rect">
+                  <a:avLst/>
+                </a:prstGeom>
+                <a:blipFill>
+                  <a:blip r:embed="rId5"/>
+                  <a:stretch>
+                    <a:fillRect l="-35897" t="-30645" r="-76923" b="-17742"/>
+                  </a:stretch>
+                </a:blipFill>
+              </p:spPr>
+              <p:txBody>
+                <a:bodyPr/>
+                <a:lstStyle/>
+                <a:p>
+                  <a:r>
+                    <a:rPr lang="en-US">
+                      <a:noFill/>
+                    </a:rPr>
+                    <a:t> </a:t>
+                  </a:r>
+                </a:p>
+              </p:txBody>
+            </p:sp>
+          </mc:Fallback>
+        </mc:AlternateContent>
+        <p:sp>
+          <p:nvSpPr>
+            <p:cNvPr id="15" name="Right Arrow 14"/>
+            <p:cNvSpPr/>
+            <p:nvPr/>
+          </p:nvSpPr>
+          <p:spPr>
+            <a:xfrm rot="9311415">
+              <a:off x="7091714" y="2026101"/>
+              <a:ext cx="700928" cy="118979"/>
+            </a:xfrm>
+            <a:prstGeom prst="rightArrow">
+              <a:avLst/>
+            </a:prstGeom>
+            <a:solidFill>
+              <a:schemeClr val="tx1"/>
+            </a:solidFill>
+            <a:ln w="38100">
+              <a:solidFill>
+                <a:schemeClr val="tx1"/>
+              </a:solidFill>
+            </a:ln>
+          </p:spPr>
+          <p:style>
+            <a:lnRef idx="2">
+              <a:schemeClr val="accent1">
+                <a:shade val="50000"/>
+              </a:schemeClr>
+            </a:lnRef>
+            <a:fillRef idx="1">
+              <a:schemeClr val="accent1"/>
+            </a:fillRef>
+            <a:effectRef idx="0">
+              <a:schemeClr val="accent1"/>
+            </a:effectRef>
+            <a:fontRef idx="minor">
+              <a:schemeClr val="lt1"/>
+            </a:fontRef>
+          </p:style>
+          <p:txBody>
+            <a:bodyPr rtlCol="0" anchor="ctr"/>
+            <a:lstStyle/>
+            <a:p>
+              <a:pPr algn="ctr"/>
+              <a:endParaRPr lang="en-US" dirty="0"/>
+            </a:p>
+          </p:txBody>
+        </p:sp>
+        <mc:AlternateContent xmlns:mc="http://schemas.openxmlformats.org/markup-compatibility/2006">
+          <mc:Choice xmlns:a14="http://schemas.microsoft.com/office/drawing/2010/main" Requires="a14">
+            <p:sp>
+              <p:nvSpPr>
+                <p:cNvPr id="16" name="TextBox 15"/>
+                <p:cNvSpPr txBox="1"/>
+                <p:nvPr/>
+              </p:nvSpPr>
+              <p:spPr>
+                <a:xfrm>
+                  <a:off x="7247730" y="1551245"/>
+                  <a:ext cx="219483" cy="307777"/>
+                </a:xfrm>
+                <a:prstGeom prst="rect">
+                  <a:avLst/>
+                </a:prstGeom>
+                <a:noFill/>
+              </p:spPr>
+              <p:txBody>
+                <a:bodyPr wrap="none" lIns="0" tIns="0" rIns="0" bIns="0" rtlCol="0">
+                  <a:spAutoFit/>
+                </a:bodyPr>
+                <a:lstStyle/>
+                <a:p>
+                  <a:pPr/>
+                  <a14:m>
+                    <m:oMathPara xmlns:m="http://schemas.openxmlformats.org/officeDocument/2006/math">
+                      <m:oMathParaPr>
+                        <m:jc m:val="centerGroup"/>
+                      </m:oMathParaPr>
+                      <m:oMath xmlns:m="http://schemas.openxmlformats.org/officeDocument/2006/math">
+                        <m:acc>
+                          <m:accPr>
+                            <m:chr m:val="⃗"/>
+                            <m:ctrlPr>
+                              <a:rPr lang="en-US" sz="2000" b="0" i="1" smtClean="0">
+                                <a:latin typeface="Cambria Math" panose="02040503050406030204" pitchFamily="18" charset="0"/>
+                                <a:cs typeface="Arial" panose="020B0604020202020204" pitchFamily="34" charset="0"/>
+                              </a:rPr>
+                            </m:ctrlPr>
+                          </m:accPr>
+                          <m:e>
+                            <m:r>
+                              <a:rPr lang="en-US" sz="2000" b="0" i="1" smtClean="0">
+                                <a:latin typeface="Cambria Math" panose="02040503050406030204" pitchFamily="18" charset="0"/>
+                                <a:cs typeface="Arial" panose="020B0604020202020204" pitchFamily="34" charset="0"/>
+                              </a:rPr>
+                              <m:t>𝑎</m:t>
+                            </m:r>
+                          </m:e>
+                        </m:acc>
+                      </m:oMath>
+                    </m:oMathPara>
+                  </a14:m>
+                  <a:endParaRPr lang="en-US" sz="2000" dirty="0" smtClean="0">
+                    <a:latin typeface="Arial" panose="020B0604020202020204" pitchFamily="34" charset="0"/>
+                    <a:cs typeface="Arial" panose="020B0604020202020204" pitchFamily="34" charset="0"/>
+                  </a:endParaRPr>
+                </a:p>
+              </p:txBody>
+            </p:sp>
+          </mc:Choice>
+          <mc:Fallback>
+            <p:sp>
+              <p:nvSpPr>
+                <p:cNvPr id="16" name="TextBox 15"/>
+                <p:cNvSpPr txBox="1">
+                  <a:spLocks noRot="1" noChangeAspect="1" noMove="1" noResize="1" noEditPoints="1" noAdjustHandles="1" noChangeArrowheads="1" noChangeShapeType="1" noTextEdit="1"/>
+                </p:cNvSpPr>
+                <p:nvPr/>
+              </p:nvSpPr>
+              <p:spPr>
+                <a:xfrm>
+                  <a:off x="7247730" y="1551245"/>
+                  <a:ext cx="219483" cy="307777"/>
+                </a:xfrm>
+                <a:prstGeom prst="rect">
+                  <a:avLst/>
+                </a:prstGeom>
+                <a:blipFill>
+                  <a:blip r:embed="rId6"/>
+                  <a:stretch>
+                    <a:fillRect l="-22222" t="-33333" r="-91667" b="-5882"/>
+                  </a:stretch>
+                </a:blipFill>
+              </p:spPr>
+              <p:txBody>
+                <a:bodyPr/>
+                <a:lstStyle/>
+                <a:p>
+                  <a:r>
+                    <a:rPr lang="en-US">
+                      <a:noFill/>
+                    </a:rPr>
+                    <a:t> </a:t>
+                  </a:r>
+                </a:p>
+              </p:txBody>
+            </p:sp>
+          </mc:Fallback>
+        </mc:AlternateContent>
+        <p:grpSp>
+          <p:nvGrpSpPr>
+            <p:cNvPr id="17" name="Group 16"/>
+            <p:cNvGrpSpPr/>
+            <p:nvPr/>
+          </p:nvGrpSpPr>
+          <p:grpSpPr>
+            <a:xfrm rot="20189690">
+              <a:off x="6687665" y="2602372"/>
+              <a:ext cx="816522" cy="699150"/>
+              <a:chOff x="-163549" y="708040"/>
+              <a:chExt cx="2358479" cy="2102984"/>
+            </a:xfrm>
+          </p:grpSpPr>
+          <p:grpSp>
+            <p:nvGrpSpPr>
+              <p:cNvPr id="19" name="Group 18"/>
+              <p:cNvGrpSpPr/>
+              <p:nvPr/>
+            </p:nvGrpSpPr>
+            <p:grpSpPr>
+              <a:xfrm>
+                <a:off x="-163549" y="708040"/>
+                <a:ext cx="2358479" cy="2102984"/>
+                <a:chOff x="-136254" y="680744"/>
+                <a:chExt cx="2358479" cy="2102984"/>
+              </a:xfrm>
+            </p:grpSpPr>
+            <p:cxnSp>
+              <p:nvCxnSpPr>
+                <p:cNvPr id="21" name="Straight Arrow Connector 20"/>
+                <p:cNvCxnSpPr/>
+                <p:nvPr/>
+              </p:nvCxnSpPr>
+              <p:spPr>
+                <a:xfrm flipV="1">
+                  <a:off x="1516583" y="680744"/>
+                  <a:ext cx="7683" cy="1859535"/>
+                </a:xfrm>
+                <a:prstGeom prst="straightConnector1">
+                  <a:avLst/>
+                </a:prstGeom>
+                <a:ln w="38100">
+                  <a:solidFill>
+                    <a:schemeClr val="tx1"/>
+                  </a:solidFill>
+                  <a:tailEnd type="triangle"/>
+                </a:ln>
+              </p:spPr>
+              <p:style>
+                <a:lnRef idx="1">
+                  <a:schemeClr val="accent1"/>
+                </a:lnRef>
+                <a:fillRef idx="0">
+                  <a:schemeClr val="accent1"/>
+                </a:fillRef>
+                <a:effectRef idx="0">
+                  <a:schemeClr val="accent1"/>
+                </a:effectRef>
+                <a:fontRef idx="minor">
+                  <a:schemeClr val="tx1"/>
+                </a:fontRef>
+              </p:style>
+            </p:cxnSp>
+            <p:cxnSp>
+              <p:nvCxnSpPr>
+                <p:cNvPr id="22" name="Straight Arrow Connector 21"/>
+                <p:cNvCxnSpPr/>
+                <p:nvPr/>
+              </p:nvCxnSpPr>
+              <p:spPr>
+                <a:xfrm flipH="1" flipV="1">
+                  <a:off x="-136254" y="2504314"/>
+                  <a:ext cx="1652837" cy="3"/>
+                </a:xfrm>
+                <a:prstGeom prst="straightConnector1">
+                  <a:avLst/>
+                </a:prstGeom>
+                <a:ln w="38100">
+                  <a:solidFill>
+                    <a:schemeClr val="tx1"/>
+                  </a:solidFill>
+                  <a:tailEnd type="triangle"/>
+                </a:ln>
+              </p:spPr>
+              <p:style>
+                <a:lnRef idx="1">
+                  <a:schemeClr val="accent1"/>
+                </a:lnRef>
+                <a:fillRef idx="0">
+                  <a:schemeClr val="accent1"/>
+                </a:fillRef>
+                <a:effectRef idx="0">
+                  <a:schemeClr val="accent1"/>
+                </a:effectRef>
+                <a:fontRef idx="minor">
+                  <a:schemeClr val="tx1"/>
+                </a:fontRef>
+              </p:style>
+            </p:cxnSp>
+            <mc:AlternateContent xmlns:mc="http://schemas.openxmlformats.org/markup-compatibility/2006">
+              <mc:Choice xmlns:a14="http://schemas.microsoft.com/office/drawing/2010/main" Requires="a14">
+                <p:sp>
+                  <p:nvSpPr>
+                    <p:cNvPr id="23" name="Rectangle 22"/>
+                    <p:cNvSpPr/>
+                    <p:nvPr/>
+                  </p:nvSpPr>
+                  <p:spPr>
+                    <a:xfrm>
+                      <a:off x="307645" y="2414395"/>
+                      <a:ext cx="367985" cy="369333"/>
+                    </a:xfrm>
+                    <a:prstGeom prst="rect">
+                      <a:avLst/>
+                    </a:prstGeom>
+                  </p:spPr>
+                  <p:txBody>
+                    <a:bodyPr wrap="none">
+                      <a:spAutoFit/>
+                    </a:bodyPr>
+                    <a:lstStyle/>
+                    <a:p>
+                      <a:pPr/>
+                      <a14:m>
+                        <m:oMathPara xmlns:m="http://schemas.openxmlformats.org/officeDocument/2006/math">
+                          <m:oMathParaPr>
+                            <m:jc m:val="centerGroup"/>
+                          </m:oMathParaPr>
+                          <m:oMath xmlns:m="http://schemas.openxmlformats.org/officeDocument/2006/math">
+                            <m:r>
+                              <a:rPr lang="en-US" i="1">
+                                <a:latin typeface="Cambria Math" panose="02040503050406030204" pitchFamily="18" charset="0"/>
+                                <a:cs typeface="Arial" panose="020B0604020202020204" pitchFamily="34" charset="0"/>
+                              </a:rPr>
+                              <m:t>𝑥</m:t>
+                            </m:r>
+                          </m:oMath>
+                        </m:oMathPara>
+                      </a14:m>
+                      <a:endParaRPr lang="en-CA" dirty="0"/>
+                    </a:p>
+                  </p:txBody>
+                </p:sp>
+              </mc:Choice>
+              <mc:Fallback>
+                <p:sp>
+                  <p:nvSpPr>
+                    <p:cNvPr id="23" name="Rectangle 22"/>
+                    <p:cNvSpPr>
+                      <a:spLocks noRot="1" noChangeAspect="1" noMove="1" noResize="1" noEditPoints="1" noAdjustHandles="1" noChangeArrowheads="1" noChangeShapeType="1" noTextEdit="1"/>
+                    </p:cNvSpPr>
+                    <p:nvPr/>
+                  </p:nvSpPr>
+                  <p:spPr>
+                    <a:xfrm>
+                      <a:off x="307645" y="2414395"/>
+                      <a:ext cx="367985" cy="369333"/>
+                    </a:xfrm>
+                    <a:prstGeom prst="rect">
+                      <a:avLst/>
+                    </a:prstGeom>
+                    <a:blipFill>
+                      <a:blip r:embed="rId7"/>
+                      <a:stretch>
+                        <a:fillRect r="-107143" b="-103571"/>
+                      </a:stretch>
+                    </a:blipFill>
+                  </p:spPr>
+                  <p:txBody>
+                    <a:bodyPr/>
+                    <a:lstStyle/>
+                    <a:p>
+                      <a:r>
+                        <a:rPr lang="en-US">
+                          <a:noFill/>
+                        </a:rPr>
+                        <a:t> </a:t>
+                      </a:r>
+                    </a:p>
+                  </p:txBody>
+                </p:sp>
+              </mc:Fallback>
+            </mc:AlternateContent>
+            <mc:AlternateContent xmlns:mc="http://schemas.openxmlformats.org/markup-compatibility/2006">
+              <mc:Choice xmlns:a14="http://schemas.microsoft.com/office/drawing/2010/main" Requires="a14">
+                <p:sp>
+                  <p:nvSpPr>
+                    <p:cNvPr id="24" name="Rectangle 23"/>
+                    <p:cNvSpPr/>
+                    <p:nvPr/>
+                  </p:nvSpPr>
+                  <p:spPr>
+                    <a:xfrm>
+                      <a:off x="1563356" y="680744"/>
+                      <a:ext cx="658869" cy="1110919"/>
+                    </a:xfrm>
+                    <a:prstGeom prst="rect">
+                      <a:avLst/>
+                    </a:prstGeom>
+                  </p:spPr>
+                  <p:txBody>
+                    <a:bodyPr wrap="square">
+                      <a:spAutoFit/>
+                    </a:bodyPr>
+                    <a:lstStyle/>
+                    <a:p>
+                      <a:pPr/>
+                      <a14:m>
+                        <m:oMathPara xmlns:m="http://schemas.openxmlformats.org/officeDocument/2006/math">
+                          <m:oMathParaPr>
+                            <m:jc m:val="centerGroup"/>
+                          </m:oMathParaPr>
+                          <m:oMath xmlns:m="http://schemas.openxmlformats.org/officeDocument/2006/math">
+                            <m:r>
+                              <a:rPr lang="en-US" b="0" i="1" smtClean="0">
+                                <a:latin typeface="Cambria Math" panose="02040503050406030204" pitchFamily="18" charset="0"/>
+                              </a:rPr>
+                              <m:t>𝑦</m:t>
+                            </m:r>
+                          </m:oMath>
+                        </m:oMathPara>
+                      </a14:m>
+                      <a:endParaRPr lang="en-CA" dirty="0"/>
+                    </a:p>
+                  </p:txBody>
+                </p:sp>
+              </mc:Choice>
+              <mc:Fallback>
+                <p:sp>
+                  <p:nvSpPr>
+                    <p:cNvPr id="24" name="Rectangle 23"/>
+                    <p:cNvSpPr>
+                      <a:spLocks noRot="1" noChangeAspect="1" noMove="1" noResize="1" noEditPoints="1" noAdjustHandles="1" noChangeArrowheads="1" noChangeShapeType="1" noTextEdit="1"/>
+                    </p:cNvSpPr>
+                    <p:nvPr/>
+                  </p:nvSpPr>
+                  <p:spPr>
+                    <a:xfrm>
+                      <a:off x="1563356" y="680744"/>
+                      <a:ext cx="658869" cy="1110919"/>
+                    </a:xfrm>
+                    <a:prstGeom prst="rect">
+                      <a:avLst/>
+                    </a:prstGeom>
+                    <a:blipFill>
+                      <a:blip r:embed="rId8"/>
+                      <a:stretch>
+                        <a:fillRect r="-22034" b="-2778"/>
+                      </a:stretch>
+                    </a:blipFill>
+                  </p:spPr>
+                  <p:txBody>
+                    <a:bodyPr/>
+                    <a:lstStyle/>
+                    <a:p>
+                      <a:r>
+                        <a:rPr lang="en-US">
+                          <a:noFill/>
+                        </a:rPr>
+                        <a:t> </a:t>
+                      </a:r>
+                    </a:p>
+                  </p:txBody>
+                </p:sp>
+              </mc:Fallback>
+            </mc:AlternateContent>
+            <mc:AlternateContent xmlns:mc="http://schemas.openxmlformats.org/markup-compatibility/2006">
+              <mc:Choice xmlns:a14="http://schemas.microsoft.com/office/drawing/2010/main" Requires="a14">
+                <p:sp>
+                  <p:nvSpPr>
+                    <p:cNvPr id="25" name="Rectangle 24"/>
+                    <p:cNvSpPr/>
+                    <p:nvPr/>
+                  </p:nvSpPr>
+                  <p:spPr>
+                    <a:xfrm>
+                      <a:off x="1518657" y="2229730"/>
+                      <a:ext cx="367985" cy="369333"/>
+                    </a:xfrm>
+                    <a:prstGeom prst="rect">
+                      <a:avLst/>
+                    </a:prstGeom>
+                  </p:spPr>
+                  <p:txBody>
+                    <a:bodyPr wrap="none">
+                      <a:spAutoFit/>
+                    </a:bodyPr>
+                    <a:lstStyle/>
+                    <a:p>
+                      <a:pPr/>
+                      <a14:m>
+                        <m:oMathPara xmlns:m="http://schemas.openxmlformats.org/officeDocument/2006/math">
+                          <m:oMathParaPr>
+                            <m:jc m:val="centerGroup"/>
+                          </m:oMathParaPr>
+                          <m:oMath xmlns:m="http://schemas.openxmlformats.org/officeDocument/2006/math">
+                            <m:r>
+                              <a:rPr lang="en-US" b="0" i="1" smtClean="0">
+                                <a:latin typeface="Cambria Math" panose="02040503050406030204" pitchFamily="18" charset="0"/>
+                                <a:cs typeface="Arial" panose="020B0604020202020204" pitchFamily="34" charset="0"/>
+                              </a:rPr>
+                              <m:t>0</m:t>
+                            </m:r>
+                          </m:oMath>
+                        </m:oMathPara>
+                      </a14:m>
+                      <a:endParaRPr lang="en-CA" dirty="0"/>
+                    </a:p>
+                  </p:txBody>
+                </p:sp>
+              </mc:Choice>
+              <mc:Fallback>
+                <p:sp>
+                  <p:nvSpPr>
+                    <p:cNvPr id="25" name="Rectangle 24"/>
+                    <p:cNvSpPr>
+                      <a:spLocks noRot="1" noChangeAspect="1" noMove="1" noResize="1" noEditPoints="1" noAdjustHandles="1" noChangeArrowheads="1" noChangeShapeType="1" noTextEdit="1"/>
+                    </p:cNvSpPr>
+                    <p:nvPr/>
+                  </p:nvSpPr>
+                  <p:spPr>
+                    <a:xfrm>
+                      <a:off x="1518657" y="2229730"/>
+                      <a:ext cx="367985" cy="369333"/>
+                    </a:xfrm>
+                    <a:prstGeom prst="rect">
+                      <a:avLst/>
+                    </a:prstGeom>
+                    <a:blipFill>
+                      <a:blip r:embed="rId9"/>
+                      <a:stretch>
+                        <a:fillRect t="-3704" r="-128571" b="-125926"/>
+                      </a:stretch>
+                    </a:blipFill>
+                  </p:spPr>
+                  <p:txBody>
+                    <a:bodyPr/>
+                    <a:lstStyle/>
+                    <a:p>
+                      <a:r>
+                        <a:rPr lang="en-US">
+                          <a:noFill/>
+                        </a:rPr>
+                        <a:t> </a:t>
+                      </a:r>
+                    </a:p>
+                  </p:txBody>
+                </p:sp>
+              </mc:Fallback>
+            </mc:AlternateContent>
+          </p:grpSp>
+          <p:sp>
+            <p:nvSpPr>
+              <p:cNvPr id="20" name="Rectangle 19"/>
+              <p:cNvSpPr/>
+              <p:nvPr/>
+            </p:nvSpPr>
+            <p:spPr>
+              <a:xfrm>
+                <a:off x="1129904" y="1614682"/>
+                <a:ext cx="184731" cy="369332"/>
+              </a:xfrm>
+              <a:prstGeom prst="rect">
+                <a:avLst/>
+              </a:prstGeom>
+            </p:spPr>
+            <p:txBody>
+              <a:bodyPr wrap="none">
+                <a:spAutoFit/>
+              </a:bodyPr>
+              <a:lstStyle/>
+              <a:p>
+                <a:endParaRPr lang="en-CA" dirty="0"/>
+              </a:p>
+            </p:txBody>
+          </p:sp>
+        </p:grpSp>
+        <p:cxnSp>
+          <p:nvCxnSpPr>
+            <p:cNvPr id="8" name="Straight Connector 7"/>
+            <p:cNvCxnSpPr/>
+            <p:nvPr/>
+          </p:nvCxnSpPr>
+          <p:spPr>
+            <a:xfrm flipH="1" flipV="1">
+              <a:off x="8187493" y="3080337"/>
+              <a:ext cx="410477" cy="745348"/>
+            </a:xfrm>
+            <a:prstGeom prst="line">
+              <a:avLst/>
+            </a:prstGeom>
+            <a:ln w="28575">
+              <a:solidFill>
+                <a:schemeClr val="tx1"/>
+              </a:solidFill>
+              <a:prstDash val="sysDot"/>
+            </a:ln>
+          </p:spPr>
+          <p:style>
+            <a:lnRef idx="1">
+              <a:schemeClr val="accent1"/>
+            </a:lnRef>
+            <a:fillRef idx="0">
+              <a:schemeClr val="accent1"/>
+            </a:fillRef>
+            <a:effectRef idx="0">
+              <a:schemeClr val="accent1"/>
+            </a:effectRef>
+            <a:fontRef idx="minor">
+              <a:schemeClr val="tx1"/>
+            </a:fontRef>
+          </p:style>
+        </p:cxnSp>
+        <mc:AlternateContent xmlns:mc="http://schemas.openxmlformats.org/markup-compatibility/2006">
+          <mc:Choice xmlns:a14="http://schemas.microsoft.com/office/drawing/2010/main" Requires="a14">
+            <p:sp>
+              <p:nvSpPr>
+                <p:cNvPr id="9" name="TextBox 8"/>
+                <p:cNvSpPr txBox="1"/>
+                <p:nvPr/>
+              </p:nvSpPr>
+              <p:spPr>
+                <a:xfrm>
+                  <a:off x="8216136" y="3436152"/>
+                  <a:ext cx="222304" cy="307777"/>
+                </a:xfrm>
+                <a:prstGeom prst="rect">
+                  <a:avLst/>
+                </a:prstGeom>
+                <a:noFill/>
+              </p:spPr>
+              <p:txBody>
+                <a:bodyPr wrap="none" lIns="0" tIns="0" rIns="0" bIns="0" rtlCol="0">
+                  <a:spAutoFit/>
+                </a:bodyPr>
+                <a:lstStyle/>
+                <a:p>
+                  <a:pPr/>
+                  <a14:m>
+                    <m:oMathPara xmlns:m="http://schemas.openxmlformats.org/officeDocument/2006/math">
+                      <m:oMathParaPr>
+                        <m:jc m:val="centerGroup"/>
+                      </m:oMathParaPr>
+                      <m:oMath xmlns:m="http://schemas.openxmlformats.org/officeDocument/2006/math">
+                        <m:r>
+                          <a:rPr lang="en-US" sz="2000" b="0" i="1" smtClean="0">
+                            <a:latin typeface="Cambria Math" panose="02040503050406030204" pitchFamily="18" charset="0"/>
+                            <a:cs typeface="Arial" panose="020B0604020202020204" pitchFamily="34" charset="0"/>
+                          </a:rPr>
+                          <m:t>𝜃</m:t>
+                        </m:r>
+                      </m:oMath>
+                    </m:oMathPara>
+                  </a14:m>
+                  <a:endParaRPr lang="en-US" sz="2000" dirty="0" smtClean="0">
+                    <a:latin typeface="Arial" panose="020B0604020202020204" pitchFamily="34" charset="0"/>
+                    <a:cs typeface="Arial" panose="020B0604020202020204" pitchFamily="34" charset="0"/>
+                  </a:endParaRPr>
+                </a:p>
+              </p:txBody>
+            </p:sp>
+          </mc:Choice>
+          <mc:Fallback>
+            <p:sp>
+              <p:nvSpPr>
+                <p:cNvPr id="9" name="TextBox 8"/>
+                <p:cNvSpPr txBox="1">
+                  <a:spLocks noRot="1" noChangeAspect="1" noMove="1" noResize="1" noEditPoints="1" noAdjustHandles="1" noChangeArrowheads="1" noChangeShapeType="1" noTextEdit="1"/>
+                </p:cNvSpPr>
+                <p:nvPr/>
+              </p:nvSpPr>
+              <p:spPr>
+                <a:xfrm>
+                  <a:off x="8216136" y="3436152"/>
+                  <a:ext cx="222304" cy="307777"/>
+                </a:xfrm>
+                <a:prstGeom prst="rect">
+                  <a:avLst/>
+                </a:prstGeom>
+                <a:blipFill>
+                  <a:blip r:embed="rId10"/>
+                  <a:stretch>
+                    <a:fillRect l="-25000" r="-25000" b="-12000"/>
+                  </a:stretch>
+                </a:blipFill>
+              </p:spPr>
+              <p:txBody>
+                <a:bodyPr/>
+                <a:lstStyle/>
+                <a:p>
+                  <a:r>
+                    <a:rPr lang="en-US">
+                      <a:noFill/>
+                    </a:rPr>
+                    <a:t> </a:t>
+                  </a:r>
+                </a:p>
+              </p:txBody>
+            </p:sp>
+          </mc:Fallback>
+        </mc:AlternateContent>
+        <p:cxnSp>
+          <p:nvCxnSpPr>
+            <p:cNvPr id="27" name="Straight Arrow Connector 26"/>
+            <p:cNvCxnSpPr/>
+            <p:nvPr/>
+          </p:nvCxnSpPr>
+          <p:spPr>
+            <a:xfrm flipV="1">
+              <a:off x="8259772" y="2898213"/>
+              <a:ext cx="452865" cy="195527"/>
+            </a:xfrm>
+            <a:prstGeom prst="straightConnector1">
+              <a:avLst/>
+            </a:prstGeom>
+            <a:ln w="38100">
+              <a:solidFill>
+                <a:schemeClr val="tx1"/>
+              </a:solidFill>
+              <a:tailEnd type="triangle"/>
+            </a:ln>
+          </p:spPr>
+          <p:style>
+            <a:lnRef idx="1">
+              <a:schemeClr val="accent1"/>
+            </a:lnRef>
+            <a:fillRef idx="0">
+              <a:schemeClr val="accent1"/>
+            </a:fillRef>
+            <a:effectRef idx="0">
+              <a:schemeClr val="accent1"/>
+            </a:effectRef>
+            <a:fontRef idx="minor">
+              <a:schemeClr val="tx1"/>
+            </a:fontRef>
+          </p:style>
+        </p:cxnSp>
+        <mc:AlternateContent xmlns:mc="http://schemas.openxmlformats.org/markup-compatibility/2006">
+          <mc:Choice xmlns:a14="http://schemas.microsoft.com/office/drawing/2010/main" Requires="a14">
+            <p:sp>
+              <p:nvSpPr>
+                <p:cNvPr id="33" name="TextBox 32"/>
+                <p:cNvSpPr txBox="1"/>
+                <p:nvPr/>
+              </p:nvSpPr>
+              <p:spPr>
+                <a:xfrm>
+                  <a:off x="8669100" y="2866508"/>
+                  <a:ext cx="301493" cy="354071"/>
+                </a:xfrm>
+                <a:prstGeom prst="rect">
+                  <a:avLst/>
+                </a:prstGeom>
+                <a:noFill/>
+              </p:spPr>
+              <p:txBody>
+                <a:bodyPr wrap="none" lIns="0" tIns="0" rIns="0" bIns="0" rtlCol="0">
+                  <a:spAutoFit/>
+                </a:bodyPr>
+                <a:lstStyle/>
+                <a:p>
+                  <a14:m>
+                    <m:oMathPara xmlns:m="http://schemas.openxmlformats.org/officeDocument/2006/math">
+                      <m:oMathParaPr>
+                        <m:jc m:val="centerGroup"/>
+                      </m:oMathParaPr>
+                      <m:oMath xmlns:m="http://schemas.openxmlformats.org/officeDocument/2006/math">
+                        <m:sSub>
+                          <m:sSubPr>
+                            <m:ctrlPr>
+                              <a:rPr lang="en-US" sz="2000" b="0" i="1" smtClean="0">
+                                <a:latin typeface="Cambria Math" panose="02040503050406030204" pitchFamily="18" charset="0"/>
+                                <a:cs typeface="Arial" panose="020B0604020202020204" pitchFamily="34" charset="0"/>
+                              </a:rPr>
+                            </m:ctrlPr>
+                          </m:sSubPr>
+                          <m:e>
+                            <m:acc>
+                              <m:accPr>
+                                <m:chr m:val="⃗"/>
+                                <m:ctrlPr>
+                                  <a:rPr lang="en-US" sz="2000" b="0" i="1" smtClean="0">
+                                    <a:latin typeface="Cambria Math" panose="02040503050406030204" pitchFamily="18" charset="0"/>
+                                    <a:cs typeface="Arial" panose="020B0604020202020204" pitchFamily="34" charset="0"/>
+                                  </a:rPr>
+                                </m:ctrlPr>
+                              </m:accPr>
+                              <m:e>
+                                <m:r>
+                                  <a:rPr lang="en-US" sz="2000" b="0" i="1" smtClean="0">
+                                    <a:latin typeface="Cambria Math" panose="02040503050406030204" pitchFamily="18" charset="0"/>
+                                    <a:cs typeface="Arial" panose="020B0604020202020204" pitchFamily="34" charset="0"/>
+                                  </a:rPr>
+                                  <m:t>𝑓</m:t>
+                                </m:r>
+                              </m:e>
+                            </m:acc>
+                          </m:e>
+                          <m:sub>
+                            <m:r>
+                              <a:rPr lang="en-US" sz="2000" b="0" i="1" smtClean="0">
+                                <a:latin typeface="Cambria Math" panose="02040503050406030204" pitchFamily="18" charset="0"/>
+                                <a:cs typeface="Arial" panose="020B0604020202020204" pitchFamily="34" charset="0"/>
+                              </a:rPr>
+                              <m:t>𝑘</m:t>
+                            </m:r>
+                          </m:sub>
+                        </m:sSub>
+                      </m:oMath>
+                    </m:oMathPara>
+                  </a14:m>
+                  <a:endParaRPr lang="en-US" sz="2000" dirty="0" smtClean="0">
+                    <a:latin typeface="Arial" panose="020B0604020202020204" pitchFamily="34" charset="0"/>
+                    <a:cs typeface="Arial" panose="020B0604020202020204" pitchFamily="34" charset="0"/>
+                  </a:endParaRPr>
+                </a:p>
+              </p:txBody>
+            </p:sp>
+          </mc:Choice>
+          <mc:Fallback>
+            <p:sp>
+              <p:nvSpPr>
+                <p:cNvPr id="33" name="TextBox 32"/>
+                <p:cNvSpPr txBox="1">
+                  <a:spLocks noRot="1" noChangeAspect="1" noMove="1" noResize="1" noEditPoints="1" noAdjustHandles="1" noChangeArrowheads="1" noChangeShapeType="1" noTextEdit="1"/>
+                </p:cNvSpPr>
+                <p:nvPr/>
+              </p:nvSpPr>
+              <p:spPr>
+                <a:xfrm>
+                  <a:off x="8669100" y="2866508"/>
+                  <a:ext cx="301493" cy="354071"/>
+                </a:xfrm>
+                <a:prstGeom prst="rect">
+                  <a:avLst/>
+                </a:prstGeom>
+                <a:blipFill>
+                  <a:blip r:embed="rId11"/>
+                  <a:stretch>
+                    <a:fillRect l="-26000" t="-32759" r="-72000" b="-32759"/>
+                  </a:stretch>
+                </a:blipFill>
+              </p:spPr>
+              <p:txBody>
+                <a:bodyPr/>
+                <a:lstStyle/>
+                <a:p>
+                  <a:r>
+                    <a:rPr lang="en-US">
+                      <a:noFill/>
+                    </a:rPr>
+                    <a:t> </a:t>
+                  </a:r>
+                </a:p>
+              </p:txBody>
+            </p:sp>
+          </mc:Fallback>
+        </mc:AlternateContent>
+      </p:grpSp>
     </p:spTree>
     <p:extLst>
       <p:ext uri="{BB962C8B-B14F-4D97-AF65-F5344CB8AC3E}">
         <p14:creationId xmlns:p14="http://schemas.microsoft.com/office/powerpoint/2010/main" val="1819297336"/>
+      </p:ext>
+    </p:extLst>
+  </p:cSld>
+  <p:clrMapOvr>
+    <a:masterClrMapping/>
+  </p:clrMapOvr>
+</p:sld>
+</file>
+
+<file path=ppt/slides/slide8.xml><?xml version="1.0" encoding="utf-8"?>
+<p:sld xmlns:a="http://schemas.openxmlformats.org/drawingml/2006/main" xmlns:r="http://schemas.openxmlformats.org/officeDocument/2006/relationships" xmlns:p="http://schemas.openxmlformats.org/presentationml/2006/main">
+  <p:cSld>
+    <p:spTree>
+      <p:nvGrpSpPr>
+        <p:cNvPr id="1" name=""/>
+        <p:cNvGrpSpPr/>
+        <p:nvPr/>
+      </p:nvGrpSpPr>
+      <p:grpSpPr>
+        <a:xfrm>
+          <a:off x="0" y="0"/>
+          <a:ext cx="0" cy="0"/>
+          <a:chOff x="0" y="0"/>
+          <a:chExt cx="0" cy="0"/>
+        </a:xfrm>
+      </p:grpSpPr>
+      <p:grpSp>
+        <p:nvGrpSpPr>
+          <p:cNvPr id="41" name="Group 40"/>
+          <p:cNvGrpSpPr/>
+          <p:nvPr/>
+        </p:nvGrpSpPr>
+        <p:grpSpPr>
+          <a:xfrm>
+            <a:off x="6358270" y="1096628"/>
+            <a:ext cx="2056843" cy="1466498"/>
+            <a:chOff x="6645349" y="3995527"/>
+            <a:chExt cx="2056843" cy="1466498"/>
+          </a:xfrm>
+        </p:grpSpPr>
+        <p:grpSp>
+          <p:nvGrpSpPr>
+            <p:cNvPr id="32" name="Group 31"/>
+            <p:cNvGrpSpPr/>
+            <p:nvPr/>
+          </p:nvGrpSpPr>
+          <p:grpSpPr>
+            <a:xfrm>
+              <a:off x="6767237" y="4591917"/>
+              <a:ext cx="1934955" cy="870108"/>
+              <a:chOff x="6767237" y="4591917"/>
+              <a:chExt cx="1934955" cy="870108"/>
+            </a:xfrm>
+          </p:grpSpPr>
+          <p:sp>
+            <p:nvSpPr>
+              <p:cNvPr id="33" name="Rectangle 32"/>
+              <p:cNvSpPr/>
+              <p:nvPr/>
+            </p:nvSpPr>
+            <p:spPr>
+              <a:xfrm>
+                <a:off x="7292243" y="4591917"/>
+                <a:ext cx="884940" cy="629728"/>
+              </a:xfrm>
+              <a:prstGeom prst="rect">
+                <a:avLst/>
+              </a:prstGeom>
+              <a:solidFill>
+                <a:schemeClr val="bg2">
+                  <a:lumMod val="90000"/>
+                </a:schemeClr>
+              </a:solidFill>
+              <a:ln w="38100">
+                <a:solidFill>
+                  <a:schemeClr val="tx1"/>
+                </a:solidFill>
+              </a:ln>
+            </p:spPr>
+            <p:style>
+              <a:lnRef idx="2">
+                <a:schemeClr val="accent1">
+                  <a:shade val="50000"/>
+                </a:schemeClr>
+              </a:lnRef>
+              <a:fillRef idx="1">
+                <a:schemeClr val="accent1"/>
+              </a:fillRef>
+              <a:effectRef idx="0">
+                <a:schemeClr val="accent1"/>
+              </a:effectRef>
+              <a:fontRef idx="minor">
+                <a:schemeClr val="lt1"/>
+              </a:fontRef>
+            </p:style>
+            <p:txBody>
+              <a:bodyPr rtlCol="0" anchor="ctr"/>
+              <a:lstStyle/>
+              <a:p>
+                <a:pPr algn="ctr"/>
+                <a:endParaRPr lang="en-US"/>
+              </a:p>
+            </p:txBody>
+          </p:sp>
+          <p:sp>
+            <p:nvSpPr>
+              <p:cNvPr id="34" name="Rectangle 33"/>
+              <p:cNvSpPr/>
+              <p:nvPr/>
+            </p:nvSpPr>
+            <p:spPr>
+              <a:xfrm>
+                <a:off x="6767237" y="5223169"/>
+                <a:ext cx="1934955" cy="238856"/>
+              </a:xfrm>
+              <a:prstGeom prst="rect">
+                <a:avLst/>
+              </a:prstGeom>
+              <a:solidFill>
+                <a:schemeClr val="bg2">
+                  <a:lumMod val="50000"/>
+                </a:schemeClr>
+              </a:solidFill>
+              <a:ln w="38100">
+                <a:solidFill>
+                  <a:schemeClr val="tx1"/>
+                </a:solidFill>
+              </a:ln>
+            </p:spPr>
+            <p:style>
+              <a:lnRef idx="2">
+                <a:schemeClr val="accent1">
+                  <a:shade val="50000"/>
+                </a:schemeClr>
+              </a:lnRef>
+              <a:fillRef idx="1">
+                <a:schemeClr val="accent1"/>
+              </a:fillRef>
+              <a:effectRef idx="0">
+                <a:schemeClr val="accent1"/>
+              </a:effectRef>
+              <a:fontRef idx="minor">
+                <a:schemeClr val="lt1"/>
+              </a:fontRef>
+            </p:style>
+            <p:txBody>
+              <a:bodyPr rtlCol="0" anchor="ctr"/>
+              <a:lstStyle/>
+              <a:p>
+                <a:pPr algn="ctr"/>
+                <a:endParaRPr lang="en-US"/>
+              </a:p>
+            </p:txBody>
+          </p:sp>
+        </p:grpSp>
+        <p:sp>
+          <p:nvSpPr>
+            <p:cNvPr id="35" name="Rectangle 34"/>
+            <p:cNvSpPr/>
+            <p:nvPr/>
+          </p:nvSpPr>
+          <p:spPr>
+            <a:xfrm>
+              <a:off x="7513755" y="4256943"/>
+              <a:ext cx="441917" cy="334974"/>
+            </a:xfrm>
+            <a:prstGeom prst="rect">
+              <a:avLst/>
+            </a:prstGeom>
+            <a:solidFill>
+              <a:schemeClr val="bg2">
+                <a:lumMod val="90000"/>
+              </a:schemeClr>
+            </a:solidFill>
+            <a:ln w="38100">
+              <a:solidFill>
+                <a:schemeClr val="tx1"/>
+              </a:solidFill>
+            </a:ln>
+          </p:spPr>
+          <p:style>
+            <a:lnRef idx="2">
+              <a:schemeClr val="accent1">
+                <a:shade val="50000"/>
+              </a:schemeClr>
+            </a:lnRef>
+            <a:fillRef idx="1">
+              <a:schemeClr val="accent1"/>
+            </a:fillRef>
+            <a:effectRef idx="0">
+              <a:schemeClr val="accent1"/>
+            </a:effectRef>
+            <a:fontRef idx="minor">
+              <a:schemeClr val="lt1"/>
+            </a:fontRef>
+          </p:style>
+          <p:txBody>
+            <a:bodyPr rtlCol="0" anchor="ctr"/>
+            <a:lstStyle/>
+            <a:p>
+              <a:pPr algn="ctr"/>
+              <a:endParaRPr lang="en-US"/>
+            </a:p>
+          </p:txBody>
+        </p:sp>
+        <p:cxnSp>
+          <p:nvCxnSpPr>
+            <p:cNvPr id="37" name="Straight Arrow Connector 36"/>
+            <p:cNvCxnSpPr>
+              <a:endCxn id="35" idx="1"/>
+            </p:cNvCxnSpPr>
+            <p:nvPr/>
+          </p:nvCxnSpPr>
+          <p:spPr>
+            <a:xfrm>
+              <a:off x="6645349" y="4424430"/>
+              <a:ext cx="868406" cy="0"/>
+            </a:xfrm>
+            <a:prstGeom prst="straightConnector1">
+              <a:avLst/>
+            </a:prstGeom>
+            <a:ln w="38100">
+              <a:solidFill>
+                <a:schemeClr val="tx1"/>
+              </a:solidFill>
+              <a:tailEnd type="triangle"/>
+            </a:ln>
+          </p:spPr>
+          <p:style>
+            <a:lnRef idx="1">
+              <a:schemeClr val="accent1"/>
+            </a:lnRef>
+            <a:fillRef idx="0">
+              <a:schemeClr val="accent1"/>
+            </a:fillRef>
+            <a:effectRef idx="0">
+              <a:schemeClr val="accent1"/>
+            </a:effectRef>
+            <a:fontRef idx="minor">
+              <a:schemeClr val="tx1"/>
+            </a:fontRef>
+          </p:style>
+        </p:cxnSp>
+        <mc:AlternateContent xmlns:mc="http://schemas.openxmlformats.org/markup-compatibility/2006">
+          <mc:Choice xmlns:a14="http://schemas.microsoft.com/office/drawing/2010/main" Requires="a14">
+            <p:sp>
+              <p:nvSpPr>
+                <p:cNvPr id="38" name="TextBox 37"/>
+                <p:cNvSpPr txBox="1"/>
+                <p:nvPr/>
+              </p:nvSpPr>
+              <p:spPr>
+                <a:xfrm>
+                  <a:off x="6960737" y="3995527"/>
+                  <a:ext cx="237629" cy="345159"/>
+                </a:xfrm>
+                <a:prstGeom prst="rect">
+                  <a:avLst/>
+                </a:prstGeom>
+                <a:noFill/>
+              </p:spPr>
+              <p:txBody>
+                <a:bodyPr wrap="none" lIns="0" tIns="0" rIns="0" bIns="0" rtlCol="0">
+                  <a:spAutoFit/>
+                </a:bodyPr>
+                <a:lstStyle/>
+                <a:p>
+                  <a14:m>
+                    <m:oMathPara xmlns:m="http://schemas.openxmlformats.org/officeDocument/2006/math">
+                      <m:oMathParaPr>
+                        <m:jc m:val="centerGroup"/>
+                      </m:oMathParaPr>
+                      <m:oMath xmlns:m="http://schemas.openxmlformats.org/officeDocument/2006/math">
+                        <m:acc>
+                          <m:accPr>
+                            <m:chr m:val="⃗"/>
+                            <m:ctrlPr>
+                              <a:rPr lang="en-US" sz="2000" b="0" i="1" smtClean="0">
+                                <a:latin typeface="Cambria Math" panose="02040503050406030204" pitchFamily="18" charset="0"/>
+                                <a:cs typeface="Arial" panose="020B0604020202020204" pitchFamily="34" charset="0"/>
+                              </a:rPr>
+                            </m:ctrlPr>
+                          </m:accPr>
+                          <m:e>
+                            <m:r>
+                              <a:rPr lang="en-US" sz="2000" b="0" i="1" smtClean="0">
+                                <a:latin typeface="Cambria Math" panose="02040503050406030204" pitchFamily="18" charset="0"/>
+                                <a:cs typeface="Arial" panose="020B0604020202020204" pitchFamily="34" charset="0"/>
+                              </a:rPr>
+                              <m:t>𝐹</m:t>
+                            </m:r>
+                          </m:e>
+                        </m:acc>
+                      </m:oMath>
+                    </m:oMathPara>
+                  </a14:m>
+                  <a:endParaRPr lang="en-US" sz="2000" dirty="0" smtClean="0">
+                    <a:latin typeface="Arial" panose="020B0604020202020204" pitchFamily="34" charset="0"/>
+                    <a:cs typeface="Arial" panose="020B0604020202020204" pitchFamily="34" charset="0"/>
+                  </a:endParaRPr>
+                </a:p>
+              </p:txBody>
+            </p:sp>
+          </mc:Choice>
+          <mc:Fallback>
+            <p:sp>
+              <p:nvSpPr>
+                <p:cNvPr id="38" name="TextBox 37"/>
+                <p:cNvSpPr txBox="1">
+                  <a:spLocks noRot="1" noChangeAspect="1" noMove="1" noResize="1" noEditPoints="1" noAdjustHandles="1" noChangeArrowheads="1" noChangeShapeType="1" noTextEdit="1"/>
+                </p:cNvSpPr>
+                <p:nvPr/>
+              </p:nvSpPr>
+              <p:spPr>
+                <a:xfrm>
+                  <a:off x="6960737" y="3995527"/>
+                  <a:ext cx="237629" cy="345159"/>
+                </a:xfrm>
+                <a:prstGeom prst="rect">
+                  <a:avLst/>
+                </a:prstGeom>
+                <a:blipFill>
+                  <a:blip r:embed="rId2"/>
+                  <a:stretch>
+                    <a:fillRect l="-23077" t="-35088" r="-89744" b="-7018"/>
+                  </a:stretch>
+                </a:blipFill>
+              </p:spPr>
+              <p:txBody>
+                <a:bodyPr/>
+                <a:lstStyle/>
+                <a:p>
+                  <a:r>
+                    <a:rPr lang="en-US">
+                      <a:noFill/>
+                    </a:rPr>
+                    <a:t> </a:t>
+                  </a:r>
+                </a:p>
+              </p:txBody>
+            </p:sp>
+          </mc:Fallback>
+        </mc:AlternateContent>
+        <mc:AlternateContent xmlns:mc="http://schemas.openxmlformats.org/markup-compatibility/2006">
+          <mc:Choice xmlns:a14="http://schemas.microsoft.com/office/drawing/2010/main" Requires="a14">
+            <p:sp>
+              <p:nvSpPr>
+                <p:cNvPr id="39" name="TextBox 38"/>
+                <p:cNvSpPr txBox="1"/>
+                <p:nvPr/>
+              </p:nvSpPr>
+              <p:spPr>
+                <a:xfrm>
+                  <a:off x="7628113" y="4291390"/>
+                  <a:ext cx="213200" cy="307777"/>
+                </a:xfrm>
+                <a:prstGeom prst="rect">
+                  <a:avLst/>
+                </a:prstGeom>
+                <a:noFill/>
+              </p:spPr>
+              <p:txBody>
+                <a:bodyPr wrap="none" lIns="0" tIns="0" rIns="0" bIns="0" rtlCol="0">
+                  <a:spAutoFit/>
+                </a:bodyPr>
+                <a:lstStyle/>
+                <a:p>
+                  <a14:m>
+                    <m:oMathPara xmlns:m="http://schemas.openxmlformats.org/officeDocument/2006/math">
+                      <m:oMathParaPr>
+                        <m:jc m:val="centerGroup"/>
+                      </m:oMathParaPr>
+                      <m:oMath xmlns:m="http://schemas.openxmlformats.org/officeDocument/2006/math">
+                        <m:r>
+                          <a:rPr lang="en-US" sz="2000" b="0" i="1" smtClean="0">
+                            <a:latin typeface="Cambria Math" panose="02040503050406030204" pitchFamily="18" charset="0"/>
+                            <a:cs typeface="Arial" panose="020B0604020202020204" pitchFamily="34" charset="0"/>
+                          </a:rPr>
+                          <m:t>2</m:t>
+                        </m:r>
+                      </m:oMath>
+                    </m:oMathPara>
+                  </a14:m>
+                  <a:endParaRPr lang="en-US" sz="2000" dirty="0" smtClean="0">
+                    <a:latin typeface="Arial" panose="020B0604020202020204" pitchFamily="34" charset="0"/>
+                    <a:cs typeface="Arial" panose="020B0604020202020204" pitchFamily="34" charset="0"/>
+                  </a:endParaRPr>
+                </a:p>
+              </p:txBody>
+            </p:sp>
+          </mc:Choice>
+          <mc:Fallback>
+            <p:sp>
+              <p:nvSpPr>
+                <p:cNvPr id="39" name="TextBox 38"/>
+                <p:cNvSpPr txBox="1">
+                  <a:spLocks noRot="1" noChangeAspect="1" noMove="1" noResize="1" noEditPoints="1" noAdjustHandles="1" noChangeArrowheads="1" noChangeShapeType="1" noTextEdit="1"/>
+                </p:cNvSpPr>
+                <p:nvPr/>
+              </p:nvSpPr>
+              <p:spPr>
+                <a:xfrm>
+                  <a:off x="7628113" y="4291390"/>
+                  <a:ext cx="213200" cy="307777"/>
+                </a:xfrm>
+                <a:prstGeom prst="rect">
+                  <a:avLst/>
+                </a:prstGeom>
+                <a:blipFill>
+                  <a:blip r:embed="rId3"/>
+                  <a:stretch>
+                    <a:fillRect l="-22857" r="-25714" b="-9804"/>
+                  </a:stretch>
+                </a:blipFill>
+              </p:spPr>
+              <p:txBody>
+                <a:bodyPr/>
+                <a:lstStyle/>
+                <a:p>
+                  <a:r>
+                    <a:rPr lang="en-US">
+                      <a:noFill/>
+                    </a:rPr>
+                    <a:t> </a:t>
+                  </a:r>
+                </a:p>
+              </p:txBody>
+            </p:sp>
+          </mc:Fallback>
+        </mc:AlternateContent>
+        <mc:AlternateContent xmlns:mc="http://schemas.openxmlformats.org/markup-compatibility/2006">
+          <mc:Choice xmlns:a14="http://schemas.microsoft.com/office/drawing/2010/main" Requires="a14">
+            <p:sp>
+              <p:nvSpPr>
+                <p:cNvPr id="40" name="TextBox 39"/>
+                <p:cNvSpPr txBox="1"/>
+                <p:nvPr/>
+              </p:nvSpPr>
+              <p:spPr>
+                <a:xfrm>
+                  <a:off x="7628113" y="4738555"/>
+                  <a:ext cx="213200" cy="307777"/>
+                </a:xfrm>
+                <a:prstGeom prst="rect">
+                  <a:avLst/>
+                </a:prstGeom>
+                <a:noFill/>
+              </p:spPr>
+              <p:txBody>
+                <a:bodyPr wrap="none" lIns="0" tIns="0" rIns="0" bIns="0" rtlCol="0">
+                  <a:spAutoFit/>
+                </a:bodyPr>
+                <a:lstStyle/>
+                <a:p>
+                  <a14:m>
+                    <m:oMathPara xmlns:m="http://schemas.openxmlformats.org/officeDocument/2006/math">
+                      <m:oMathParaPr>
+                        <m:jc m:val="centerGroup"/>
+                      </m:oMathParaPr>
+                      <m:oMath xmlns:m="http://schemas.openxmlformats.org/officeDocument/2006/math">
+                        <m:r>
+                          <a:rPr lang="en-US" sz="2000" b="0" i="1" smtClean="0">
+                            <a:latin typeface="Cambria Math" panose="02040503050406030204" pitchFamily="18" charset="0"/>
+                            <a:cs typeface="Arial" panose="020B0604020202020204" pitchFamily="34" charset="0"/>
+                          </a:rPr>
+                          <m:t>1</m:t>
+                        </m:r>
+                      </m:oMath>
+                    </m:oMathPara>
+                  </a14:m>
+                  <a:endParaRPr lang="en-US" sz="2000" dirty="0" smtClean="0">
+                    <a:latin typeface="Arial" panose="020B0604020202020204" pitchFamily="34" charset="0"/>
+                    <a:cs typeface="Arial" panose="020B0604020202020204" pitchFamily="34" charset="0"/>
+                  </a:endParaRPr>
+                </a:p>
+              </p:txBody>
+            </p:sp>
+          </mc:Choice>
+          <mc:Fallback>
+            <p:sp>
+              <p:nvSpPr>
+                <p:cNvPr id="40" name="TextBox 39"/>
+                <p:cNvSpPr txBox="1">
+                  <a:spLocks noRot="1" noChangeAspect="1" noMove="1" noResize="1" noEditPoints="1" noAdjustHandles="1" noChangeArrowheads="1" noChangeShapeType="1" noTextEdit="1"/>
+                </p:cNvSpPr>
+                <p:nvPr/>
+              </p:nvSpPr>
+              <p:spPr>
+                <a:xfrm>
+                  <a:off x="7628113" y="4738555"/>
+                  <a:ext cx="213200" cy="307777"/>
+                </a:xfrm>
+                <a:prstGeom prst="rect">
+                  <a:avLst/>
+                </a:prstGeom>
+                <a:blipFill>
+                  <a:blip r:embed="rId4"/>
+                  <a:stretch>
+                    <a:fillRect l="-22857" r="-25714" b="-10000"/>
+                  </a:stretch>
+                </a:blipFill>
+              </p:spPr>
+              <p:txBody>
+                <a:bodyPr/>
+                <a:lstStyle/>
+                <a:p>
+                  <a:r>
+                    <a:rPr lang="en-US">
+                      <a:noFill/>
+                    </a:rPr>
+                    <a:t> </a:t>
+                  </a:r>
+                </a:p>
+              </p:txBody>
+            </p:sp>
+          </mc:Fallback>
+        </mc:AlternateContent>
+      </p:grpSp>
+      <p:grpSp>
+        <p:nvGrpSpPr>
+          <p:cNvPr id="64" name="Group 63"/>
+          <p:cNvGrpSpPr/>
+          <p:nvPr/>
+        </p:nvGrpSpPr>
+        <p:grpSpPr>
+          <a:xfrm>
+            <a:off x="972707" y="1257870"/>
+            <a:ext cx="4019548" cy="3812153"/>
+            <a:chOff x="972707" y="1257870"/>
+            <a:chExt cx="4019548" cy="3812153"/>
+          </a:xfrm>
+        </p:grpSpPr>
+        <p:sp>
+          <p:nvSpPr>
+            <p:cNvPr id="14" name="Oval 13"/>
+            <p:cNvSpPr/>
+            <p:nvPr/>
+          </p:nvSpPr>
+          <p:spPr>
+            <a:xfrm>
+              <a:off x="1846544" y="3434738"/>
+              <a:ext cx="120943" cy="119766"/>
+            </a:xfrm>
+            <a:prstGeom prst="ellipse">
+              <a:avLst/>
+            </a:prstGeom>
+            <a:solidFill>
+              <a:schemeClr val="tx1"/>
+            </a:solidFill>
+            <a:ln w="38100">
+              <a:solidFill>
+                <a:schemeClr val="tx1"/>
+              </a:solidFill>
+            </a:ln>
+          </p:spPr>
+          <p:style>
+            <a:lnRef idx="2">
+              <a:schemeClr val="accent1">
+                <a:shade val="50000"/>
+              </a:schemeClr>
+            </a:lnRef>
+            <a:fillRef idx="1">
+              <a:schemeClr val="accent1"/>
+            </a:fillRef>
+            <a:effectRef idx="0">
+              <a:schemeClr val="accent1"/>
+            </a:effectRef>
+            <a:fontRef idx="minor">
+              <a:schemeClr val="lt1"/>
+            </a:fontRef>
+          </p:style>
+          <p:txBody>
+            <a:bodyPr rtlCol="0" anchor="ctr"/>
+            <a:lstStyle/>
+            <a:p>
+              <a:pPr algn="ctr"/>
+              <a:endParaRPr lang="en-US"/>
+            </a:p>
+          </p:txBody>
+        </p:sp>
+        <p:cxnSp>
+          <p:nvCxnSpPr>
+            <p:cNvPr id="15" name="Straight Arrow Connector 14"/>
+            <p:cNvCxnSpPr/>
+            <p:nvPr/>
+          </p:nvCxnSpPr>
+          <p:spPr>
+            <a:xfrm>
+              <a:off x="1912364" y="3543871"/>
+              <a:ext cx="5284" cy="1040756"/>
+            </a:xfrm>
+            <a:prstGeom prst="straightConnector1">
+              <a:avLst/>
+            </a:prstGeom>
+            <a:ln w="38100">
+              <a:solidFill>
+                <a:schemeClr val="tx1"/>
+              </a:solidFill>
+              <a:tailEnd type="triangle"/>
+            </a:ln>
+          </p:spPr>
+          <p:style>
+            <a:lnRef idx="1">
+              <a:schemeClr val="accent1"/>
+            </a:lnRef>
+            <a:fillRef idx="0">
+              <a:schemeClr val="accent1"/>
+            </a:fillRef>
+            <a:effectRef idx="0">
+              <a:schemeClr val="accent1"/>
+            </a:effectRef>
+            <a:fontRef idx="minor">
+              <a:schemeClr val="tx1"/>
+            </a:fontRef>
+          </p:style>
+        </p:cxnSp>
+        <mc:AlternateContent xmlns:mc="http://schemas.openxmlformats.org/markup-compatibility/2006">
+          <mc:Choice xmlns:a14="http://schemas.microsoft.com/office/drawing/2010/main" Requires="a14">
+            <p:sp>
+              <p:nvSpPr>
+                <p:cNvPr id="16" name="TextBox 15"/>
+                <p:cNvSpPr txBox="1"/>
+                <p:nvPr/>
+              </p:nvSpPr>
+              <p:spPr>
+                <a:xfrm>
+                  <a:off x="1409538" y="3907447"/>
+                  <a:ext cx="445891" cy="377219"/>
+                </a:xfrm>
+                <a:prstGeom prst="rect">
+                  <a:avLst/>
+                </a:prstGeom>
+                <a:noFill/>
+              </p:spPr>
+              <p:txBody>
+                <a:bodyPr wrap="none" lIns="0" tIns="0" rIns="0" bIns="0" rtlCol="0">
+                  <a:spAutoFit/>
+                </a:bodyPr>
+                <a:lstStyle/>
+                <a:p>
+                  <a:pPr/>
+                  <a14:m>
+                    <m:oMathPara xmlns:m="http://schemas.openxmlformats.org/officeDocument/2006/math">
+                      <m:oMathParaPr>
+                        <m:jc m:val="centerGroup"/>
+                      </m:oMathParaPr>
+                      <m:oMath xmlns:m="http://schemas.openxmlformats.org/officeDocument/2006/math">
+                        <m:sSub>
+                          <m:sSubPr>
+                            <m:ctrlPr>
+                              <a:rPr lang="en-US" sz="2000" b="0" i="1" smtClean="0">
+                                <a:latin typeface="Cambria Math" panose="02040503050406030204" pitchFamily="18" charset="0"/>
+                                <a:cs typeface="Arial" panose="020B0604020202020204" pitchFamily="34" charset="0"/>
+                              </a:rPr>
+                            </m:ctrlPr>
+                          </m:sSubPr>
+                          <m:e>
+                            <m:acc>
+                              <m:accPr>
+                                <m:chr m:val="⃗"/>
+                                <m:ctrlPr>
+                                  <a:rPr lang="en-US" sz="2000" b="0" i="1" smtClean="0">
+                                    <a:latin typeface="Cambria Math" panose="02040503050406030204" pitchFamily="18" charset="0"/>
+                                    <a:cs typeface="Arial" panose="020B0604020202020204" pitchFamily="34" charset="0"/>
+                                  </a:rPr>
+                                </m:ctrlPr>
+                              </m:accPr>
+                              <m:e>
+                                <m:r>
+                                  <a:rPr lang="en-US" sz="2000" b="0" i="1" smtClean="0">
+                                    <a:latin typeface="Cambria Math" panose="02040503050406030204" pitchFamily="18" charset="0"/>
+                                    <a:cs typeface="Arial" panose="020B0604020202020204" pitchFamily="34" charset="0"/>
+                                  </a:rPr>
+                                  <m:t>𝐹</m:t>
+                                </m:r>
+                              </m:e>
+                            </m:acc>
+                          </m:e>
+                          <m:sub>
+                            <m:r>
+                              <a:rPr lang="en-US" sz="2000" b="0" i="1" smtClean="0">
+                                <a:latin typeface="Cambria Math" panose="02040503050406030204" pitchFamily="18" charset="0"/>
+                                <a:cs typeface="Arial" panose="020B0604020202020204" pitchFamily="34" charset="0"/>
+                              </a:rPr>
+                              <m:t>2</m:t>
+                            </m:r>
+                            <m:r>
+                              <a:rPr lang="en-US" sz="2000" b="0" i="1" smtClean="0">
+                                <a:latin typeface="Cambria Math" panose="02040503050406030204" pitchFamily="18" charset="0"/>
+                                <a:cs typeface="Arial" panose="020B0604020202020204" pitchFamily="34" charset="0"/>
+                              </a:rPr>
+                              <m:t>𝑔</m:t>
+                            </m:r>
+                          </m:sub>
+                        </m:sSub>
+                      </m:oMath>
+                    </m:oMathPara>
+                  </a14:m>
+                  <a:endParaRPr lang="en-US" sz="2000" dirty="0" smtClean="0">
+                    <a:latin typeface="Arial" panose="020B0604020202020204" pitchFamily="34" charset="0"/>
+                    <a:cs typeface="Arial" panose="020B0604020202020204" pitchFamily="34" charset="0"/>
+                  </a:endParaRPr>
+                </a:p>
+              </p:txBody>
+            </p:sp>
+          </mc:Choice>
+          <mc:Fallback>
+            <p:sp>
+              <p:nvSpPr>
+                <p:cNvPr id="16" name="TextBox 15"/>
+                <p:cNvSpPr txBox="1">
+                  <a:spLocks noRot="1" noChangeAspect="1" noMove="1" noResize="1" noEditPoints="1" noAdjustHandles="1" noChangeArrowheads="1" noChangeShapeType="1" noTextEdit="1"/>
+                </p:cNvSpPr>
+                <p:nvPr/>
+              </p:nvSpPr>
+              <p:spPr>
+                <a:xfrm>
+                  <a:off x="1409538" y="3907447"/>
+                  <a:ext cx="445891" cy="377219"/>
+                </a:xfrm>
+                <a:prstGeom prst="rect">
+                  <a:avLst/>
+                </a:prstGeom>
+                <a:blipFill>
+                  <a:blip r:embed="rId5"/>
+                  <a:stretch>
+                    <a:fillRect l="-10959" t="-32258" r="-36986" b="-20968"/>
+                  </a:stretch>
+                </a:blipFill>
+              </p:spPr>
+              <p:txBody>
+                <a:bodyPr/>
+                <a:lstStyle/>
+                <a:p>
+                  <a:r>
+                    <a:rPr lang="en-US">
+                      <a:noFill/>
+                    </a:rPr>
+                    <a:t> </a:t>
+                  </a:r>
+                </a:p>
+              </p:txBody>
+            </p:sp>
+          </mc:Fallback>
+        </mc:AlternateContent>
+        <p:cxnSp>
+          <p:nvCxnSpPr>
+            <p:cNvPr id="18" name="Straight Arrow Connector 17"/>
+            <p:cNvCxnSpPr/>
+            <p:nvPr/>
+          </p:nvCxnSpPr>
+          <p:spPr>
+            <a:xfrm flipV="1">
+              <a:off x="1912364" y="2401195"/>
+              <a:ext cx="0" cy="1046156"/>
+            </a:xfrm>
+            <a:prstGeom prst="straightConnector1">
+              <a:avLst/>
+            </a:prstGeom>
+            <a:ln w="38100">
+              <a:solidFill>
+                <a:schemeClr val="tx1"/>
+              </a:solidFill>
+              <a:tailEnd type="triangle"/>
+            </a:ln>
+          </p:spPr>
+          <p:style>
+            <a:lnRef idx="1">
+              <a:schemeClr val="accent1"/>
+            </a:lnRef>
+            <a:fillRef idx="0">
+              <a:schemeClr val="accent1"/>
+            </a:fillRef>
+            <a:effectRef idx="0">
+              <a:schemeClr val="accent1"/>
+            </a:effectRef>
+            <a:fontRef idx="minor">
+              <a:schemeClr val="tx1"/>
+            </a:fontRef>
+          </p:style>
+        </p:cxnSp>
+        <mc:AlternateContent xmlns:mc="http://schemas.openxmlformats.org/markup-compatibility/2006">
+          <mc:Choice xmlns:a14="http://schemas.microsoft.com/office/drawing/2010/main" Requires="a14">
+            <p:sp>
+              <p:nvSpPr>
+                <p:cNvPr id="20" name="TextBox 19"/>
+                <p:cNvSpPr txBox="1"/>
+                <p:nvPr/>
+              </p:nvSpPr>
+              <p:spPr>
+                <a:xfrm>
+                  <a:off x="2007060" y="2956363"/>
+                  <a:ext cx="256847" cy="345159"/>
+                </a:xfrm>
+                <a:prstGeom prst="rect">
+                  <a:avLst/>
+                </a:prstGeom>
+                <a:noFill/>
+              </p:spPr>
+              <p:txBody>
+                <a:bodyPr wrap="square" lIns="0" tIns="0" rIns="0" bIns="0" rtlCol="0">
+                  <a:spAutoFit/>
+                </a:bodyPr>
+                <a:lstStyle/>
+                <a:p>
+                  <a:pPr/>
+                  <a14:m>
+                    <m:oMathPara xmlns:m="http://schemas.openxmlformats.org/officeDocument/2006/math">
+                      <m:oMathParaPr>
+                        <m:jc m:val="centerGroup"/>
+                      </m:oMathParaPr>
+                      <m:oMath xmlns:m="http://schemas.openxmlformats.org/officeDocument/2006/math">
+                        <m:sSub>
+                          <m:sSubPr>
+                            <m:ctrlPr>
+                              <a:rPr lang="en-US" sz="2000" b="0" i="0" smtClean="0">
+                                <a:latin typeface="Cambria Math" panose="02040503050406030204" pitchFamily="18" charset="0"/>
+                                <a:cs typeface="Arial" panose="020B0604020202020204" pitchFamily="34" charset="0"/>
+                              </a:rPr>
+                            </m:ctrlPr>
+                          </m:sSubPr>
+                          <m:e>
+                            <m:acc>
+                              <m:accPr>
+                                <m:chr m:val="⃗"/>
+                                <m:ctrlPr>
+                                  <a:rPr lang="en-US" sz="2000" b="0" i="1" smtClean="0">
+                                    <a:latin typeface="Cambria Math" panose="02040503050406030204" pitchFamily="18" charset="0"/>
+                                    <a:cs typeface="Arial" panose="020B0604020202020204" pitchFamily="34" charset="0"/>
+                                  </a:rPr>
+                                </m:ctrlPr>
+                              </m:accPr>
+                              <m:e>
+                                <m:r>
+                                  <a:rPr lang="en-US" sz="2000" b="0" i="1" smtClean="0">
+                                    <a:latin typeface="Cambria Math" panose="02040503050406030204" pitchFamily="18" charset="0"/>
+                                    <a:cs typeface="Arial" panose="020B0604020202020204" pitchFamily="34" charset="0"/>
+                                  </a:rPr>
+                                  <m:t>𝑁</m:t>
+                                </m:r>
+                              </m:e>
+                            </m:acc>
+                          </m:e>
+                          <m:sub>
+                            <m:r>
+                              <a:rPr lang="en-US" sz="2000" b="0" i="0" smtClean="0">
+                                <a:latin typeface="Cambria Math" panose="02040503050406030204" pitchFamily="18" charset="0"/>
+                                <a:cs typeface="Arial" panose="020B0604020202020204" pitchFamily="34" charset="0"/>
+                              </a:rPr>
+                              <m:t>2</m:t>
+                            </m:r>
+                          </m:sub>
+                        </m:sSub>
+                      </m:oMath>
+                    </m:oMathPara>
+                  </a14:m>
+                  <a:endParaRPr lang="en-US" sz="2000" dirty="0" smtClean="0">
+                    <a:latin typeface="Arial" panose="020B0604020202020204" pitchFamily="34" charset="0"/>
+                    <a:cs typeface="Arial" panose="020B0604020202020204" pitchFamily="34" charset="0"/>
+                  </a:endParaRPr>
+                </a:p>
+              </p:txBody>
+            </p:sp>
+          </mc:Choice>
+          <mc:Fallback>
+            <p:sp>
+              <p:nvSpPr>
+                <p:cNvPr id="20" name="TextBox 19"/>
+                <p:cNvSpPr txBox="1">
+                  <a:spLocks noRot="1" noChangeAspect="1" noMove="1" noResize="1" noEditPoints="1" noAdjustHandles="1" noChangeArrowheads="1" noChangeShapeType="1" noTextEdit="1"/>
+                </p:cNvSpPr>
+                <p:nvPr/>
+              </p:nvSpPr>
+              <p:spPr>
+                <a:xfrm>
+                  <a:off x="2007060" y="2956363"/>
+                  <a:ext cx="256847" cy="345159"/>
+                </a:xfrm>
+                <a:prstGeom prst="rect">
+                  <a:avLst/>
+                </a:prstGeom>
+                <a:blipFill>
+                  <a:blip r:embed="rId6"/>
+                  <a:stretch>
+                    <a:fillRect l="-33333" r="-35714" b="-15789"/>
+                  </a:stretch>
+                </a:blipFill>
+              </p:spPr>
+              <p:txBody>
+                <a:bodyPr/>
+                <a:lstStyle/>
+                <a:p>
+                  <a:r>
+                    <a:rPr lang="en-US">
+                      <a:noFill/>
+                    </a:rPr>
+                    <a:t> </a:t>
+                  </a:r>
+                </a:p>
+              </p:txBody>
+            </p:sp>
+          </mc:Fallback>
+        </mc:AlternateContent>
+        <p:grpSp>
+          <p:nvGrpSpPr>
+            <p:cNvPr id="6" name="Group 5"/>
+            <p:cNvGrpSpPr/>
+            <p:nvPr/>
+          </p:nvGrpSpPr>
+          <p:grpSpPr>
+            <a:xfrm>
+              <a:off x="1029025" y="4360028"/>
+              <a:ext cx="898789" cy="709995"/>
+              <a:chOff x="758520" y="708040"/>
+              <a:chExt cx="2596102" cy="2135605"/>
+            </a:xfrm>
+          </p:grpSpPr>
+          <p:grpSp>
+            <p:nvGrpSpPr>
+              <p:cNvPr id="7" name="Group 6"/>
+              <p:cNvGrpSpPr/>
+              <p:nvPr/>
+            </p:nvGrpSpPr>
+            <p:grpSpPr>
+              <a:xfrm>
+                <a:off x="758520" y="708040"/>
+                <a:ext cx="2596102" cy="2135605"/>
+                <a:chOff x="785815" y="680744"/>
+                <a:chExt cx="2596102" cy="2135605"/>
+              </a:xfrm>
+            </p:grpSpPr>
+            <p:cxnSp>
+              <p:nvCxnSpPr>
+                <p:cNvPr id="9" name="Straight Arrow Connector 8"/>
+                <p:cNvCxnSpPr/>
+                <p:nvPr/>
+              </p:nvCxnSpPr>
+              <p:spPr>
+                <a:xfrm flipV="1">
+                  <a:off x="1516583" y="680744"/>
+                  <a:ext cx="7683" cy="1859535"/>
+                </a:xfrm>
+                <a:prstGeom prst="straightConnector1">
+                  <a:avLst/>
+                </a:prstGeom>
+                <a:ln w="38100">
+                  <a:solidFill>
+                    <a:schemeClr val="tx1"/>
+                  </a:solidFill>
+                  <a:tailEnd type="triangle"/>
+                </a:ln>
+              </p:spPr>
+              <p:style>
+                <a:lnRef idx="1">
+                  <a:schemeClr val="accent1"/>
+                </a:lnRef>
+                <a:fillRef idx="0">
+                  <a:schemeClr val="accent1"/>
+                </a:fillRef>
+                <a:effectRef idx="0">
+                  <a:schemeClr val="accent1"/>
+                </a:effectRef>
+                <a:fontRef idx="minor">
+                  <a:schemeClr val="tx1"/>
+                </a:fontRef>
+              </p:style>
+            </p:cxnSp>
+            <p:cxnSp>
+              <p:nvCxnSpPr>
+                <p:cNvPr id="10" name="Straight Arrow Connector 9"/>
+                <p:cNvCxnSpPr/>
+                <p:nvPr/>
+              </p:nvCxnSpPr>
+              <p:spPr>
+                <a:xfrm flipV="1">
+                  <a:off x="1507013" y="2535259"/>
+                  <a:ext cx="1874904" cy="1"/>
+                </a:xfrm>
+                <a:prstGeom prst="straightConnector1">
+                  <a:avLst/>
+                </a:prstGeom>
+                <a:ln w="38100">
+                  <a:solidFill>
+                    <a:schemeClr val="tx1"/>
+                  </a:solidFill>
+                  <a:tailEnd type="triangle"/>
+                </a:ln>
+              </p:spPr>
+              <p:style>
+                <a:lnRef idx="1">
+                  <a:schemeClr val="accent1"/>
+                </a:lnRef>
+                <a:fillRef idx="0">
+                  <a:schemeClr val="accent1"/>
+                </a:fillRef>
+                <a:effectRef idx="0">
+                  <a:schemeClr val="accent1"/>
+                </a:effectRef>
+                <a:fontRef idx="minor">
+                  <a:schemeClr val="tx1"/>
+                </a:fontRef>
+              </p:style>
+            </p:cxnSp>
+            <mc:AlternateContent xmlns:mc="http://schemas.openxmlformats.org/markup-compatibility/2006" xmlns:a14="http://schemas.microsoft.com/office/drawing/2010/main">
+              <mc:Choice Requires="a14">
+                <p:sp>
+                  <p:nvSpPr>
+                    <p:cNvPr id="11" name="Rectangle 10"/>
+                    <p:cNvSpPr/>
+                    <p:nvPr/>
+                  </p:nvSpPr>
+                  <p:spPr>
+                    <a:xfrm>
+                      <a:off x="2697555" y="2447016"/>
+                      <a:ext cx="367985" cy="369333"/>
+                    </a:xfrm>
+                    <a:prstGeom prst="rect">
+                      <a:avLst/>
+                    </a:prstGeom>
+                  </p:spPr>
+                  <p:txBody>
+                    <a:bodyPr wrap="none">
+                      <a:spAutoFit/>
+                    </a:bodyPr>
+                    <a:lstStyle/>
+                    <a:p>
+                      <a:pPr/>
+                      <a14:m>
+                        <m:oMathPara xmlns:m="http://schemas.openxmlformats.org/officeDocument/2006/math">
+                          <m:oMathParaPr>
+                            <m:jc m:val="centerGroup"/>
+                          </m:oMathParaPr>
+                          <m:oMath xmlns:m="http://schemas.openxmlformats.org/officeDocument/2006/math">
+                            <m:r>
+                              <a:rPr lang="en-US" i="1">
+                                <a:latin typeface="Cambria Math" panose="02040503050406030204" pitchFamily="18" charset="0"/>
+                                <a:cs typeface="Arial" panose="020B0604020202020204" pitchFamily="34" charset="0"/>
+                              </a:rPr>
+                              <m:t>𝑥</m:t>
+                            </m:r>
+                          </m:oMath>
+                        </m:oMathPara>
+                      </a14:m>
+                      <a:endParaRPr lang="en-CA" dirty="0"/>
+                    </a:p>
+                  </p:txBody>
+                </p:sp>
+              </mc:Choice>
+              <mc:Fallback xmlns="">
+                <p:sp>
+                  <p:nvSpPr>
+                    <p:cNvPr id="107" name="Rectangle 106"/>
+                    <p:cNvSpPr>
+                      <a:spLocks noRot="1" noChangeAspect="1" noMove="1" noResize="1" noEditPoints="1" noAdjustHandles="1" noChangeArrowheads="1" noChangeShapeType="1" noTextEdit="1"/>
+                    </p:cNvSpPr>
+                    <p:nvPr/>
+                  </p:nvSpPr>
+                  <p:spPr>
+                    <a:xfrm>
+                      <a:off x="2697555" y="2447016"/>
+                      <a:ext cx="367985" cy="369333"/>
+                    </a:xfrm>
+                    <a:prstGeom prst="rect">
+                      <a:avLst/>
+                    </a:prstGeom>
+                    <a:blipFill>
+                      <a:blip r:embed="rId27"/>
+                      <a:stretch>
+                        <a:fillRect r="-95238" b="-160000"/>
+                      </a:stretch>
+                    </a:blipFill>
+                  </p:spPr>
+                  <p:txBody>
+                    <a:bodyPr/>
+                    <a:lstStyle/>
+                    <a:p>
+                      <a:r>
+                        <a:rPr lang="en-US">
+                          <a:noFill/>
+                        </a:rPr>
+                        <a:t> </a:t>
+                      </a:r>
+                    </a:p>
+                  </p:txBody>
+                </p:sp>
+              </mc:Fallback>
+            </mc:AlternateContent>
+            <mc:AlternateContent xmlns:mc="http://schemas.openxmlformats.org/markup-compatibility/2006" xmlns:a14="http://schemas.microsoft.com/office/drawing/2010/main">
+              <mc:Choice Requires="a14">
+                <p:sp>
+                  <p:nvSpPr>
+                    <p:cNvPr id="12" name="Rectangle 11"/>
+                    <p:cNvSpPr/>
+                    <p:nvPr/>
+                  </p:nvSpPr>
+                  <p:spPr>
+                    <a:xfrm>
+                      <a:off x="785815" y="912420"/>
+                      <a:ext cx="371385" cy="369333"/>
+                    </a:xfrm>
+                    <a:prstGeom prst="rect">
+                      <a:avLst/>
+                    </a:prstGeom>
+                  </p:spPr>
+                  <p:txBody>
+                    <a:bodyPr wrap="none">
+                      <a:spAutoFit/>
+                    </a:bodyPr>
+                    <a:lstStyle/>
+                    <a:p>
+                      <a:pPr/>
+                      <a14:m>
+                        <m:oMathPara xmlns:m="http://schemas.openxmlformats.org/officeDocument/2006/math">
+                          <m:oMathParaPr>
+                            <m:jc m:val="centerGroup"/>
+                          </m:oMathParaPr>
+                          <m:oMath xmlns:m="http://schemas.openxmlformats.org/officeDocument/2006/math">
+                            <m:r>
+                              <a:rPr lang="en-US" b="0" i="1" smtClean="0">
+                                <a:latin typeface="Cambria Math" panose="02040503050406030204" pitchFamily="18" charset="0"/>
+                              </a:rPr>
+                              <m:t>𝑦</m:t>
+                            </m:r>
+                          </m:oMath>
+                        </m:oMathPara>
+                      </a14:m>
+                      <a:endParaRPr lang="en-CA" dirty="0"/>
+                    </a:p>
+                  </p:txBody>
+                </p:sp>
+              </mc:Choice>
+              <mc:Fallback xmlns="">
+                <p:sp>
+                  <p:nvSpPr>
+                    <p:cNvPr id="108" name="Rectangle 107"/>
+                    <p:cNvSpPr>
+                      <a:spLocks noRot="1" noChangeAspect="1" noMove="1" noResize="1" noEditPoints="1" noAdjustHandles="1" noChangeArrowheads="1" noChangeShapeType="1" noTextEdit="1"/>
+                    </p:cNvSpPr>
+                    <p:nvPr/>
+                  </p:nvSpPr>
+                  <p:spPr>
+                    <a:xfrm>
+                      <a:off x="785815" y="912420"/>
+                      <a:ext cx="371385" cy="369333"/>
+                    </a:xfrm>
+                    <a:prstGeom prst="rect">
+                      <a:avLst/>
+                    </a:prstGeom>
+                    <a:blipFill>
+                      <a:blip r:embed="rId28"/>
+                      <a:stretch>
+                        <a:fillRect l="-19048" r="-114286" b="-220000"/>
+                      </a:stretch>
+                    </a:blipFill>
+                  </p:spPr>
+                  <p:txBody>
+                    <a:bodyPr/>
+                    <a:lstStyle/>
+                    <a:p>
+                      <a:r>
+                        <a:rPr lang="en-US">
+                          <a:noFill/>
+                        </a:rPr>
+                        <a:t> </a:t>
+                      </a:r>
+                    </a:p>
+                  </p:txBody>
+                </p:sp>
+              </mc:Fallback>
+            </mc:AlternateContent>
+            <mc:AlternateContent xmlns:mc="http://schemas.openxmlformats.org/markup-compatibility/2006" xmlns:a14="http://schemas.microsoft.com/office/drawing/2010/main">
+              <mc:Choice Requires="a14">
+                <p:sp>
+                  <p:nvSpPr>
+                    <p:cNvPr id="13" name="Rectangle 12"/>
+                    <p:cNvSpPr/>
+                    <p:nvPr/>
+                  </p:nvSpPr>
+                  <p:spPr>
+                    <a:xfrm>
+                      <a:off x="1006642" y="2350591"/>
+                      <a:ext cx="367985" cy="369333"/>
+                    </a:xfrm>
+                    <a:prstGeom prst="rect">
+                      <a:avLst/>
+                    </a:prstGeom>
+                  </p:spPr>
+                  <p:txBody>
+                    <a:bodyPr wrap="none">
+                      <a:spAutoFit/>
+                    </a:bodyPr>
+                    <a:lstStyle/>
+                    <a:p>
+                      <a:pPr/>
+                      <a14:m>
+                        <m:oMathPara xmlns:m="http://schemas.openxmlformats.org/officeDocument/2006/math">
+                          <m:oMathParaPr>
+                            <m:jc m:val="centerGroup"/>
+                          </m:oMathParaPr>
+                          <m:oMath xmlns:m="http://schemas.openxmlformats.org/officeDocument/2006/math">
+                            <m:r>
+                              <a:rPr lang="en-US" b="0" i="1" smtClean="0">
+                                <a:latin typeface="Cambria Math" panose="02040503050406030204" pitchFamily="18" charset="0"/>
+                                <a:cs typeface="Arial" panose="020B0604020202020204" pitchFamily="34" charset="0"/>
+                              </a:rPr>
+                              <m:t>0</m:t>
+                            </m:r>
+                          </m:oMath>
+                        </m:oMathPara>
+                      </a14:m>
+                      <a:endParaRPr lang="en-CA" dirty="0"/>
+                    </a:p>
+                  </p:txBody>
+                </p:sp>
+              </mc:Choice>
+              <mc:Fallback xmlns="">
+                <p:sp>
+                  <p:nvSpPr>
+                    <p:cNvPr id="109" name="Rectangle 108"/>
+                    <p:cNvSpPr>
+                      <a:spLocks noRot="1" noChangeAspect="1" noMove="1" noResize="1" noEditPoints="1" noAdjustHandles="1" noChangeArrowheads="1" noChangeShapeType="1" noTextEdit="1"/>
+                    </p:cNvSpPr>
+                    <p:nvPr/>
+                  </p:nvSpPr>
+                  <p:spPr>
+                    <a:xfrm>
+                      <a:off x="1006642" y="2350591"/>
+                      <a:ext cx="367985" cy="369333"/>
+                    </a:xfrm>
+                    <a:prstGeom prst="rect">
+                      <a:avLst/>
+                    </a:prstGeom>
+                    <a:blipFill>
+                      <a:blip r:embed="rId29"/>
+                      <a:stretch>
+                        <a:fillRect l="-14286" r="-114286" b="-180000"/>
+                      </a:stretch>
+                    </a:blipFill>
+                  </p:spPr>
+                  <p:txBody>
+                    <a:bodyPr/>
+                    <a:lstStyle/>
+                    <a:p>
+                      <a:r>
+                        <a:rPr lang="en-US">
+                          <a:noFill/>
+                        </a:rPr>
+                        <a:t> </a:t>
+                      </a:r>
+                    </a:p>
+                  </p:txBody>
+                </p:sp>
+              </mc:Fallback>
+            </mc:AlternateContent>
+          </p:grpSp>
+          <p:sp>
+            <p:nvSpPr>
+              <p:cNvPr id="8" name="Rectangle 7"/>
+              <p:cNvSpPr/>
+              <p:nvPr/>
+            </p:nvSpPr>
+            <p:spPr>
+              <a:xfrm>
+                <a:off x="1129904" y="1614682"/>
+                <a:ext cx="184731" cy="369332"/>
+              </a:xfrm>
+              <a:prstGeom prst="rect">
+                <a:avLst/>
+              </a:prstGeom>
+            </p:spPr>
+            <p:txBody>
+              <a:bodyPr wrap="none">
+                <a:spAutoFit/>
+              </a:bodyPr>
+              <a:lstStyle/>
+              <a:p>
+                <a:endParaRPr lang="en-CA" dirty="0"/>
+              </a:p>
+            </p:txBody>
+          </p:sp>
+        </p:grpSp>
+        <p:cxnSp>
+          <p:nvCxnSpPr>
+            <p:cNvPr id="22" name="Straight Arrow Connector 21"/>
+            <p:cNvCxnSpPr/>
+            <p:nvPr/>
+          </p:nvCxnSpPr>
+          <p:spPr>
+            <a:xfrm>
+              <a:off x="1956010" y="3503100"/>
+              <a:ext cx="694693" cy="14123"/>
+            </a:xfrm>
+            <a:prstGeom prst="straightConnector1">
+              <a:avLst/>
+            </a:prstGeom>
+            <a:ln w="38100">
+              <a:solidFill>
+                <a:schemeClr val="tx1"/>
+              </a:solidFill>
+              <a:tailEnd type="triangle"/>
+            </a:ln>
+          </p:spPr>
+          <p:style>
+            <a:lnRef idx="1">
+              <a:schemeClr val="accent1"/>
+            </a:lnRef>
+            <a:fillRef idx="0">
+              <a:schemeClr val="accent1"/>
+            </a:fillRef>
+            <a:effectRef idx="0">
+              <a:schemeClr val="accent1"/>
+            </a:effectRef>
+            <a:fontRef idx="minor">
+              <a:schemeClr val="tx1"/>
+            </a:fontRef>
+          </p:style>
+        </p:cxnSp>
+        <mc:AlternateContent xmlns:mc="http://schemas.openxmlformats.org/markup-compatibility/2006">
+          <mc:Choice xmlns:a14="http://schemas.microsoft.com/office/drawing/2010/main" Requires="a14">
+            <p:sp>
+              <p:nvSpPr>
+                <p:cNvPr id="23" name="TextBox 22"/>
+                <p:cNvSpPr txBox="1"/>
+                <p:nvPr/>
+              </p:nvSpPr>
+              <p:spPr>
+                <a:xfrm>
+                  <a:off x="2326893" y="3623509"/>
+                  <a:ext cx="237629" cy="345159"/>
+                </a:xfrm>
+                <a:prstGeom prst="rect">
+                  <a:avLst/>
+                </a:prstGeom>
+                <a:noFill/>
+              </p:spPr>
+              <p:txBody>
+                <a:bodyPr wrap="none" lIns="0" tIns="0" rIns="0" bIns="0" rtlCol="0">
+                  <a:spAutoFit/>
+                </a:bodyPr>
+                <a:lstStyle/>
+                <a:p>
+                  <a14:m>
+                    <m:oMathPara xmlns:m="http://schemas.openxmlformats.org/officeDocument/2006/math">
+                      <m:oMathParaPr>
+                        <m:jc m:val="centerGroup"/>
+                      </m:oMathParaPr>
+                      <m:oMath xmlns:m="http://schemas.openxmlformats.org/officeDocument/2006/math">
+                        <m:acc>
+                          <m:accPr>
+                            <m:chr m:val="⃗"/>
+                            <m:ctrlPr>
+                              <a:rPr lang="en-US" sz="2000" b="0" i="1" smtClean="0">
+                                <a:latin typeface="Cambria Math" panose="02040503050406030204" pitchFamily="18" charset="0"/>
+                                <a:cs typeface="Arial" panose="020B0604020202020204" pitchFamily="34" charset="0"/>
+                              </a:rPr>
+                            </m:ctrlPr>
+                          </m:accPr>
+                          <m:e>
+                            <m:r>
+                              <a:rPr lang="en-US" sz="2000" b="0" i="1" smtClean="0">
+                                <a:latin typeface="Cambria Math" panose="02040503050406030204" pitchFamily="18" charset="0"/>
+                                <a:cs typeface="Arial" panose="020B0604020202020204" pitchFamily="34" charset="0"/>
+                              </a:rPr>
+                              <m:t>𝐹</m:t>
+                            </m:r>
+                          </m:e>
+                        </m:acc>
+                      </m:oMath>
+                    </m:oMathPara>
+                  </a14:m>
+                  <a:endParaRPr lang="en-US" sz="2000" dirty="0" smtClean="0">
+                    <a:latin typeface="Arial" panose="020B0604020202020204" pitchFamily="34" charset="0"/>
+                    <a:cs typeface="Arial" panose="020B0604020202020204" pitchFamily="34" charset="0"/>
+                  </a:endParaRPr>
+                </a:p>
+              </p:txBody>
+            </p:sp>
+          </mc:Choice>
+          <mc:Fallback>
+            <p:sp>
+              <p:nvSpPr>
+                <p:cNvPr id="23" name="TextBox 22"/>
+                <p:cNvSpPr txBox="1">
+                  <a:spLocks noRot="1" noChangeAspect="1" noMove="1" noResize="1" noEditPoints="1" noAdjustHandles="1" noChangeArrowheads="1" noChangeShapeType="1" noTextEdit="1"/>
+                </p:cNvSpPr>
+                <p:nvPr/>
+              </p:nvSpPr>
+              <p:spPr>
+                <a:xfrm>
+                  <a:off x="2326893" y="3623509"/>
+                  <a:ext cx="237629" cy="345159"/>
+                </a:xfrm>
+                <a:prstGeom prst="rect">
+                  <a:avLst/>
+                </a:prstGeom>
+                <a:blipFill>
+                  <a:blip r:embed="rId30"/>
+                  <a:stretch>
+                    <a:fillRect l="-23077" t="-33333" r="-89744" b="-8772"/>
+                  </a:stretch>
+                </a:blipFill>
+              </p:spPr>
+              <p:txBody>
+                <a:bodyPr/>
+                <a:lstStyle/>
+                <a:p>
+                  <a:r>
+                    <a:rPr lang="en-US">
+                      <a:noFill/>
+                    </a:rPr>
+                    <a:t> </a:t>
+                  </a:r>
+                </a:p>
+              </p:txBody>
+            </p:sp>
+          </mc:Fallback>
+        </mc:AlternateContent>
+        <p:sp>
+          <p:nvSpPr>
+            <p:cNvPr id="24" name="Oval 23"/>
+            <p:cNvSpPr/>
+            <p:nvPr/>
+          </p:nvSpPr>
+          <p:spPr>
+            <a:xfrm>
+              <a:off x="3853787" y="3416046"/>
+              <a:ext cx="120943" cy="119766"/>
+            </a:xfrm>
+            <a:prstGeom prst="ellipse">
+              <a:avLst/>
+            </a:prstGeom>
+            <a:solidFill>
+              <a:schemeClr val="tx1"/>
+            </a:solidFill>
+            <a:ln w="38100">
+              <a:solidFill>
+                <a:schemeClr val="tx1"/>
+              </a:solidFill>
+            </a:ln>
+          </p:spPr>
+          <p:style>
+            <a:lnRef idx="2">
+              <a:schemeClr val="accent1">
+                <a:shade val="50000"/>
+              </a:schemeClr>
+            </a:lnRef>
+            <a:fillRef idx="1">
+              <a:schemeClr val="accent1"/>
+            </a:fillRef>
+            <a:effectRef idx="0">
+              <a:schemeClr val="accent1"/>
+            </a:effectRef>
+            <a:fontRef idx="minor">
+              <a:schemeClr val="lt1"/>
+            </a:fontRef>
+          </p:style>
+          <p:txBody>
+            <a:bodyPr rtlCol="0" anchor="ctr"/>
+            <a:lstStyle/>
+            <a:p>
+              <a:pPr algn="ctr"/>
+              <a:endParaRPr lang="en-US"/>
+            </a:p>
+          </p:txBody>
+        </p:sp>
+        <p:cxnSp>
+          <p:nvCxnSpPr>
+            <p:cNvPr id="25" name="Straight Arrow Connector 24"/>
+            <p:cNvCxnSpPr/>
+            <p:nvPr/>
+          </p:nvCxnSpPr>
+          <p:spPr>
+            <a:xfrm>
+              <a:off x="3865214" y="3510509"/>
+              <a:ext cx="3815" cy="1158626"/>
+            </a:xfrm>
+            <a:prstGeom prst="straightConnector1">
+              <a:avLst/>
+            </a:prstGeom>
+            <a:ln w="38100">
+              <a:solidFill>
+                <a:schemeClr val="tx1"/>
+              </a:solidFill>
+              <a:tailEnd type="triangle"/>
+            </a:ln>
+          </p:spPr>
+          <p:style>
+            <a:lnRef idx="1">
+              <a:schemeClr val="accent1"/>
+            </a:lnRef>
+            <a:fillRef idx="0">
+              <a:schemeClr val="accent1"/>
+            </a:fillRef>
+            <a:effectRef idx="0">
+              <a:schemeClr val="accent1"/>
+            </a:effectRef>
+            <a:fontRef idx="minor">
+              <a:schemeClr val="tx1"/>
+            </a:fontRef>
+          </p:style>
+        </p:cxnSp>
+        <mc:AlternateContent xmlns:mc="http://schemas.openxmlformats.org/markup-compatibility/2006">
+          <mc:Choice xmlns:a14="http://schemas.microsoft.com/office/drawing/2010/main" Requires="a14">
+            <p:sp>
+              <p:nvSpPr>
+                <p:cNvPr id="26" name="TextBox 25"/>
+                <p:cNvSpPr txBox="1"/>
+                <p:nvPr/>
+              </p:nvSpPr>
+              <p:spPr>
+                <a:xfrm>
+                  <a:off x="3161036" y="3909893"/>
+                  <a:ext cx="445891" cy="377219"/>
+                </a:xfrm>
+                <a:prstGeom prst="rect">
+                  <a:avLst/>
+                </a:prstGeom>
+                <a:noFill/>
+              </p:spPr>
+              <p:txBody>
+                <a:bodyPr wrap="none" lIns="0" tIns="0" rIns="0" bIns="0" rtlCol="0">
+                  <a:spAutoFit/>
+                </a:bodyPr>
+                <a:lstStyle/>
+                <a:p>
+                  <a:pPr/>
+                  <a14:m>
+                    <m:oMathPara xmlns:m="http://schemas.openxmlformats.org/officeDocument/2006/math">
+                      <m:oMathParaPr>
+                        <m:jc m:val="centerGroup"/>
+                      </m:oMathParaPr>
+                      <m:oMath xmlns:m="http://schemas.openxmlformats.org/officeDocument/2006/math">
+                        <m:sSub>
+                          <m:sSubPr>
+                            <m:ctrlPr>
+                              <a:rPr lang="en-US" sz="2000" b="0" i="1" smtClean="0">
+                                <a:latin typeface="Cambria Math" panose="02040503050406030204" pitchFamily="18" charset="0"/>
+                                <a:cs typeface="Arial" panose="020B0604020202020204" pitchFamily="34" charset="0"/>
+                              </a:rPr>
+                            </m:ctrlPr>
+                          </m:sSubPr>
+                          <m:e>
+                            <m:acc>
+                              <m:accPr>
+                                <m:chr m:val="⃗"/>
+                                <m:ctrlPr>
+                                  <a:rPr lang="en-US" sz="2000" b="0" i="1" smtClean="0">
+                                    <a:latin typeface="Cambria Math" panose="02040503050406030204" pitchFamily="18" charset="0"/>
+                                    <a:cs typeface="Arial" panose="020B0604020202020204" pitchFamily="34" charset="0"/>
+                                  </a:rPr>
+                                </m:ctrlPr>
+                              </m:accPr>
+                              <m:e>
+                                <m:r>
+                                  <a:rPr lang="en-US" sz="2000" b="0" i="1" smtClean="0">
+                                    <a:latin typeface="Cambria Math" panose="02040503050406030204" pitchFamily="18" charset="0"/>
+                                    <a:cs typeface="Arial" panose="020B0604020202020204" pitchFamily="34" charset="0"/>
+                                  </a:rPr>
+                                  <m:t>𝐹</m:t>
+                                </m:r>
+                              </m:e>
+                            </m:acc>
+                          </m:e>
+                          <m:sub>
+                            <m:r>
+                              <a:rPr lang="en-US" sz="2000" b="0" i="1" smtClean="0">
+                                <a:latin typeface="Cambria Math" panose="02040503050406030204" pitchFamily="18" charset="0"/>
+                                <a:cs typeface="Arial" panose="020B0604020202020204" pitchFamily="34" charset="0"/>
+                              </a:rPr>
+                              <m:t>1</m:t>
+                            </m:r>
+                            <m:r>
+                              <a:rPr lang="en-US" sz="2000" b="0" i="1" smtClean="0">
+                                <a:latin typeface="Cambria Math" panose="02040503050406030204" pitchFamily="18" charset="0"/>
+                                <a:cs typeface="Arial" panose="020B0604020202020204" pitchFamily="34" charset="0"/>
+                              </a:rPr>
+                              <m:t>𝑔</m:t>
+                            </m:r>
+                          </m:sub>
+                        </m:sSub>
+                      </m:oMath>
+                    </m:oMathPara>
+                  </a14:m>
+                  <a:endParaRPr lang="en-US" sz="2000" dirty="0" smtClean="0">
+                    <a:latin typeface="Arial" panose="020B0604020202020204" pitchFamily="34" charset="0"/>
+                    <a:cs typeface="Arial" panose="020B0604020202020204" pitchFamily="34" charset="0"/>
+                  </a:endParaRPr>
+                </a:p>
+              </p:txBody>
+            </p:sp>
+          </mc:Choice>
+          <mc:Fallback>
+            <p:sp>
+              <p:nvSpPr>
+                <p:cNvPr id="26" name="TextBox 25"/>
+                <p:cNvSpPr txBox="1">
+                  <a:spLocks noRot="1" noChangeAspect="1" noMove="1" noResize="1" noEditPoints="1" noAdjustHandles="1" noChangeArrowheads="1" noChangeShapeType="1" noTextEdit="1"/>
+                </p:cNvSpPr>
+                <p:nvPr/>
+              </p:nvSpPr>
+              <p:spPr>
+                <a:xfrm>
+                  <a:off x="3161036" y="3909893"/>
+                  <a:ext cx="445891" cy="377219"/>
+                </a:xfrm>
+                <a:prstGeom prst="rect">
+                  <a:avLst/>
+                </a:prstGeom>
+                <a:blipFill>
+                  <a:blip r:embed="rId31"/>
+                  <a:stretch>
+                    <a:fillRect l="-12329" t="-30645" r="-35616" b="-20968"/>
+                  </a:stretch>
+                </a:blipFill>
+              </p:spPr>
+              <p:txBody>
+                <a:bodyPr/>
+                <a:lstStyle/>
+                <a:p>
+                  <a:r>
+                    <a:rPr lang="en-US">
+                      <a:noFill/>
+                    </a:rPr>
+                    <a:t> </a:t>
+                  </a:r>
+                </a:p>
+              </p:txBody>
+            </p:sp>
+          </mc:Fallback>
+        </mc:AlternateContent>
+        <p:cxnSp>
+          <p:nvCxnSpPr>
+            <p:cNvPr id="27" name="Straight Arrow Connector 26"/>
+            <p:cNvCxnSpPr/>
+            <p:nvPr/>
+          </p:nvCxnSpPr>
+          <p:spPr>
+            <a:xfrm flipV="1">
+              <a:off x="3905770" y="1257870"/>
+              <a:ext cx="0" cy="2184980"/>
+            </a:xfrm>
+            <a:prstGeom prst="straightConnector1">
+              <a:avLst/>
+            </a:prstGeom>
+            <a:ln w="38100">
+              <a:solidFill>
+                <a:schemeClr val="tx1"/>
+              </a:solidFill>
+              <a:tailEnd type="triangle"/>
+            </a:ln>
+          </p:spPr>
+          <p:style>
+            <a:lnRef idx="1">
+              <a:schemeClr val="accent1"/>
+            </a:lnRef>
+            <a:fillRef idx="0">
+              <a:schemeClr val="accent1"/>
+            </a:fillRef>
+            <a:effectRef idx="0">
+              <a:schemeClr val="accent1"/>
+            </a:effectRef>
+            <a:fontRef idx="minor">
+              <a:schemeClr val="tx1"/>
+            </a:fontRef>
+          </p:style>
+        </p:cxnSp>
+        <mc:AlternateContent xmlns:mc="http://schemas.openxmlformats.org/markup-compatibility/2006">
+          <mc:Choice xmlns:a14="http://schemas.microsoft.com/office/drawing/2010/main" Requires="a14">
+            <p:sp>
+              <p:nvSpPr>
+                <p:cNvPr id="28" name="TextBox 27"/>
+                <p:cNvSpPr txBox="1"/>
+                <p:nvPr/>
+              </p:nvSpPr>
+              <p:spPr>
+                <a:xfrm>
+                  <a:off x="4003242" y="2177780"/>
+                  <a:ext cx="256847" cy="345159"/>
+                </a:xfrm>
+                <a:prstGeom prst="rect">
+                  <a:avLst/>
+                </a:prstGeom>
+                <a:noFill/>
+              </p:spPr>
+              <p:txBody>
+                <a:bodyPr wrap="square" lIns="0" tIns="0" rIns="0" bIns="0" rtlCol="0">
+                  <a:spAutoFit/>
+                </a:bodyPr>
+                <a:lstStyle/>
+                <a:p>
+                  <a:pPr/>
+                  <a14:m>
+                    <m:oMathPara xmlns:m="http://schemas.openxmlformats.org/officeDocument/2006/math">
+                      <m:oMathParaPr>
+                        <m:jc m:val="centerGroup"/>
+                      </m:oMathParaPr>
+                      <m:oMath xmlns:m="http://schemas.openxmlformats.org/officeDocument/2006/math">
+                        <m:sSub>
+                          <m:sSubPr>
+                            <m:ctrlPr>
+                              <a:rPr lang="en-US" sz="2000" b="0" i="0" smtClean="0">
+                                <a:latin typeface="Cambria Math" panose="02040503050406030204" pitchFamily="18" charset="0"/>
+                                <a:cs typeface="Arial" panose="020B0604020202020204" pitchFamily="34" charset="0"/>
+                              </a:rPr>
+                            </m:ctrlPr>
+                          </m:sSubPr>
+                          <m:e>
+                            <m:acc>
+                              <m:accPr>
+                                <m:chr m:val="⃗"/>
+                                <m:ctrlPr>
+                                  <a:rPr lang="en-US" sz="2000" b="0" i="1" smtClean="0">
+                                    <a:latin typeface="Cambria Math" panose="02040503050406030204" pitchFamily="18" charset="0"/>
+                                    <a:cs typeface="Arial" panose="020B0604020202020204" pitchFamily="34" charset="0"/>
+                                  </a:rPr>
+                                </m:ctrlPr>
+                              </m:accPr>
+                              <m:e>
+                                <m:r>
+                                  <a:rPr lang="en-US" sz="2000" b="0" i="1" smtClean="0">
+                                    <a:latin typeface="Cambria Math" panose="02040503050406030204" pitchFamily="18" charset="0"/>
+                                    <a:cs typeface="Arial" panose="020B0604020202020204" pitchFamily="34" charset="0"/>
+                                  </a:rPr>
+                                  <m:t>𝑁</m:t>
+                                </m:r>
+                              </m:e>
+                            </m:acc>
+                          </m:e>
+                          <m:sub>
+                            <m:r>
+                              <a:rPr lang="en-US" sz="2000" b="0" i="0" smtClean="0">
+                                <a:latin typeface="Cambria Math" panose="02040503050406030204" pitchFamily="18" charset="0"/>
+                                <a:cs typeface="Arial" panose="020B0604020202020204" pitchFamily="34" charset="0"/>
+                              </a:rPr>
+                              <m:t>1</m:t>
+                            </m:r>
+                          </m:sub>
+                        </m:sSub>
+                      </m:oMath>
+                    </m:oMathPara>
+                  </a14:m>
+                  <a:endParaRPr lang="en-US" sz="2000" dirty="0" smtClean="0">
+                    <a:latin typeface="Arial" panose="020B0604020202020204" pitchFamily="34" charset="0"/>
+                    <a:cs typeface="Arial" panose="020B0604020202020204" pitchFamily="34" charset="0"/>
+                  </a:endParaRPr>
+                </a:p>
+              </p:txBody>
+            </p:sp>
+          </mc:Choice>
+          <mc:Fallback>
+            <p:sp>
+              <p:nvSpPr>
+                <p:cNvPr id="28" name="TextBox 27"/>
+                <p:cNvSpPr txBox="1">
+                  <a:spLocks noRot="1" noChangeAspect="1" noMove="1" noResize="1" noEditPoints="1" noAdjustHandles="1" noChangeArrowheads="1" noChangeShapeType="1" noTextEdit="1"/>
+                </p:cNvSpPr>
+                <p:nvPr/>
+              </p:nvSpPr>
+              <p:spPr>
+                <a:xfrm>
+                  <a:off x="4003242" y="2177780"/>
+                  <a:ext cx="256847" cy="345159"/>
+                </a:xfrm>
+                <a:prstGeom prst="rect">
+                  <a:avLst/>
+                </a:prstGeom>
+                <a:blipFill>
+                  <a:blip r:embed="rId32"/>
+                  <a:stretch>
+                    <a:fillRect l="-35714" r="-30952" b="-15789"/>
+                  </a:stretch>
+                </a:blipFill>
+              </p:spPr>
+              <p:txBody>
+                <a:bodyPr/>
+                <a:lstStyle/>
+                <a:p>
+                  <a:r>
+                    <a:rPr lang="en-US">
+                      <a:noFill/>
+                    </a:rPr>
+                    <a:t> </a:t>
+                  </a:r>
+                </a:p>
+              </p:txBody>
+            </p:sp>
+          </mc:Fallback>
+        </mc:AlternateContent>
+        <p:cxnSp>
+          <p:nvCxnSpPr>
+            <p:cNvPr id="29" name="Straight Arrow Connector 28"/>
+            <p:cNvCxnSpPr/>
+            <p:nvPr/>
+          </p:nvCxnSpPr>
+          <p:spPr>
+            <a:xfrm flipV="1">
+              <a:off x="3937669" y="3494621"/>
+              <a:ext cx="654456" cy="4989"/>
+            </a:xfrm>
+            <a:prstGeom prst="straightConnector1">
+              <a:avLst/>
+            </a:prstGeom>
+            <a:ln w="38100">
+              <a:solidFill>
+                <a:schemeClr val="tx1"/>
+              </a:solidFill>
+              <a:tailEnd type="triangle"/>
+            </a:ln>
+          </p:spPr>
+          <p:style>
+            <a:lnRef idx="1">
+              <a:schemeClr val="accent1"/>
+            </a:lnRef>
+            <a:fillRef idx="0">
+              <a:schemeClr val="accent1"/>
+            </a:fillRef>
+            <a:effectRef idx="0">
+              <a:schemeClr val="accent1"/>
+            </a:effectRef>
+            <a:fontRef idx="minor">
+              <a:schemeClr val="tx1"/>
+            </a:fontRef>
+          </p:style>
+        </p:cxnSp>
+        <mc:AlternateContent xmlns:mc="http://schemas.openxmlformats.org/markup-compatibility/2006">
+          <mc:Choice xmlns:a14="http://schemas.microsoft.com/office/drawing/2010/main" Requires="a14">
+            <p:sp>
+              <p:nvSpPr>
+                <p:cNvPr id="30" name="TextBox 29"/>
+                <p:cNvSpPr txBox="1"/>
+                <p:nvPr/>
+              </p:nvSpPr>
+              <p:spPr>
+                <a:xfrm>
+                  <a:off x="4413507" y="3473736"/>
+                  <a:ext cx="578748" cy="354071"/>
+                </a:xfrm>
+                <a:prstGeom prst="rect">
+                  <a:avLst/>
+                </a:prstGeom>
+                <a:noFill/>
+              </p:spPr>
+              <p:txBody>
+                <a:bodyPr wrap="none" lIns="0" tIns="0" rIns="0" bIns="0" rtlCol="0">
+                  <a:spAutoFit/>
+                </a:bodyPr>
+                <a:lstStyle/>
+                <a:p>
+                  <a14:m>
+                    <m:oMathPara xmlns:m="http://schemas.openxmlformats.org/officeDocument/2006/math">
+                      <m:oMathParaPr>
+                        <m:jc m:val="centerGroup"/>
+                      </m:oMathParaPr>
+                      <m:oMath xmlns:m="http://schemas.openxmlformats.org/officeDocument/2006/math">
+                        <m:r>
+                          <a:rPr lang="en-US" sz="2000" b="0" i="1" smtClean="0">
+                            <a:latin typeface="Cambria Math" panose="02040503050406030204" pitchFamily="18" charset="0"/>
+                            <a:cs typeface="Arial" panose="020B0604020202020204" pitchFamily="34" charset="0"/>
+                          </a:rPr>
+                          <m:t>−</m:t>
+                        </m:r>
+                        <m:sSub>
+                          <m:sSubPr>
+                            <m:ctrlPr>
+                              <a:rPr lang="en-US" sz="2000" b="0" i="1" smtClean="0">
+                                <a:latin typeface="Cambria Math" panose="02040503050406030204" pitchFamily="18" charset="0"/>
+                                <a:cs typeface="Arial" panose="020B0604020202020204" pitchFamily="34" charset="0"/>
+                              </a:rPr>
+                            </m:ctrlPr>
+                          </m:sSubPr>
+                          <m:e>
+                            <m:acc>
+                              <m:accPr>
+                                <m:chr m:val="⃗"/>
+                                <m:ctrlPr>
+                                  <a:rPr lang="en-US" sz="2000" b="0" i="1" smtClean="0">
+                                    <a:latin typeface="Cambria Math" panose="02040503050406030204" pitchFamily="18" charset="0"/>
+                                    <a:cs typeface="Arial" panose="020B0604020202020204" pitchFamily="34" charset="0"/>
+                                  </a:rPr>
+                                </m:ctrlPr>
+                              </m:accPr>
+                              <m:e>
+                                <m:r>
+                                  <a:rPr lang="en-US" sz="2000" b="0" i="1" smtClean="0">
+                                    <a:latin typeface="Cambria Math" panose="02040503050406030204" pitchFamily="18" charset="0"/>
+                                    <a:cs typeface="Arial" panose="020B0604020202020204" pitchFamily="34" charset="0"/>
+                                  </a:rPr>
+                                  <m:t>𝑓</m:t>
+                                </m:r>
+                              </m:e>
+                            </m:acc>
+                          </m:e>
+                          <m:sub>
+                            <m:r>
+                              <a:rPr lang="en-US" sz="2000" b="0" i="1" smtClean="0">
+                                <a:latin typeface="Cambria Math" panose="02040503050406030204" pitchFamily="18" charset="0"/>
+                                <a:cs typeface="Arial" panose="020B0604020202020204" pitchFamily="34" charset="0"/>
+                              </a:rPr>
+                              <m:t>2</m:t>
+                            </m:r>
+                            <m:r>
+                              <a:rPr lang="en-US" sz="2000" b="0" i="1" smtClean="0">
+                                <a:latin typeface="Cambria Math" panose="02040503050406030204" pitchFamily="18" charset="0"/>
+                                <a:cs typeface="Arial" panose="020B0604020202020204" pitchFamily="34" charset="0"/>
+                              </a:rPr>
+                              <m:t>𝑠</m:t>
+                            </m:r>
+                          </m:sub>
+                        </m:sSub>
+                      </m:oMath>
+                    </m:oMathPara>
+                  </a14:m>
+                  <a:endParaRPr lang="en-US" sz="2000" dirty="0" smtClean="0">
+                    <a:latin typeface="Arial" panose="020B0604020202020204" pitchFamily="34" charset="0"/>
+                    <a:cs typeface="Arial" panose="020B0604020202020204" pitchFamily="34" charset="0"/>
+                  </a:endParaRPr>
+                </a:p>
+              </p:txBody>
+            </p:sp>
+          </mc:Choice>
+          <mc:Fallback>
+            <p:sp>
+              <p:nvSpPr>
+                <p:cNvPr id="30" name="TextBox 29"/>
+                <p:cNvSpPr txBox="1">
+                  <a:spLocks noRot="1" noChangeAspect="1" noMove="1" noResize="1" noEditPoints="1" noAdjustHandles="1" noChangeArrowheads="1" noChangeShapeType="1" noTextEdit="1"/>
+                </p:cNvSpPr>
+                <p:nvPr/>
+              </p:nvSpPr>
+              <p:spPr>
+                <a:xfrm>
+                  <a:off x="4413507" y="3473736"/>
+                  <a:ext cx="578748" cy="354071"/>
+                </a:xfrm>
+                <a:prstGeom prst="rect">
+                  <a:avLst/>
+                </a:prstGeom>
+                <a:blipFill>
+                  <a:blip r:embed="rId33"/>
+                  <a:stretch>
+                    <a:fillRect l="-1053" t="-34483" r="-37895" b="-31034"/>
+                  </a:stretch>
+                </a:blipFill>
+              </p:spPr>
+              <p:txBody>
+                <a:bodyPr/>
+                <a:lstStyle/>
+                <a:p>
+                  <a:r>
+                    <a:rPr lang="en-US">
+                      <a:noFill/>
+                    </a:rPr>
+                    <a:t> </a:t>
+                  </a:r>
+                </a:p>
+              </p:txBody>
+            </p:sp>
+          </mc:Fallback>
+        </mc:AlternateContent>
+        <p:cxnSp>
+          <p:nvCxnSpPr>
+            <p:cNvPr id="42" name="Straight Arrow Connector 41"/>
+            <p:cNvCxnSpPr/>
+            <p:nvPr/>
+          </p:nvCxnSpPr>
+          <p:spPr>
+            <a:xfrm flipH="1" flipV="1">
+              <a:off x="1215215" y="3486785"/>
+              <a:ext cx="631329" cy="10463"/>
+            </a:xfrm>
+            <a:prstGeom prst="straightConnector1">
+              <a:avLst/>
+            </a:prstGeom>
+            <a:ln w="38100">
+              <a:solidFill>
+                <a:schemeClr val="tx1"/>
+              </a:solidFill>
+              <a:tailEnd type="triangle"/>
+            </a:ln>
+          </p:spPr>
+          <p:style>
+            <a:lnRef idx="1">
+              <a:schemeClr val="accent1"/>
+            </a:lnRef>
+            <a:fillRef idx="0">
+              <a:schemeClr val="accent1"/>
+            </a:fillRef>
+            <a:effectRef idx="0">
+              <a:schemeClr val="accent1"/>
+            </a:effectRef>
+            <a:fontRef idx="minor">
+              <a:schemeClr val="tx1"/>
+            </a:fontRef>
+          </p:style>
+        </p:cxnSp>
+        <mc:AlternateContent xmlns:mc="http://schemas.openxmlformats.org/markup-compatibility/2006">
+          <mc:Choice xmlns:a14="http://schemas.microsoft.com/office/drawing/2010/main" Requires="a14">
+            <p:sp>
+              <p:nvSpPr>
+                <p:cNvPr id="44" name="TextBox 43"/>
+                <p:cNvSpPr txBox="1"/>
+                <p:nvPr/>
+              </p:nvSpPr>
+              <p:spPr>
+                <a:xfrm>
+                  <a:off x="972707" y="3046248"/>
+                  <a:ext cx="386388" cy="354071"/>
+                </a:xfrm>
+                <a:prstGeom prst="rect">
+                  <a:avLst/>
+                </a:prstGeom>
+                <a:noFill/>
+              </p:spPr>
+              <p:txBody>
+                <a:bodyPr wrap="none" lIns="0" tIns="0" rIns="0" bIns="0" rtlCol="0">
+                  <a:spAutoFit/>
+                </a:bodyPr>
+                <a:lstStyle/>
+                <a:p>
+                  <a14:m>
+                    <m:oMathPara xmlns:m="http://schemas.openxmlformats.org/officeDocument/2006/math">
+                      <m:oMathParaPr>
+                        <m:jc m:val="centerGroup"/>
+                      </m:oMathParaPr>
+                      <m:oMath xmlns:m="http://schemas.openxmlformats.org/officeDocument/2006/math">
+                        <m:sSub>
+                          <m:sSubPr>
+                            <m:ctrlPr>
+                              <a:rPr lang="en-US" sz="2000" b="0" i="1" smtClean="0">
+                                <a:latin typeface="Cambria Math" panose="02040503050406030204" pitchFamily="18" charset="0"/>
+                                <a:cs typeface="Arial" panose="020B0604020202020204" pitchFamily="34" charset="0"/>
+                              </a:rPr>
+                            </m:ctrlPr>
+                          </m:sSubPr>
+                          <m:e>
+                            <m:acc>
+                              <m:accPr>
+                                <m:chr m:val="⃗"/>
+                                <m:ctrlPr>
+                                  <a:rPr lang="en-US" sz="2000" b="0" i="1" smtClean="0">
+                                    <a:latin typeface="Cambria Math" panose="02040503050406030204" pitchFamily="18" charset="0"/>
+                                    <a:cs typeface="Arial" panose="020B0604020202020204" pitchFamily="34" charset="0"/>
+                                  </a:rPr>
+                                </m:ctrlPr>
+                              </m:accPr>
+                              <m:e>
+                                <m:r>
+                                  <a:rPr lang="en-US" sz="2000" b="0" i="1" smtClean="0">
+                                    <a:latin typeface="Cambria Math" panose="02040503050406030204" pitchFamily="18" charset="0"/>
+                                    <a:cs typeface="Arial" panose="020B0604020202020204" pitchFamily="34" charset="0"/>
+                                  </a:rPr>
+                                  <m:t>𝑓</m:t>
+                                </m:r>
+                              </m:e>
+                            </m:acc>
+                          </m:e>
+                          <m:sub>
+                            <m:r>
+                              <a:rPr lang="en-US" sz="2000" b="0" i="1" smtClean="0">
+                                <a:latin typeface="Cambria Math" panose="02040503050406030204" pitchFamily="18" charset="0"/>
+                                <a:cs typeface="Arial" panose="020B0604020202020204" pitchFamily="34" charset="0"/>
+                              </a:rPr>
+                              <m:t>2</m:t>
+                            </m:r>
+                            <m:r>
+                              <a:rPr lang="en-US" sz="2000" b="0" i="1" smtClean="0">
+                                <a:latin typeface="Cambria Math" panose="02040503050406030204" pitchFamily="18" charset="0"/>
+                                <a:cs typeface="Arial" panose="020B0604020202020204" pitchFamily="34" charset="0"/>
+                              </a:rPr>
+                              <m:t>𝑠</m:t>
+                            </m:r>
+                          </m:sub>
+                        </m:sSub>
+                      </m:oMath>
+                    </m:oMathPara>
+                  </a14:m>
+                  <a:endParaRPr lang="en-US" sz="2000" dirty="0" smtClean="0">
+                    <a:latin typeface="Arial" panose="020B0604020202020204" pitchFamily="34" charset="0"/>
+                    <a:cs typeface="Arial" panose="020B0604020202020204" pitchFamily="34" charset="0"/>
+                  </a:endParaRPr>
+                </a:p>
+              </p:txBody>
+            </p:sp>
+          </mc:Choice>
+          <mc:Fallback>
+            <p:sp>
+              <p:nvSpPr>
+                <p:cNvPr id="44" name="TextBox 43"/>
+                <p:cNvSpPr txBox="1">
+                  <a:spLocks noRot="1" noChangeAspect="1" noMove="1" noResize="1" noEditPoints="1" noAdjustHandles="1" noChangeArrowheads="1" noChangeShapeType="1" noTextEdit="1"/>
+                </p:cNvSpPr>
+                <p:nvPr/>
+              </p:nvSpPr>
+              <p:spPr>
+                <a:xfrm>
+                  <a:off x="972707" y="3046248"/>
+                  <a:ext cx="386388" cy="354071"/>
+                </a:xfrm>
+                <a:prstGeom prst="rect">
+                  <a:avLst/>
+                </a:prstGeom>
+                <a:blipFill>
+                  <a:blip r:embed="rId34"/>
+                  <a:stretch>
+                    <a:fillRect l="-22222" t="-34483" r="-57143" b="-31034"/>
+                  </a:stretch>
+                </a:blipFill>
+              </p:spPr>
+              <p:txBody>
+                <a:bodyPr/>
+                <a:lstStyle/>
+                <a:p>
+                  <a:r>
+                    <a:rPr lang="en-US">
+                      <a:noFill/>
+                    </a:rPr>
+                    <a:t> </a:t>
+                  </a:r>
+                </a:p>
+              </p:txBody>
+            </p:sp>
+          </mc:Fallback>
+        </mc:AlternateContent>
+        <p:cxnSp>
+          <p:nvCxnSpPr>
+            <p:cNvPr id="46" name="Straight Arrow Connector 45"/>
+            <p:cNvCxnSpPr/>
+            <p:nvPr/>
+          </p:nvCxnSpPr>
+          <p:spPr>
+            <a:xfrm flipH="1" flipV="1">
+              <a:off x="3213644" y="3486784"/>
+              <a:ext cx="631329" cy="10463"/>
+            </a:xfrm>
+            <a:prstGeom prst="straightConnector1">
+              <a:avLst/>
+            </a:prstGeom>
+            <a:ln w="38100">
+              <a:solidFill>
+                <a:schemeClr val="tx1"/>
+              </a:solidFill>
+              <a:tailEnd type="triangle"/>
+            </a:ln>
+          </p:spPr>
+          <p:style>
+            <a:lnRef idx="1">
+              <a:schemeClr val="accent1"/>
+            </a:lnRef>
+            <a:fillRef idx="0">
+              <a:schemeClr val="accent1"/>
+            </a:fillRef>
+            <a:effectRef idx="0">
+              <a:schemeClr val="accent1"/>
+            </a:effectRef>
+            <a:fontRef idx="minor">
+              <a:schemeClr val="tx1"/>
+            </a:fontRef>
+          </p:style>
+        </p:cxnSp>
+        <mc:AlternateContent xmlns:mc="http://schemas.openxmlformats.org/markup-compatibility/2006">
+          <mc:Choice xmlns:a14="http://schemas.microsoft.com/office/drawing/2010/main" Requires="a14">
+            <p:sp>
+              <p:nvSpPr>
+                <p:cNvPr id="47" name="TextBox 46"/>
+                <p:cNvSpPr txBox="1"/>
+                <p:nvPr/>
+              </p:nvSpPr>
+              <p:spPr>
+                <a:xfrm>
+                  <a:off x="2971136" y="3046247"/>
+                  <a:ext cx="386388" cy="354071"/>
+                </a:xfrm>
+                <a:prstGeom prst="rect">
+                  <a:avLst/>
+                </a:prstGeom>
+                <a:noFill/>
+              </p:spPr>
+              <p:txBody>
+                <a:bodyPr wrap="none" lIns="0" tIns="0" rIns="0" bIns="0" rtlCol="0">
+                  <a:spAutoFit/>
+                </a:bodyPr>
+                <a:lstStyle/>
+                <a:p>
+                  <a14:m>
+                    <m:oMathPara xmlns:m="http://schemas.openxmlformats.org/officeDocument/2006/math">
+                      <m:oMathParaPr>
+                        <m:jc m:val="centerGroup"/>
+                      </m:oMathParaPr>
+                      <m:oMath xmlns:m="http://schemas.openxmlformats.org/officeDocument/2006/math">
+                        <m:sSub>
+                          <m:sSubPr>
+                            <m:ctrlPr>
+                              <a:rPr lang="en-US" sz="2000" b="0" i="1" smtClean="0">
+                                <a:latin typeface="Cambria Math" panose="02040503050406030204" pitchFamily="18" charset="0"/>
+                                <a:cs typeface="Arial" panose="020B0604020202020204" pitchFamily="34" charset="0"/>
+                              </a:rPr>
+                            </m:ctrlPr>
+                          </m:sSubPr>
+                          <m:e>
+                            <m:acc>
+                              <m:accPr>
+                                <m:chr m:val="⃗"/>
+                                <m:ctrlPr>
+                                  <a:rPr lang="en-US" sz="2000" b="0" i="1" smtClean="0">
+                                    <a:latin typeface="Cambria Math" panose="02040503050406030204" pitchFamily="18" charset="0"/>
+                                    <a:cs typeface="Arial" panose="020B0604020202020204" pitchFamily="34" charset="0"/>
+                                  </a:rPr>
+                                </m:ctrlPr>
+                              </m:accPr>
+                              <m:e>
+                                <m:r>
+                                  <a:rPr lang="en-US" sz="2000" b="0" i="1" smtClean="0">
+                                    <a:latin typeface="Cambria Math" panose="02040503050406030204" pitchFamily="18" charset="0"/>
+                                    <a:cs typeface="Arial" panose="020B0604020202020204" pitchFamily="34" charset="0"/>
+                                  </a:rPr>
+                                  <m:t>𝑓</m:t>
+                                </m:r>
+                              </m:e>
+                            </m:acc>
+                          </m:e>
+                          <m:sub>
+                            <m:r>
+                              <a:rPr lang="en-US" sz="2000" b="0" i="1" smtClean="0">
+                                <a:latin typeface="Cambria Math" panose="02040503050406030204" pitchFamily="18" charset="0"/>
+                                <a:cs typeface="Arial" panose="020B0604020202020204" pitchFamily="34" charset="0"/>
+                              </a:rPr>
+                              <m:t>1</m:t>
+                            </m:r>
+                            <m:r>
+                              <a:rPr lang="en-US" sz="2000" b="0" i="1" smtClean="0">
+                                <a:latin typeface="Cambria Math" panose="02040503050406030204" pitchFamily="18" charset="0"/>
+                                <a:cs typeface="Arial" panose="020B0604020202020204" pitchFamily="34" charset="0"/>
+                              </a:rPr>
+                              <m:t>𝑠</m:t>
+                            </m:r>
+                          </m:sub>
+                        </m:sSub>
+                      </m:oMath>
+                    </m:oMathPara>
+                  </a14:m>
+                  <a:endParaRPr lang="en-US" sz="2000" dirty="0" smtClean="0">
+                    <a:latin typeface="Arial" panose="020B0604020202020204" pitchFamily="34" charset="0"/>
+                    <a:cs typeface="Arial" panose="020B0604020202020204" pitchFamily="34" charset="0"/>
+                  </a:endParaRPr>
+                </a:p>
+              </p:txBody>
+            </p:sp>
+          </mc:Choice>
+          <mc:Fallback>
+            <p:sp>
+              <p:nvSpPr>
+                <p:cNvPr id="47" name="TextBox 46"/>
+                <p:cNvSpPr txBox="1">
+                  <a:spLocks noRot="1" noChangeAspect="1" noMove="1" noResize="1" noEditPoints="1" noAdjustHandles="1" noChangeArrowheads="1" noChangeShapeType="1" noTextEdit="1"/>
+                </p:cNvSpPr>
+                <p:nvPr/>
+              </p:nvSpPr>
+              <p:spPr>
+                <a:xfrm>
+                  <a:off x="2971136" y="3046247"/>
+                  <a:ext cx="386388" cy="354071"/>
+                </a:xfrm>
+                <a:prstGeom prst="rect">
+                  <a:avLst/>
+                </a:prstGeom>
+                <a:blipFill>
+                  <a:blip r:embed="rId35"/>
+                  <a:stretch>
+                    <a:fillRect l="-20313" t="-34483" r="-56250" b="-31034"/>
+                  </a:stretch>
+                </a:blipFill>
+              </p:spPr>
+              <p:txBody>
+                <a:bodyPr/>
+                <a:lstStyle/>
+                <a:p>
+                  <a:r>
+                    <a:rPr lang="en-US">
+                      <a:noFill/>
+                    </a:rPr>
+                    <a:t> </a:t>
+                  </a:r>
+                </a:p>
+              </p:txBody>
+            </p:sp>
+          </mc:Fallback>
+        </mc:AlternateContent>
+        <p:cxnSp>
+          <p:nvCxnSpPr>
+            <p:cNvPr id="55" name="Straight Arrow Connector 54"/>
+            <p:cNvCxnSpPr/>
+            <p:nvPr/>
+          </p:nvCxnSpPr>
+          <p:spPr>
+            <a:xfrm>
+              <a:off x="3969446" y="3521328"/>
+              <a:ext cx="5284" cy="1040756"/>
+            </a:xfrm>
+            <a:prstGeom prst="straightConnector1">
+              <a:avLst/>
+            </a:prstGeom>
+            <a:ln w="38100">
+              <a:solidFill>
+                <a:schemeClr val="tx1"/>
+              </a:solidFill>
+              <a:tailEnd type="triangle"/>
+            </a:ln>
+          </p:spPr>
+          <p:style>
+            <a:lnRef idx="1">
+              <a:schemeClr val="accent1"/>
+            </a:lnRef>
+            <a:fillRef idx="0">
+              <a:schemeClr val="accent1"/>
+            </a:fillRef>
+            <a:effectRef idx="0">
+              <a:schemeClr val="accent1"/>
+            </a:effectRef>
+            <a:fontRef idx="minor">
+              <a:schemeClr val="tx1"/>
+            </a:fontRef>
+          </p:style>
+        </p:cxnSp>
+        <mc:AlternateContent xmlns:mc="http://schemas.openxmlformats.org/markup-compatibility/2006">
+          <mc:Choice xmlns:a14="http://schemas.microsoft.com/office/drawing/2010/main" Requires="a14">
+            <p:sp>
+              <p:nvSpPr>
+                <p:cNvPr id="59" name="TextBox 58"/>
+                <p:cNvSpPr txBox="1"/>
+                <p:nvPr/>
+              </p:nvSpPr>
+              <p:spPr>
+                <a:xfrm>
+                  <a:off x="4095819" y="3968668"/>
+                  <a:ext cx="256847" cy="345159"/>
+                </a:xfrm>
+                <a:prstGeom prst="rect">
+                  <a:avLst/>
+                </a:prstGeom>
+                <a:noFill/>
+              </p:spPr>
+              <p:txBody>
+                <a:bodyPr wrap="square" lIns="0" tIns="0" rIns="0" bIns="0" rtlCol="0">
+                  <a:spAutoFit/>
+                </a:bodyPr>
+                <a:lstStyle/>
+                <a:p>
+                  <a:pPr/>
+                  <a14:m>
+                    <m:oMathPara xmlns:m="http://schemas.openxmlformats.org/officeDocument/2006/math">
+                      <m:oMathParaPr>
+                        <m:jc m:val="centerGroup"/>
+                      </m:oMathParaPr>
+                      <m:oMath xmlns:m="http://schemas.openxmlformats.org/officeDocument/2006/math">
+                        <m:sSub>
+                          <m:sSubPr>
+                            <m:ctrlPr>
+                              <a:rPr lang="en-US" sz="2000" b="0" i="0" smtClean="0">
+                                <a:latin typeface="Cambria Math" panose="02040503050406030204" pitchFamily="18" charset="0"/>
+                                <a:cs typeface="Arial" panose="020B0604020202020204" pitchFamily="34" charset="0"/>
+                              </a:rPr>
+                            </m:ctrlPr>
+                          </m:sSubPr>
+                          <m:e>
+                            <m:r>
+                              <a:rPr lang="en-US" sz="2000" b="0" i="1" smtClean="0">
+                                <a:latin typeface="Cambria Math" panose="02040503050406030204" pitchFamily="18" charset="0"/>
+                                <a:cs typeface="Arial" panose="020B0604020202020204" pitchFamily="34" charset="0"/>
+                              </a:rPr>
+                              <m:t>−</m:t>
+                            </m:r>
+                            <m:acc>
+                              <m:accPr>
+                                <m:chr m:val="⃗"/>
+                                <m:ctrlPr>
+                                  <a:rPr lang="en-US" sz="2000" b="0" i="1" smtClean="0">
+                                    <a:latin typeface="Cambria Math" panose="02040503050406030204" pitchFamily="18" charset="0"/>
+                                    <a:cs typeface="Arial" panose="020B0604020202020204" pitchFamily="34" charset="0"/>
+                                  </a:rPr>
+                                </m:ctrlPr>
+                              </m:accPr>
+                              <m:e>
+                                <m:r>
+                                  <a:rPr lang="en-US" sz="2000" b="0" i="1" smtClean="0">
+                                    <a:latin typeface="Cambria Math" panose="02040503050406030204" pitchFamily="18" charset="0"/>
+                                    <a:cs typeface="Arial" panose="020B0604020202020204" pitchFamily="34" charset="0"/>
+                                  </a:rPr>
+                                  <m:t>𝑁</m:t>
+                                </m:r>
+                              </m:e>
+                            </m:acc>
+                          </m:e>
+                          <m:sub>
+                            <m:r>
+                              <a:rPr lang="en-US" sz="2000" b="0" i="0" smtClean="0">
+                                <a:latin typeface="Cambria Math" panose="02040503050406030204" pitchFamily="18" charset="0"/>
+                                <a:cs typeface="Arial" panose="020B0604020202020204" pitchFamily="34" charset="0"/>
+                              </a:rPr>
+                              <m:t>2</m:t>
+                            </m:r>
+                          </m:sub>
+                        </m:sSub>
+                      </m:oMath>
+                    </m:oMathPara>
+                  </a14:m>
+                  <a:endParaRPr lang="en-US" sz="2000" dirty="0" smtClean="0">
+                    <a:latin typeface="Arial" panose="020B0604020202020204" pitchFamily="34" charset="0"/>
+                    <a:cs typeface="Arial" panose="020B0604020202020204" pitchFamily="34" charset="0"/>
+                  </a:endParaRPr>
+                </a:p>
+              </p:txBody>
+            </p:sp>
+          </mc:Choice>
+          <mc:Fallback>
+            <p:sp>
+              <p:nvSpPr>
+                <p:cNvPr id="59" name="TextBox 58"/>
+                <p:cNvSpPr txBox="1">
+                  <a:spLocks noRot="1" noChangeAspect="1" noMove="1" noResize="1" noEditPoints="1" noAdjustHandles="1" noChangeArrowheads="1" noChangeShapeType="1" noTextEdit="1"/>
+                </p:cNvSpPr>
+                <p:nvPr/>
+              </p:nvSpPr>
+              <p:spPr>
+                <a:xfrm>
+                  <a:off x="4095819" y="3968668"/>
+                  <a:ext cx="256847" cy="345159"/>
+                </a:xfrm>
+                <a:prstGeom prst="rect">
+                  <a:avLst/>
+                </a:prstGeom>
+                <a:blipFill>
+                  <a:blip r:embed="rId36"/>
+                  <a:stretch>
+                    <a:fillRect l="-19048" r="-107143" b="-17544"/>
+                  </a:stretch>
+                </a:blipFill>
+              </p:spPr>
+              <p:txBody>
+                <a:bodyPr/>
+                <a:lstStyle/>
+                <a:p>
+                  <a:r>
+                    <a:rPr lang="en-US">
+                      <a:noFill/>
+                    </a:rPr>
+                    <a:t> </a:t>
+                  </a:r>
+                </a:p>
+              </p:txBody>
+            </p:sp>
+          </mc:Fallback>
+        </mc:AlternateContent>
+      </p:grpSp>
+    </p:spTree>
+    <p:extLst>
+      <p:ext uri="{BB962C8B-B14F-4D97-AF65-F5344CB8AC3E}">
+        <p14:creationId xmlns:p14="http://schemas.microsoft.com/office/powerpoint/2010/main" val="2045662198"/>
       </p:ext>
     </p:extLst>
   </p:cSld>

</xml_diff>